<commit_message>
Update slide order for better flow
</commit_message>
<xml_diff>
--- a/materials/Get-zine to Know You.pptx
+++ b/materials/Get-zine to Know You.pptx
@@ -1,44 +1,44 @@
 
 <file path=ppt/presentation.xml><?xml version="1.0" encoding="utf-8"?>
-<p:presentation xmlns:a="http://schemas.openxmlformats.org/drawingml/2006/main" xmlns:r="http://schemas.openxmlformats.org/officeDocument/2006/relationships" xmlns:mc="http://schemas.openxmlformats.org/markup-compatibility/2006" xmlns:mv="urn:schemas-microsoft-com:mac:vml" xmlns:p="http://schemas.openxmlformats.org/presentationml/2006/main" xmlns:c="http://schemas.openxmlformats.org/drawingml/2006/chart" xmlns:dgm="http://schemas.openxmlformats.org/drawingml/2006/diagram" xmlns:o="urn:schemas-microsoft-com:office:office" xmlns:v="urn:schemas-microsoft-com:vml" xmlns:pvml="urn:schemas-microsoft-com:office:powerpoint" xmlns:com="http://schemas.openxmlformats.org/drawingml/2006/compatibility" xmlns:p14="http://schemas.microsoft.com/office/powerpoint/2010/main" xmlns:p15="http://schemas.microsoft.com/office/powerpoint/2012/main" autoCompressPictures="0" embedTrueTypeFonts="1" strictFirstAndLastChars="0" saveSubsetFonts="1">
+<p:presentation xmlns:a="http://schemas.openxmlformats.org/drawingml/2006/main" xmlns:r="http://schemas.openxmlformats.org/officeDocument/2006/relationships" xmlns:p="http://schemas.openxmlformats.org/presentationml/2006/main" strictFirstAndLastChars="0" embedTrueTypeFonts="1" saveSubsetFonts="1" autoCompressPictures="0">
   <p:sldMasterIdLst>
-    <p:sldMasterId id="2147483659" r:id="rId3"/>
+    <p:sldMasterId id="2147483659" r:id="rId1"/>
   </p:sldMasterIdLst>
   <p:notesMasterIdLst>
-    <p:notesMasterId r:id="rId4"/>
+    <p:notesMasterId r:id="rId12"/>
   </p:notesMasterIdLst>
   <p:sldIdLst>
-    <p:sldId id="256" r:id="rId5"/>
-    <p:sldId id="257" r:id="rId6"/>
-    <p:sldId id="258" r:id="rId7"/>
-    <p:sldId id="259" r:id="rId8"/>
-    <p:sldId id="260" r:id="rId9"/>
-    <p:sldId id="261" r:id="rId10"/>
-    <p:sldId id="262" r:id="rId11"/>
-    <p:sldId id="263" r:id="rId12"/>
-    <p:sldId id="264" r:id="rId13"/>
-    <p:sldId id="265" r:id="rId14"/>
+    <p:sldId id="256" r:id="rId2"/>
+    <p:sldId id="257" r:id="rId3"/>
+    <p:sldId id="259" r:id="rId4"/>
+    <p:sldId id="258" r:id="rId5"/>
+    <p:sldId id="262" r:id="rId6"/>
+    <p:sldId id="260" r:id="rId7"/>
+    <p:sldId id="261" r:id="rId8"/>
+    <p:sldId id="263" r:id="rId9"/>
+    <p:sldId id="264" r:id="rId10"/>
+    <p:sldId id="265" r:id="rId11"/>
   </p:sldIdLst>
-  <p:sldSz cy="5143500" cx="9144000"/>
+  <p:sldSz cx="9144000" cy="5143500" type="screen16x9"/>
   <p:notesSz cx="6858000" cy="9144000"/>
   <p:embeddedFontLst>
     <p:embeddedFont>
-      <p:font typeface="Economica"/>
-      <p:regular r:id="rId15"/>
-      <p:bold r:id="rId16"/>
-      <p:italic r:id="rId17"/>
-      <p:boldItalic r:id="rId18"/>
+      <p:font typeface="Economica" panose="020B0604020202020204" charset="0"/>
+      <p:regular r:id="rId13"/>
+      <p:bold r:id="rId14"/>
+      <p:italic r:id="rId15"/>
+      <p:boldItalic r:id="rId16"/>
     </p:embeddedFont>
     <p:embeddedFont>
-      <p:font typeface="Open Sans"/>
-      <p:regular r:id="rId19"/>
-      <p:bold r:id="rId20"/>
-      <p:italic r:id="rId21"/>
-      <p:boldItalic r:id="rId22"/>
+      <p:font typeface="Open Sans" panose="020B0604020202020204" charset="0"/>
+      <p:regular r:id="rId17"/>
+      <p:bold r:id="rId18"/>
+      <p:italic r:id="rId19"/>
+      <p:boldItalic r:id="rId20"/>
     </p:embeddedFont>
   </p:embeddedFontLst>
   <p:defaultTextStyle>
-    <a:defPPr lvl="0" marR="0" rtl="0" algn="l">
+    <a:defPPr marR="0" lvl="0" algn="l" rtl="0">
       <a:lnSpc>
         <a:spcPct val="100000"/>
       </a:lnSpc>
@@ -49,7 +49,7 @@
         <a:spcPts val="0"/>
       </a:spcAft>
     </a:defPPr>
-    <a:lvl1pPr lvl="0" marR="0" rtl="0" algn="l">
+    <a:lvl1pPr marR="0" lvl="0" algn="l" rtl="0">
       <a:lnSpc>
         <a:spcPct val="100000"/>
       </a:lnSpc>
@@ -60,7 +60,7 @@
         <a:spcPts val="0"/>
       </a:spcAft>
       <a:buNone/>
-      <a:defRPr b="0" i="0" sz="1400" u="none" cap="none" strike="noStrike">
+      <a:defRPr sz="1400" b="0" i="0" u="none" strike="noStrike" cap="none">
         <a:solidFill>
           <a:srgbClr val="000000"/>
         </a:solidFill>
@@ -70,7 +70,7 @@
         <a:sym typeface="Arial"/>
       </a:defRPr>
     </a:lvl1pPr>
-    <a:lvl2pPr lvl="1" marR="0" rtl="0" algn="l">
+    <a:lvl2pPr marR="0" lvl="1" algn="l" rtl="0">
       <a:lnSpc>
         <a:spcPct val="100000"/>
       </a:lnSpc>
@@ -81,7 +81,7 @@
         <a:spcPts val="0"/>
       </a:spcAft>
       <a:buNone/>
-      <a:defRPr b="0" i="0" sz="1400" u="none" cap="none" strike="noStrike">
+      <a:defRPr sz="1400" b="0" i="0" u="none" strike="noStrike" cap="none">
         <a:solidFill>
           <a:srgbClr val="000000"/>
         </a:solidFill>
@@ -91,7 +91,7 @@
         <a:sym typeface="Arial"/>
       </a:defRPr>
     </a:lvl2pPr>
-    <a:lvl3pPr lvl="2" marR="0" rtl="0" algn="l">
+    <a:lvl3pPr marR="0" lvl="2" algn="l" rtl="0">
       <a:lnSpc>
         <a:spcPct val="100000"/>
       </a:lnSpc>
@@ -102,7 +102,7 @@
         <a:spcPts val="0"/>
       </a:spcAft>
       <a:buNone/>
-      <a:defRPr b="0" i="0" sz="1400" u="none" cap="none" strike="noStrike">
+      <a:defRPr sz="1400" b="0" i="0" u="none" strike="noStrike" cap="none">
         <a:solidFill>
           <a:srgbClr val="000000"/>
         </a:solidFill>
@@ -112,7 +112,7 @@
         <a:sym typeface="Arial"/>
       </a:defRPr>
     </a:lvl3pPr>
-    <a:lvl4pPr lvl="3" marR="0" rtl="0" algn="l">
+    <a:lvl4pPr marR="0" lvl="3" algn="l" rtl="0">
       <a:lnSpc>
         <a:spcPct val="100000"/>
       </a:lnSpc>
@@ -123,7 +123,7 @@
         <a:spcPts val="0"/>
       </a:spcAft>
       <a:buNone/>
-      <a:defRPr b="0" i="0" sz="1400" u="none" cap="none" strike="noStrike">
+      <a:defRPr sz="1400" b="0" i="0" u="none" strike="noStrike" cap="none">
         <a:solidFill>
           <a:srgbClr val="000000"/>
         </a:solidFill>
@@ -133,7 +133,7 @@
         <a:sym typeface="Arial"/>
       </a:defRPr>
     </a:lvl4pPr>
-    <a:lvl5pPr lvl="4" marR="0" rtl="0" algn="l">
+    <a:lvl5pPr marR="0" lvl="4" algn="l" rtl="0">
       <a:lnSpc>
         <a:spcPct val="100000"/>
       </a:lnSpc>
@@ -144,7 +144,7 @@
         <a:spcPts val="0"/>
       </a:spcAft>
       <a:buNone/>
-      <a:defRPr b="0" i="0" sz="1400" u="none" cap="none" strike="noStrike">
+      <a:defRPr sz="1400" b="0" i="0" u="none" strike="noStrike" cap="none">
         <a:solidFill>
           <a:srgbClr val="000000"/>
         </a:solidFill>
@@ -154,7 +154,7 @@
         <a:sym typeface="Arial"/>
       </a:defRPr>
     </a:lvl5pPr>
-    <a:lvl6pPr lvl="5" marR="0" rtl="0" algn="l">
+    <a:lvl6pPr marR="0" lvl="5" algn="l" rtl="0">
       <a:lnSpc>
         <a:spcPct val="100000"/>
       </a:lnSpc>
@@ -165,7 +165,7 @@
         <a:spcPts val="0"/>
       </a:spcAft>
       <a:buNone/>
-      <a:defRPr b="0" i="0" sz="1400" u="none" cap="none" strike="noStrike">
+      <a:defRPr sz="1400" b="0" i="0" u="none" strike="noStrike" cap="none">
         <a:solidFill>
           <a:srgbClr val="000000"/>
         </a:solidFill>
@@ -175,7 +175,7 @@
         <a:sym typeface="Arial"/>
       </a:defRPr>
     </a:lvl6pPr>
-    <a:lvl7pPr lvl="6" marR="0" rtl="0" algn="l">
+    <a:lvl7pPr marR="0" lvl="6" algn="l" rtl="0">
       <a:lnSpc>
         <a:spcPct val="100000"/>
       </a:lnSpc>
@@ -186,7 +186,7 @@
         <a:spcPts val="0"/>
       </a:spcAft>
       <a:buNone/>
-      <a:defRPr b="0" i="0" sz="1400" u="none" cap="none" strike="noStrike">
+      <a:defRPr sz="1400" b="0" i="0" u="none" strike="noStrike" cap="none">
         <a:solidFill>
           <a:srgbClr val="000000"/>
         </a:solidFill>
@@ -196,7 +196,7 @@
         <a:sym typeface="Arial"/>
       </a:defRPr>
     </a:lvl7pPr>
-    <a:lvl8pPr lvl="7" marR="0" rtl="0" algn="l">
+    <a:lvl8pPr marR="0" lvl="7" algn="l" rtl="0">
       <a:lnSpc>
         <a:spcPct val="100000"/>
       </a:lnSpc>
@@ -207,7 +207,7 @@
         <a:spcPts val="0"/>
       </a:spcAft>
       <a:buNone/>
-      <a:defRPr b="0" i="0" sz="1400" u="none" cap="none" strike="noStrike">
+      <a:defRPr sz="1400" b="0" i="0" u="none" strike="noStrike" cap="none">
         <a:solidFill>
           <a:srgbClr val="000000"/>
         </a:solidFill>
@@ -217,7 +217,7 @@
         <a:sym typeface="Arial"/>
       </a:defRPr>
     </a:lvl8pPr>
-    <a:lvl9pPr lvl="8" marR="0" rtl="0" algn="l">
+    <a:lvl9pPr marR="0" lvl="8" algn="l" rtl="0">
       <a:lnSpc>
         <a:spcPct val="100000"/>
       </a:lnSpc>
@@ -228,7 +228,7 @@
         <a:spcPts val="0"/>
       </a:spcAft>
       <a:buNone/>
-      <a:defRPr b="0" i="0" sz="1400" u="none" cap="none" strike="noStrike">
+      <a:defRPr sz="1400" b="0" i="0" u="none" strike="noStrike" cap="none">
         <a:solidFill>
           <a:srgbClr val="000000"/>
         </a:solidFill>
@@ -242,12 +242,21 @@
 </p:presentation>
 </file>
 
+<file path=ppt/revisionInfo.xml><?xml version="1.0" encoding="utf-8"?>
+<p1510:revInfo xmlns:a="http://schemas.openxmlformats.org/drawingml/2006/main" xmlns:r="http://schemas.openxmlformats.org/officeDocument/2006/relationships" xmlns:p1510="http://schemas.microsoft.com/office/powerpoint/2015/10/main"/>
+</file>
+
 <file path=ppt/notesMasters/notesMaster1.xml><?xml version="1.0" encoding="utf-8"?>
-<p:notesMaster xmlns:a="http://schemas.openxmlformats.org/drawingml/2006/main" xmlns:r="http://schemas.openxmlformats.org/officeDocument/2006/relationships" xmlns:mc="http://schemas.openxmlformats.org/markup-compatibility/2006" xmlns:mv="urn:schemas-microsoft-com:mac:vml" xmlns:p="http://schemas.openxmlformats.org/presentationml/2006/main" xmlns:c="http://schemas.openxmlformats.org/drawingml/2006/chart" xmlns:dgm="http://schemas.openxmlformats.org/drawingml/2006/diagram" xmlns:o="urn:schemas-microsoft-com:office:office" xmlns:v="urn:schemas-microsoft-com:vml" xmlns:pvml="urn:schemas-microsoft-com:office:powerpoint" xmlns:com="http://schemas.openxmlformats.org/drawingml/2006/compatibility" xmlns:p14="http://schemas.microsoft.com/office/powerpoint/2010/main" xmlns:p15="http://schemas.microsoft.com/office/powerpoint/2012/main">
+<p:notesMaster xmlns:a="http://schemas.openxmlformats.org/drawingml/2006/main" xmlns:r="http://schemas.openxmlformats.org/officeDocument/2006/relationships" xmlns:p="http://schemas.openxmlformats.org/presentationml/2006/main">
   <p:cSld>
+    <p:bg>
+      <p:bgRef idx="1001">
+        <a:schemeClr val="bg1"/>
+      </p:bgRef>
+    </p:bg>
     <p:spTree>
       <p:nvGrpSpPr>
-        <p:cNvPr id="2" name="Shape 2"/>
+        <p:cNvPr id="1" name="Shape 2"/>
         <p:cNvGrpSpPr/>
         <p:nvPr/>
       </p:nvGrpSpPr>
@@ -262,9 +271,11 @@
       <p:sp>
         <p:nvSpPr>
           <p:cNvPr id="3" name="Shape 3"/>
-          <p:cNvSpPr/>
+          <p:cNvSpPr>
+            <a:spLocks noGrp="1" noRot="1" noChangeAspect="1"/>
+          </p:cNvSpPr>
           <p:nvPr>
-            <p:ph idx="2" type="sldImg"/>
+            <p:ph type="sldImg" idx="2"/>
           </p:nvPr>
         </p:nvSpPr>
         <p:spPr>
@@ -273,8 +284,13 @@
             <a:ext cx="6096075" cy="3429000"/>
           </a:xfrm>
           <a:custGeom>
+            <a:avLst/>
+            <a:gdLst/>
+            <a:ahLst/>
+            <a:cxnLst/>
+            <a:rect l="0" t="0" r="0" b="0"/>
             <a:pathLst>
-              <a:path extrusionOk="0" h="120000" w="120000">
+              <a:path w="120000" h="120000" extrusionOk="0">
                 <a:moveTo>
                   <a:pt x="0" y="0"/>
                 </a:moveTo>
@@ -292,23 +308,25 @@
             </a:pathLst>
           </a:custGeom>
           <a:noFill/>
-          <a:ln cap="flat" cmpd="sng" w="9525">
+          <a:ln w="9525" cap="flat" cmpd="sng">
             <a:solidFill>
               <a:srgbClr val="000000"/>
             </a:solidFill>
             <a:prstDash val="solid"/>
             <a:round/>
-            <a:headEnd len="med" w="med" type="none"/>
-            <a:tailEnd len="med" w="med" type="none"/>
+            <a:headEnd type="none" w="med" len="med"/>
+            <a:tailEnd type="none" w="med" len="med"/>
           </a:ln>
         </p:spPr>
       </p:sp>
       <p:sp>
         <p:nvSpPr>
           <p:cNvPr id="4" name="Shape 4"/>
-          <p:cNvSpPr txBox="1"/>
+          <p:cNvSpPr txBox="1">
+            <a:spLocks noGrp="1"/>
+          </p:cNvSpPr>
           <p:nvPr>
-            <p:ph idx="1" type="body"/>
+            <p:ph type="body" idx="1"/>
           </p:nvPr>
         </p:nvSpPr>
         <p:spPr>
@@ -325,7 +343,7 @@
           </a:ln>
         </p:spPr>
         <p:txBody>
-          <a:bodyPr anchorCtr="0" anchor="t" bIns="91425" lIns="91425" rIns="91425" tIns="91425"/>
+          <a:bodyPr lIns="91425" tIns="91425" rIns="91425" bIns="91425" anchor="t" anchorCtr="0"/>
           <a:lstStyle>
             <a:lvl1pPr lvl="0">
               <a:spcBef>
@@ -400,21 +418,115 @@
               <a:defRPr sz="1100"/>
             </a:lvl9pPr>
           </a:lstStyle>
-          <a:p/>
+          <a:p>
+            <a:endParaRPr/>
+          </a:p>
         </p:txBody>
       </p:sp>
     </p:spTree>
   </p:cSld>
-  <p:clrMap accent1="accent1" accent2="accent2" accent3="accent3" accent4="accent4" accent5="accent5" accent6="accent6" bg1="lt1" bg2="dk2" tx1="dk1" tx2="lt2" folHlink="folHlink" hlink="hlink"/>
+  <p:clrMap bg1="lt1" tx1="dk1" bg2="dk2" tx2="lt2" accent1="accent1" accent2="accent2" accent3="accent3" accent4="accent4" accent5="accent5" accent6="accent6" hlink="hlink" folHlink="folHlink"/>
+  <p:notesStyle>
+    <a:lvl1pPr marL="0" algn="l" defTabSz="914400" rtl="0" eaLnBrk="1" latinLnBrk="0" hangingPunct="1">
+      <a:defRPr sz="1200" kern="1200">
+        <a:solidFill>
+          <a:schemeClr val="tx1"/>
+        </a:solidFill>
+        <a:latin typeface="+mn-lt"/>
+        <a:ea typeface="+mn-ea"/>
+        <a:cs typeface="+mn-cs"/>
+      </a:defRPr>
+    </a:lvl1pPr>
+    <a:lvl2pPr marL="457200" algn="l" defTabSz="914400" rtl="0" eaLnBrk="1" latinLnBrk="0" hangingPunct="1">
+      <a:defRPr sz="1200" kern="1200">
+        <a:solidFill>
+          <a:schemeClr val="tx1"/>
+        </a:solidFill>
+        <a:latin typeface="+mn-lt"/>
+        <a:ea typeface="+mn-ea"/>
+        <a:cs typeface="+mn-cs"/>
+      </a:defRPr>
+    </a:lvl2pPr>
+    <a:lvl3pPr marL="914400" algn="l" defTabSz="914400" rtl="0" eaLnBrk="1" latinLnBrk="0" hangingPunct="1">
+      <a:defRPr sz="1200" kern="1200">
+        <a:solidFill>
+          <a:schemeClr val="tx1"/>
+        </a:solidFill>
+        <a:latin typeface="+mn-lt"/>
+        <a:ea typeface="+mn-ea"/>
+        <a:cs typeface="+mn-cs"/>
+      </a:defRPr>
+    </a:lvl3pPr>
+    <a:lvl4pPr marL="1371600" algn="l" defTabSz="914400" rtl="0" eaLnBrk="1" latinLnBrk="0" hangingPunct="1">
+      <a:defRPr sz="1200" kern="1200">
+        <a:solidFill>
+          <a:schemeClr val="tx1"/>
+        </a:solidFill>
+        <a:latin typeface="+mn-lt"/>
+        <a:ea typeface="+mn-ea"/>
+        <a:cs typeface="+mn-cs"/>
+      </a:defRPr>
+    </a:lvl4pPr>
+    <a:lvl5pPr marL="1828800" algn="l" defTabSz="914400" rtl="0" eaLnBrk="1" latinLnBrk="0" hangingPunct="1">
+      <a:defRPr sz="1200" kern="1200">
+        <a:solidFill>
+          <a:schemeClr val="tx1"/>
+        </a:solidFill>
+        <a:latin typeface="+mn-lt"/>
+        <a:ea typeface="+mn-ea"/>
+        <a:cs typeface="+mn-cs"/>
+      </a:defRPr>
+    </a:lvl5pPr>
+    <a:lvl6pPr marL="2286000" algn="l" defTabSz="914400" rtl="0" eaLnBrk="1" latinLnBrk="0" hangingPunct="1">
+      <a:defRPr sz="1200" kern="1200">
+        <a:solidFill>
+          <a:schemeClr val="tx1"/>
+        </a:solidFill>
+        <a:latin typeface="+mn-lt"/>
+        <a:ea typeface="+mn-ea"/>
+        <a:cs typeface="+mn-cs"/>
+      </a:defRPr>
+    </a:lvl6pPr>
+    <a:lvl7pPr marL="2743200" algn="l" defTabSz="914400" rtl="0" eaLnBrk="1" latinLnBrk="0" hangingPunct="1">
+      <a:defRPr sz="1200" kern="1200">
+        <a:solidFill>
+          <a:schemeClr val="tx1"/>
+        </a:solidFill>
+        <a:latin typeface="+mn-lt"/>
+        <a:ea typeface="+mn-ea"/>
+        <a:cs typeface="+mn-cs"/>
+      </a:defRPr>
+    </a:lvl7pPr>
+    <a:lvl8pPr marL="3200400" algn="l" defTabSz="914400" rtl="0" eaLnBrk="1" latinLnBrk="0" hangingPunct="1">
+      <a:defRPr sz="1200" kern="1200">
+        <a:solidFill>
+          <a:schemeClr val="tx1"/>
+        </a:solidFill>
+        <a:latin typeface="+mn-lt"/>
+        <a:ea typeface="+mn-ea"/>
+        <a:cs typeface="+mn-cs"/>
+      </a:defRPr>
+    </a:lvl8pPr>
+    <a:lvl9pPr marL="3657600" algn="l" defTabSz="914400" rtl="0" eaLnBrk="1" latinLnBrk="0" hangingPunct="1">
+      <a:defRPr sz="1200" kern="1200">
+        <a:solidFill>
+          <a:schemeClr val="tx1"/>
+        </a:solidFill>
+        <a:latin typeface="+mn-lt"/>
+        <a:ea typeface="+mn-ea"/>
+        <a:cs typeface="+mn-cs"/>
+      </a:defRPr>
+    </a:lvl9pPr>
+  </p:notesStyle>
 </p:notesMaster>
 </file>
 
 <file path=ppt/notesSlides/notesSlide1.xml><?xml version="1.0" encoding="utf-8"?>
-<p:notes xmlns:a="http://schemas.openxmlformats.org/drawingml/2006/main" xmlns:r="http://schemas.openxmlformats.org/officeDocument/2006/relationships" xmlns:mc="http://schemas.openxmlformats.org/markup-compatibility/2006" xmlns:mv="urn:schemas-microsoft-com:mac:vml" xmlns:p="http://schemas.openxmlformats.org/presentationml/2006/main" xmlns:c="http://schemas.openxmlformats.org/drawingml/2006/chart" xmlns:dgm="http://schemas.openxmlformats.org/drawingml/2006/diagram" xmlns:o="urn:schemas-microsoft-com:office:office" xmlns:v="urn:schemas-microsoft-com:vml" xmlns:pvml="urn:schemas-microsoft-com:office:powerpoint" xmlns:com="http://schemas.openxmlformats.org/drawingml/2006/compatibility" xmlns:p14="http://schemas.microsoft.com/office/powerpoint/2010/main" xmlns:p15="http://schemas.microsoft.com/office/powerpoint/2012/main" showMasterPhAnim="0" showMasterSp="0">
+<p:notes xmlns:a="http://schemas.openxmlformats.org/drawingml/2006/main" xmlns:r="http://schemas.openxmlformats.org/officeDocument/2006/relationships" xmlns:p="http://schemas.openxmlformats.org/presentationml/2006/main" showMasterSp="0" showMasterPhAnim="0">
   <p:cSld>
     <p:spTree>
       <p:nvGrpSpPr>
-        <p:cNvPr id="58" name="Shape 58"/>
+        <p:cNvPr id="1" name="Shape 58"/>
         <p:cNvGrpSpPr/>
         <p:nvPr/>
       </p:nvGrpSpPr>
@@ -429,9 +541,11 @@
       <p:sp>
         <p:nvSpPr>
           <p:cNvPr id="59" name="Shape 59"/>
-          <p:cNvSpPr/>
+          <p:cNvSpPr>
+            <a:spLocks noGrp="1" noRot="1" noChangeAspect="1"/>
+          </p:cNvSpPr>
           <p:nvPr>
-            <p:ph idx="2" type="sldImg"/>
+            <p:ph type="sldImg" idx="2"/>
           </p:nvPr>
         </p:nvSpPr>
         <p:spPr>
@@ -440,8 +554,13 @@
             <a:ext cx="6096075" cy="3429000"/>
           </a:xfrm>
           <a:custGeom>
+            <a:avLst/>
+            <a:gdLst/>
+            <a:ahLst/>
+            <a:cxnLst/>
+            <a:rect l="0" t="0" r="0" b="0"/>
             <a:pathLst>
-              <a:path extrusionOk="0" h="120000" w="120000">
+              <a:path w="120000" h="120000" extrusionOk="0">
                 <a:moveTo>
                   <a:pt x="0" y="0"/>
                 </a:moveTo>
@@ -463,9 +582,11 @@
       <p:sp>
         <p:nvSpPr>
           <p:cNvPr id="60" name="Shape 60"/>
-          <p:cNvSpPr txBox="1"/>
+          <p:cNvSpPr txBox="1">
+            <a:spLocks noGrp="1"/>
+          </p:cNvSpPr>
           <p:nvPr>
-            <p:ph idx="1" type="body"/>
+            <p:ph type="body" idx="1"/>
           </p:nvPr>
         </p:nvSpPr>
         <p:spPr>
@@ -478,7 +599,7 @@
           </a:prstGeom>
         </p:spPr>
         <p:txBody>
-          <a:bodyPr anchorCtr="0" anchor="t" bIns="91425" lIns="91425" rIns="91425" tIns="91425">
+          <a:bodyPr lIns="91425" tIns="91425" rIns="91425" bIns="91425" anchor="t" anchorCtr="0">
             <a:noAutofit/>
           </a:bodyPr>
           <a:lstStyle/>
@@ -505,11 +626,11 @@
 </file>
 
 <file path=ppt/notesSlides/notesSlide10.xml><?xml version="1.0" encoding="utf-8"?>
-<p:notes xmlns:a="http://schemas.openxmlformats.org/drawingml/2006/main" xmlns:r="http://schemas.openxmlformats.org/officeDocument/2006/relationships" xmlns:mc="http://schemas.openxmlformats.org/markup-compatibility/2006" xmlns:mv="urn:schemas-microsoft-com:mac:vml" xmlns:p="http://schemas.openxmlformats.org/presentationml/2006/main" xmlns:c="http://schemas.openxmlformats.org/drawingml/2006/chart" xmlns:dgm="http://schemas.openxmlformats.org/drawingml/2006/diagram" xmlns:o="urn:schemas-microsoft-com:office:office" xmlns:v="urn:schemas-microsoft-com:vml" xmlns:pvml="urn:schemas-microsoft-com:office:powerpoint" xmlns:com="http://schemas.openxmlformats.org/drawingml/2006/compatibility" xmlns:p14="http://schemas.microsoft.com/office/powerpoint/2010/main" xmlns:p15="http://schemas.microsoft.com/office/powerpoint/2012/main" showMasterPhAnim="0" showMasterSp="0">
+<p:notes xmlns:a="http://schemas.openxmlformats.org/drawingml/2006/main" xmlns:r="http://schemas.openxmlformats.org/officeDocument/2006/relationships" xmlns:p="http://schemas.openxmlformats.org/presentationml/2006/main" showMasterSp="0" showMasterPhAnim="0">
   <p:cSld>
     <p:spTree>
       <p:nvGrpSpPr>
-        <p:cNvPr id="118" name="Shape 118"/>
+        <p:cNvPr id="1" name="Shape 118"/>
         <p:cNvGrpSpPr/>
         <p:nvPr/>
       </p:nvGrpSpPr>
@@ -524,9 +645,11 @@
       <p:sp>
         <p:nvSpPr>
           <p:cNvPr id="119" name="Shape 119"/>
-          <p:cNvSpPr/>
+          <p:cNvSpPr>
+            <a:spLocks noGrp="1" noRot="1" noChangeAspect="1"/>
+          </p:cNvSpPr>
           <p:nvPr>
-            <p:ph idx="2" type="sldImg"/>
+            <p:ph type="sldImg" idx="2"/>
           </p:nvPr>
         </p:nvSpPr>
         <p:spPr>
@@ -535,8 +658,13 @@
             <a:ext cx="6096000" cy="3429000"/>
           </a:xfrm>
           <a:custGeom>
+            <a:avLst/>
+            <a:gdLst/>
+            <a:ahLst/>
+            <a:cxnLst/>
+            <a:rect l="0" t="0" r="0" b="0"/>
             <a:pathLst>
-              <a:path extrusionOk="0" h="120000" w="120000">
+              <a:path w="120000" h="120000" extrusionOk="0">
                 <a:moveTo>
                   <a:pt x="0" y="0"/>
                 </a:moveTo>
@@ -558,9 +686,11 @@
       <p:sp>
         <p:nvSpPr>
           <p:cNvPr id="120" name="Shape 120"/>
-          <p:cNvSpPr txBox="1"/>
+          <p:cNvSpPr txBox="1">
+            <a:spLocks noGrp="1"/>
+          </p:cNvSpPr>
           <p:nvPr>
-            <p:ph idx="1" type="body"/>
+            <p:ph type="body" idx="1"/>
           </p:nvPr>
         </p:nvSpPr>
         <p:spPr>
@@ -573,7 +703,7 @@
           </a:prstGeom>
         </p:spPr>
         <p:txBody>
-          <a:bodyPr anchorCtr="0" anchor="t" bIns="91425" lIns="91425" rIns="91425" tIns="91425">
+          <a:bodyPr lIns="91425" tIns="91425" rIns="91425" bIns="91425" anchor="t" anchorCtr="0">
             <a:noAutofit/>
           </a:bodyPr>
           <a:lstStyle/>
@@ -584,9 +714,6 @@
               </a:spcBef>
               <a:buNone/>
             </a:pPr>
-            <a:r>
-              <a:t/>
-            </a:r>
             <a:endParaRPr/>
           </a:p>
         </p:txBody>
@@ -600,11 +727,11 @@
 </file>
 
 <file path=ppt/notesSlides/notesSlide2.xml><?xml version="1.0" encoding="utf-8"?>
-<p:notes xmlns:a="http://schemas.openxmlformats.org/drawingml/2006/main" xmlns:r="http://schemas.openxmlformats.org/officeDocument/2006/relationships" xmlns:mc="http://schemas.openxmlformats.org/markup-compatibility/2006" xmlns:mv="urn:schemas-microsoft-com:mac:vml" xmlns:p="http://schemas.openxmlformats.org/presentationml/2006/main" xmlns:c="http://schemas.openxmlformats.org/drawingml/2006/chart" xmlns:dgm="http://schemas.openxmlformats.org/drawingml/2006/diagram" xmlns:o="urn:schemas-microsoft-com:office:office" xmlns:v="urn:schemas-microsoft-com:vml" xmlns:pvml="urn:schemas-microsoft-com:office:powerpoint" xmlns:com="http://schemas.openxmlformats.org/drawingml/2006/compatibility" xmlns:p14="http://schemas.microsoft.com/office/powerpoint/2010/main" xmlns:p15="http://schemas.microsoft.com/office/powerpoint/2012/main" showMasterPhAnim="0" showMasterSp="0">
+<p:notes xmlns:a="http://schemas.openxmlformats.org/drawingml/2006/main" xmlns:r="http://schemas.openxmlformats.org/officeDocument/2006/relationships" xmlns:p="http://schemas.openxmlformats.org/presentationml/2006/main" showMasterSp="0" showMasterPhAnim="0">
   <p:cSld>
     <p:spTree>
       <p:nvGrpSpPr>
-        <p:cNvPr id="64" name="Shape 64"/>
+        <p:cNvPr id="1" name="Shape 64"/>
         <p:cNvGrpSpPr/>
         <p:nvPr/>
       </p:nvGrpSpPr>
@@ -619,9 +746,11 @@
       <p:sp>
         <p:nvSpPr>
           <p:cNvPr id="65" name="Shape 65"/>
-          <p:cNvSpPr/>
+          <p:cNvSpPr>
+            <a:spLocks noGrp="1" noRot="1" noChangeAspect="1"/>
+          </p:cNvSpPr>
           <p:nvPr>
-            <p:ph idx="2" type="sldImg"/>
+            <p:ph type="sldImg" idx="2"/>
           </p:nvPr>
         </p:nvSpPr>
         <p:spPr>
@@ -630,8 +759,13 @@
             <a:ext cx="6096000" cy="3429000"/>
           </a:xfrm>
           <a:custGeom>
+            <a:avLst/>
+            <a:gdLst/>
+            <a:ahLst/>
+            <a:cxnLst/>
+            <a:rect l="0" t="0" r="0" b="0"/>
             <a:pathLst>
-              <a:path extrusionOk="0" h="120000" w="120000">
+              <a:path w="120000" h="120000" extrusionOk="0">
                 <a:moveTo>
                   <a:pt x="0" y="0"/>
                 </a:moveTo>
@@ -653,9 +787,11 @@
       <p:sp>
         <p:nvSpPr>
           <p:cNvPr id="66" name="Shape 66"/>
-          <p:cNvSpPr txBox="1"/>
+          <p:cNvSpPr txBox="1">
+            <a:spLocks noGrp="1"/>
+          </p:cNvSpPr>
           <p:nvPr>
-            <p:ph idx="1" type="body"/>
+            <p:ph type="body" idx="1"/>
           </p:nvPr>
         </p:nvSpPr>
         <p:spPr>
@@ -668,7 +804,7 @@
           </a:prstGeom>
         </p:spPr>
         <p:txBody>
-          <a:bodyPr anchorCtr="0" anchor="t" bIns="91425" lIns="91425" rIns="91425" tIns="91425">
+          <a:bodyPr lIns="91425" tIns="91425" rIns="91425" bIns="91425" anchor="t" anchorCtr="0">
             <a:noAutofit/>
           </a:bodyPr>
           <a:lstStyle/>
@@ -679,9 +815,6 @@
               </a:spcBef>
               <a:buNone/>
             </a:pPr>
-            <a:r>
-              <a:t/>
-            </a:r>
             <a:endParaRPr/>
           </a:p>
         </p:txBody>
@@ -695,11 +828,11 @@
 </file>
 
 <file path=ppt/notesSlides/notesSlide3.xml><?xml version="1.0" encoding="utf-8"?>
-<p:notes xmlns:a="http://schemas.openxmlformats.org/drawingml/2006/main" xmlns:r="http://schemas.openxmlformats.org/officeDocument/2006/relationships" xmlns:mc="http://schemas.openxmlformats.org/markup-compatibility/2006" xmlns:mv="urn:schemas-microsoft-com:mac:vml" xmlns:p="http://schemas.openxmlformats.org/presentationml/2006/main" xmlns:c="http://schemas.openxmlformats.org/drawingml/2006/chart" xmlns:dgm="http://schemas.openxmlformats.org/drawingml/2006/diagram" xmlns:o="urn:schemas-microsoft-com:office:office" xmlns:v="urn:schemas-microsoft-com:vml" xmlns:pvml="urn:schemas-microsoft-com:office:powerpoint" xmlns:com="http://schemas.openxmlformats.org/drawingml/2006/compatibility" xmlns:p14="http://schemas.microsoft.com/office/powerpoint/2010/main" xmlns:p15="http://schemas.microsoft.com/office/powerpoint/2012/main" showMasterPhAnim="0" showMasterSp="0">
+<p:notes xmlns:a="http://schemas.openxmlformats.org/drawingml/2006/main" xmlns:r="http://schemas.openxmlformats.org/officeDocument/2006/relationships" xmlns:p="http://schemas.openxmlformats.org/presentationml/2006/main" showMasterSp="0" showMasterPhAnim="0">
   <p:cSld>
     <p:spTree>
       <p:nvGrpSpPr>
-        <p:cNvPr id="72" name="Shape 72"/>
+        <p:cNvPr id="1" name="Shape 78"/>
         <p:cNvGrpSpPr/>
         <p:nvPr/>
       </p:nvGrpSpPr>
@@ -713,10 +846,12 @@
       </p:grpSpPr>
       <p:sp>
         <p:nvSpPr>
-          <p:cNvPr id="73" name="Shape 73"/>
-          <p:cNvSpPr/>
+          <p:cNvPr id="79" name="Shape 79"/>
+          <p:cNvSpPr>
+            <a:spLocks noGrp="1" noRot="1" noChangeAspect="1"/>
+          </p:cNvSpPr>
           <p:nvPr>
-            <p:ph idx="2" type="sldImg"/>
+            <p:ph type="sldImg" idx="2"/>
           </p:nvPr>
         </p:nvSpPr>
         <p:spPr>
@@ -725,8 +860,13 @@
             <a:ext cx="6096000" cy="3429000"/>
           </a:xfrm>
           <a:custGeom>
+            <a:avLst/>
+            <a:gdLst/>
+            <a:ahLst/>
+            <a:cxnLst/>
+            <a:rect l="0" t="0" r="0" b="0"/>
             <a:pathLst>
-              <a:path extrusionOk="0" h="120000" w="120000">
+              <a:path w="120000" h="120000" extrusionOk="0">
                 <a:moveTo>
                   <a:pt x="0" y="0"/>
                 </a:moveTo>
@@ -747,10 +887,12 @@
       </p:sp>
       <p:sp>
         <p:nvSpPr>
-          <p:cNvPr id="74" name="Shape 74"/>
-          <p:cNvSpPr txBox="1"/>
+          <p:cNvPr id="80" name="Shape 80"/>
+          <p:cNvSpPr txBox="1">
+            <a:spLocks noGrp="1"/>
+          </p:cNvSpPr>
           <p:nvPr>
-            <p:ph idx="1" type="body"/>
+            <p:ph type="body" idx="1"/>
           </p:nvPr>
         </p:nvSpPr>
         <p:spPr>
@@ -763,7 +905,7 @@
           </a:prstGeom>
         </p:spPr>
         <p:txBody>
-          <a:bodyPr anchorCtr="0" anchor="t" bIns="91425" lIns="91425" rIns="91425" tIns="91425">
+          <a:bodyPr lIns="91425" tIns="91425" rIns="91425" bIns="91425" anchor="t" anchorCtr="0">
             <a:noAutofit/>
           </a:bodyPr>
           <a:lstStyle/>
@@ -774,9 +916,6 @@
               </a:spcBef>
               <a:buNone/>
             </a:pPr>
-            <a:r>
-              <a:t/>
-            </a:r>
             <a:endParaRPr/>
           </a:p>
         </p:txBody>
@@ -790,11 +929,11 @@
 </file>
 
 <file path=ppt/notesSlides/notesSlide4.xml><?xml version="1.0" encoding="utf-8"?>
-<p:notes xmlns:a="http://schemas.openxmlformats.org/drawingml/2006/main" xmlns:r="http://schemas.openxmlformats.org/officeDocument/2006/relationships" xmlns:mc="http://schemas.openxmlformats.org/markup-compatibility/2006" xmlns:mv="urn:schemas-microsoft-com:mac:vml" xmlns:p="http://schemas.openxmlformats.org/presentationml/2006/main" xmlns:c="http://schemas.openxmlformats.org/drawingml/2006/chart" xmlns:dgm="http://schemas.openxmlformats.org/drawingml/2006/diagram" xmlns:o="urn:schemas-microsoft-com:office:office" xmlns:v="urn:schemas-microsoft-com:vml" xmlns:pvml="urn:schemas-microsoft-com:office:powerpoint" xmlns:com="http://schemas.openxmlformats.org/drawingml/2006/compatibility" xmlns:p14="http://schemas.microsoft.com/office/powerpoint/2010/main" xmlns:p15="http://schemas.microsoft.com/office/powerpoint/2012/main" showMasterPhAnim="0" showMasterSp="0">
+<p:notes xmlns:a="http://schemas.openxmlformats.org/drawingml/2006/main" xmlns:r="http://schemas.openxmlformats.org/officeDocument/2006/relationships" xmlns:p="http://schemas.openxmlformats.org/presentationml/2006/main" showMasterSp="0" showMasterPhAnim="0">
   <p:cSld>
     <p:spTree>
       <p:nvGrpSpPr>
-        <p:cNvPr id="78" name="Shape 78"/>
+        <p:cNvPr id="1" name="Shape 72"/>
         <p:cNvGrpSpPr/>
         <p:nvPr/>
       </p:nvGrpSpPr>
@@ -808,10 +947,12 @@
       </p:grpSpPr>
       <p:sp>
         <p:nvSpPr>
-          <p:cNvPr id="79" name="Shape 79"/>
-          <p:cNvSpPr/>
+          <p:cNvPr id="73" name="Shape 73"/>
+          <p:cNvSpPr>
+            <a:spLocks noGrp="1" noRot="1" noChangeAspect="1"/>
+          </p:cNvSpPr>
           <p:nvPr>
-            <p:ph idx="2" type="sldImg"/>
+            <p:ph type="sldImg" idx="2"/>
           </p:nvPr>
         </p:nvSpPr>
         <p:spPr>
@@ -820,8 +961,13 @@
             <a:ext cx="6096000" cy="3429000"/>
           </a:xfrm>
           <a:custGeom>
+            <a:avLst/>
+            <a:gdLst/>
+            <a:ahLst/>
+            <a:cxnLst/>
+            <a:rect l="0" t="0" r="0" b="0"/>
             <a:pathLst>
-              <a:path extrusionOk="0" h="120000" w="120000">
+              <a:path w="120000" h="120000" extrusionOk="0">
                 <a:moveTo>
                   <a:pt x="0" y="0"/>
                 </a:moveTo>
@@ -842,10 +988,12 @@
       </p:sp>
       <p:sp>
         <p:nvSpPr>
-          <p:cNvPr id="80" name="Shape 80"/>
-          <p:cNvSpPr txBox="1"/>
+          <p:cNvPr id="74" name="Shape 74"/>
+          <p:cNvSpPr txBox="1">
+            <a:spLocks noGrp="1"/>
+          </p:cNvSpPr>
           <p:nvPr>
-            <p:ph idx="1" type="body"/>
+            <p:ph type="body" idx="1"/>
           </p:nvPr>
         </p:nvSpPr>
         <p:spPr>
@@ -858,7 +1006,7 @@
           </a:prstGeom>
         </p:spPr>
         <p:txBody>
-          <a:bodyPr anchorCtr="0" anchor="t" bIns="91425" lIns="91425" rIns="91425" tIns="91425">
+          <a:bodyPr lIns="91425" tIns="91425" rIns="91425" bIns="91425" anchor="t" anchorCtr="0">
             <a:noAutofit/>
           </a:bodyPr>
           <a:lstStyle/>
@@ -869,9 +1017,6 @@
               </a:spcBef>
               <a:buNone/>
             </a:pPr>
-            <a:r>
-              <a:t/>
-            </a:r>
             <a:endParaRPr/>
           </a:p>
         </p:txBody>
@@ -885,11 +1030,11 @@
 </file>
 
 <file path=ppt/notesSlides/notesSlide5.xml><?xml version="1.0" encoding="utf-8"?>
-<p:notes xmlns:a="http://schemas.openxmlformats.org/drawingml/2006/main" xmlns:r="http://schemas.openxmlformats.org/officeDocument/2006/relationships" xmlns:mc="http://schemas.openxmlformats.org/markup-compatibility/2006" xmlns:mv="urn:schemas-microsoft-com:mac:vml" xmlns:p="http://schemas.openxmlformats.org/presentationml/2006/main" xmlns:c="http://schemas.openxmlformats.org/drawingml/2006/chart" xmlns:dgm="http://schemas.openxmlformats.org/drawingml/2006/diagram" xmlns:o="urn:schemas-microsoft-com:office:office" xmlns:v="urn:schemas-microsoft-com:vml" xmlns:pvml="urn:schemas-microsoft-com:office:powerpoint" xmlns:com="http://schemas.openxmlformats.org/drawingml/2006/compatibility" xmlns:p14="http://schemas.microsoft.com/office/powerpoint/2010/main" xmlns:p15="http://schemas.microsoft.com/office/powerpoint/2012/main" showMasterPhAnim="0" showMasterSp="0">
+<p:notes xmlns:a="http://schemas.openxmlformats.org/drawingml/2006/main" xmlns:r="http://schemas.openxmlformats.org/officeDocument/2006/relationships" xmlns:p="http://schemas.openxmlformats.org/presentationml/2006/main" showMasterSp="0" showMasterPhAnim="0">
   <p:cSld>
     <p:spTree>
       <p:nvGrpSpPr>
-        <p:cNvPr id="85" name="Shape 85"/>
+        <p:cNvPr id="1" name="Shape 100"/>
         <p:cNvGrpSpPr/>
         <p:nvPr/>
       </p:nvGrpSpPr>
@@ -903,10 +1048,12 @@
       </p:grpSpPr>
       <p:sp>
         <p:nvSpPr>
-          <p:cNvPr id="86" name="Shape 86"/>
-          <p:cNvSpPr/>
+          <p:cNvPr id="101" name="Shape 101"/>
+          <p:cNvSpPr>
+            <a:spLocks noGrp="1" noRot="1" noChangeAspect="1"/>
+          </p:cNvSpPr>
           <p:nvPr>
-            <p:ph idx="2" type="sldImg"/>
+            <p:ph type="sldImg" idx="2"/>
           </p:nvPr>
         </p:nvSpPr>
         <p:spPr>
@@ -915,8 +1062,13 @@
             <a:ext cx="6096000" cy="3429000"/>
           </a:xfrm>
           <a:custGeom>
+            <a:avLst/>
+            <a:gdLst/>
+            <a:ahLst/>
+            <a:cxnLst/>
+            <a:rect l="0" t="0" r="0" b="0"/>
             <a:pathLst>
-              <a:path extrusionOk="0" h="120000" w="120000">
+              <a:path w="120000" h="120000" extrusionOk="0">
                 <a:moveTo>
                   <a:pt x="0" y="0"/>
                 </a:moveTo>
@@ -937,10 +1089,12 @@
       </p:sp>
       <p:sp>
         <p:nvSpPr>
-          <p:cNvPr id="87" name="Shape 87"/>
-          <p:cNvSpPr txBox="1"/>
+          <p:cNvPr id="102" name="Shape 102"/>
+          <p:cNvSpPr txBox="1">
+            <a:spLocks noGrp="1"/>
+          </p:cNvSpPr>
           <p:nvPr>
-            <p:ph idx="1" type="body"/>
+            <p:ph type="body" idx="1"/>
           </p:nvPr>
         </p:nvSpPr>
         <p:spPr>
@@ -953,7 +1107,7 @@
           </a:prstGeom>
         </p:spPr>
         <p:txBody>
-          <a:bodyPr anchorCtr="0" anchor="t" bIns="91425" lIns="91425" rIns="91425" tIns="91425">
+          <a:bodyPr lIns="91425" tIns="91425" rIns="91425" bIns="91425" anchor="t" anchorCtr="0">
             <a:noAutofit/>
           </a:bodyPr>
           <a:lstStyle/>
@@ -964,9 +1118,6 @@
               </a:spcBef>
               <a:buNone/>
             </a:pPr>
-            <a:r>
-              <a:t/>
-            </a:r>
             <a:endParaRPr/>
           </a:p>
         </p:txBody>
@@ -980,11 +1131,11 @@
 </file>
 
 <file path=ppt/notesSlides/notesSlide6.xml><?xml version="1.0" encoding="utf-8"?>
-<p:notes xmlns:a="http://schemas.openxmlformats.org/drawingml/2006/main" xmlns:r="http://schemas.openxmlformats.org/officeDocument/2006/relationships" xmlns:mc="http://schemas.openxmlformats.org/markup-compatibility/2006" xmlns:mv="urn:schemas-microsoft-com:mac:vml" xmlns:p="http://schemas.openxmlformats.org/presentationml/2006/main" xmlns:c="http://schemas.openxmlformats.org/drawingml/2006/chart" xmlns:dgm="http://schemas.openxmlformats.org/drawingml/2006/diagram" xmlns:o="urn:schemas-microsoft-com:office:office" xmlns:v="urn:schemas-microsoft-com:vml" xmlns:pvml="urn:schemas-microsoft-com:office:powerpoint" xmlns:com="http://schemas.openxmlformats.org/drawingml/2006/compatibility" xmlns:p14="http://schemas.microsoft.com/office/powerpoint/2010/main" xmlns:p15="http://schemas.microsoft.com/office/powerpoint/2012/main" showMasterPhAnim="0" showMasterSp="0">
+<p:notes xmlns:a="http://schemas.openxmlformats.org/drawingml/2006/main" xmlns:r="http://schemas.openxmlformats.org/officeDocument/2006/relationships" xmlns:p="http://schemas.openxmlformats.org/presentationml/2006/main" showMasterSp="0" showMasterPhAnim="0">
   <p:cSld>
     <p:spTree>
       <p:nvGrpSpPr>
-        <p:cNvPr id="92" name="Shape 92"/>
+        <p:cNvPr id="1" name="Shape 85"/>
         <p:cNvGrpSpPr/>
         <p:nvPr/>
       </p:nvGrpSpPr>
@@ -998,10 +1149,12 @@
       </p:grpSpPr>
       <p:sp>
         <p:nvSpPr>
-          <p:cNvPr id="93" name="Shape 93"/>
-          <p:cNvSpPr/>
+          <p:cNvPr id="86" name="Shape 86"/>
+          <p:cNvSpPr>
+            <a:spLocks noGrp="1" noRot="1" noChangeAspect="1"/>
+          </p:cNvSpPr>
           <p:nvPr>
-            <p:ph idx="2" type="sldImg"/>
+            <p:ph type="sldImg" idx="2"/>
           </p:nvPr>
         </p:nvSpPr>
         <p:spPr>
@@ -1010,8 +1163,13 @@
             <a:ext cx="6096000" cy="3429000"/>
           </a:xfrm>
           <a:custGeom>
+            <a:avLst/>
+            <a:gdLst/>
+            <a:ahLst/>
+            <a:cxnLst/>
+            <a:rect l="0" t="0" r="0" b="0"/>
             <a:pathLst>
-              <a:path extrusionOk="0" h="120000" w="120000">
+              <a:path w="120000" h="120000" extrusionOk="0">
                 <a:moveTo>
                   <a:pt x="0" y="0"/>
                 </a:moveTo>
@@ -1032,10 +1190,12 @@
       </p:sp>
       <p:sp>
         <p:nvSpPr>
-          <p:cNvPr id="94" name="Shape 94"/>
-          <p:cNvSpPr txBox="1"/>
+          <p:cNvPr id="87" name="Shape 87"/>
+          <p:cNvSpPr txBox="1">
+            <a:spLocks noGrp="1"/>
+          </p:cNvSpPr>
           <p:nvPr>
-            <p:ph idx="1" type="body"/>
+            <p:ph type="body" idx="1"/>
           </p:nvPr>
         </p:nvSpPr>
         <p:spPr>
@@ -1048,7 +1208,7 @@
           </a:prstGeom>
         </p:spPr>
         <p:txBody>
-          <a:bodyPr anchorCtr="0" anchor="t" bIns="91425" lIns="91425" rIns="91425" tIns="91425">
+          <a:bodyPr lIns="91425" tIns="91425" rIns="91425" bIns="91425" anchor="t" anchorCtr="0">
             <a:noAutofit/>
           </a:bodyPr>
           <a:lstStyle/>
@@ -1059,9 +1219,6 @@
               </a:spcBef>
               <a:buNone/>
             </a:pPr>
-            <a:r>
-              <a:t/>
-            </a:r>
             <a:endParaRPr/>
           </a:p>
         </p:txBody>
@@ -1075,11 +1232,11 @@
 </file>
 
 <file path=ppt/notesSlides/notesSlide7.xml><?xml version="1.0" encoding="utf-8"?>
-<p:notes xmlns:a="http://schemas.openxmlformats.org/drawingml/2006/main" xmlns:r="http://schemas.openxmlformats.org/officeDocument/2006/relationships" xmlns:mc="http://schemas.openxmlformats.org/markup-compatibility/2006" xmlns:mv="urn:schemas-microsoft-com:mac:vml" xmlns:p="http://schemas.openxmlformats.org/presentationml/2006/main" xmlns:c="http://schemas.openxmlformats.org/drawingml/2006/chart" xmlns:dgm="http://schemas.openxmlformats.org/drawingml/2006/diagram" xmlns:o="urn:schemas-microsoft-com:office:office" xmlns:v="urn:schemas-microsoft-com:vml" xmlns:pvml="urn:schemas-microsoft-com:office:powerpoint" xmlns:com="http://schemas.openxmlformats.org/drawingml/2006/compatibility" xmlns:p14="http://schemas.microsoft.com/office/powerpoint/2010/main" xmlns:p15="http://schemas.microsoft.com/office/powerpoint/2012/main" showMasterPhAnim="0" showMasterSp="0">
+<p:notes xmlns:a="http://schemas.openxmlformats.org/drawingml/2006/main" xmlns:r="http://schemas.openxmlformats.org/officeDocument/2006/relationships" xmlns:p="http://schemas.openxmlformats.org/presentationml/2006/main" showMasterSp="0" showMasterPhAnim="0">
   <p:cSld>
     <p:spTree>
       <p:nvGrpSpPr>
-        <p:cNvPr id="100" name="Shape 100"/>
+        <p:cNvPr id="1" name="Shape 92"/>
         <p:cNvGrpSpPr/>
         <p:nvPr/>
       </p:nvGrpSpPr>
@@ -1093,10 +1250,12 @@
       </p:grpSpPr>
       <p:sp>
         <p:nvSpPr>
-          <p:cNvPr id="101" name="Shape 101"/>
-          <p:cNvSpPr/>
+          <p:cNvPr id="93" name="Shape 93"/>
+          <p:cNvSpPr>
+            <a:spLocks noGrp="1" noRot="1" noChangeAspect="1"/>
+          </p:cNvSpPr>
           <p:nvPr>
-            <p:ph idx="2" type="sldImg"/>
+            <p:ph type="sldImg" idx="2"/>
           </p:nvPr>
         </p:nvSpPr>
         <p:spPr>
@@ -1105,8 +1264,13 @@
             <a:ext cx="6096000" cy="3429000"/>
           </a:xfrm>
           <a:custGeom>
+            <a:avLst/>
+            <a:gdLst/>
+            <a:ahLst/>
+            <a:cxnLst/>
+            <a:rect l="0" t="0" r="0" b="0"/>
             <a:pathLst>
-              <a:path extrusionOk="0" h="120000" w="120000">
+              <a:path w="120000" h="120000" extrusionOk="0">
                 <a:moveTo>
                   <a:pt x="0" y="0"/>
                 </a:moveTo>
@@ -1127,10 +1291,12 @@
       </p:sp>
       <p:sp>
         <p:nvSpPr>
-          <p:cNvPr id="102" name="Shape 102"/>
-          <p:cNvSpPr txBox="1"/>
+          <p:cNvPr id="94" name="Shape 94"/>
+          <p:cNvSpPr txBox="1">
+            <a:spLocks noGrp="1"/>
+          </p:cNvSpPr>
           <p:nvPr>
-            <p:ph idx="1" type="body"/>
+            <p:ph type="body" idx="1"/>
           </p:nvPr>
         </p:nvSpPr>
         <p:spPr>
@@ -1143,7 +1309,7 @@
           </a:prstGeom>
         </p:spPr>
         <p:txBody>
-          <a:bodyPr anchorCtr="0" anchor="t" bIns="91425" lIns="91425" rIns="91425" tIns="91425">
+          <a:bodyPr lIns="91425" tIns="91425" rIns="91425" bIns="91425" anchor="t" anchorCtr="0">
             <a:noAutofit/>
           </a:bodyPr>
           <a:lstStyle/>
@@ -1154,9 +1320,6 @@
               </a:spcBef>
               <a:buNone/>
             </a:pPr>
-            <a:r>
-              <a:t/>
-            </a:r>
             <a:endParaRPr/>
           </a:p>
         </p:txBody>
@@ -1170,11 +1333,11 @@
 </file>
 
 <file path=ppt/notesSlides/notesSlide8.xml><?xml version="1.0" encoding="utf-8"?>
-<p:notes xmlns:a="http://schemas.openxmlformats.org/drawingml/2006/main" xmlns:r="http://schemas.openxmlformats.org/officeDocument/2006/relationships" xmlns:mc="http://schemas.openxmlformats.org/markup-compatibility/2006" xmlns:mv="urn:schemas-microsoft-com:mac:vml" xmlns:p="http://schemas.openxmlformats.org/presentationml/2006/main" xmlns:c="http://schemas.openxmlformats.org/drawingml/2006/chart" xmlns:dgm="http://schemas.openxmlformats.org/drawingml/2006/diagram" xmlns:o="urn:schemas-microsoft-com:office:office" xmlns:v="urn:schemas-microsoft-com:vml" xmlns:pvml="urn:schemas-microsoft-com:office:powerpoint" xmlns:com="http://schemas.openxmlformats.org/drawingml/2006/compatibility" xmlns:p14="http://schemas.microsoft.com/office/powerpoint/2010/main" xmlns:p15="http://schemas.microsoft.com/office/powerpoint/2012/main" showMasterPhAnim="0" showMasterSp="0">
+<p:notes xmlns:a="http://schemas.openxmlformats.org/drawingml/2006/main" xmlns:r="http://schemas.openxmlformats.org/officeDocument/2006/relationships" xmlns:p="http://schemas.openxmlformats.org/presentationml/2006/main" showMasterSp="0" showMasterPhAnim="0">
   <p:cSld>
     <p:spTree>
       <p:nvGrpSpPr>
-        <p:cNvPr id="107" name="Shape 107"/>
+        <p:cNvPr id="1" name="Shape 107"/>
         <p:cNvGrpSpPr/>
         <p:nvPr/>
       </p:nvGrpSpPr>
@@ -1189,9 +1352,11 @@
       <p:sp>
         <p:nvSpPr>
           <p:cNvPr id="108" name="Shape 108"/>
-          <p:cNvSpPr/>
+          <p:cNvSpPr>
+            <a:spLocks noGrp="1" noRot="1" noChangeAspect="1"/>
+          </p:cNvSpPr>
           <p:nvPr>
-            <p:ph idx="2" type="sldImg"/>
+            <p:ph type="sldImg" idx="2"/>
           </p:nvPr>
         </p:nvSpPr>
         <p:spPr>
@@ -1200,8 +1365,13 @@
             <a:ext cx="6096000" cy="3429000"/>
           </a:xfrm>
           <a:custGeom>
+            <a:avLst/>
+            <a:gdLst/>
+            <a:ahLst/>
+            <a:cxnLst/>
+            <a:rect l="0" t="0" r="0" b="0"/>
             <a:pathLst>
-              <a:path extrusionOk="0" h="120000" w="120000">
+              <a:path w="120000" h="120000" extrusionOk="0">
                 <a:moveTo>
                   <a:pt x="0" y="0"/>
                 </a:moveTo>
@@ -1223,9 +1393,11 @@
       <p:sp>
         <p:nvSpPr>
           <p:cNvPr id="109" name="Shape 109"/>
-          <p:cNvSpPr txBox="1"/>
+          <p:cNvSpPr txBox="1">
+            <a:spLocks noGrp="1"/>
+          </p:cNvSpPr>
           <p:nvPr>
-            <p:ph idx="1" type="body"/>
+            <p:ph type="body" idx="1"/>
           </p:nvPr>
         </p:nvSpPr>
         <p:spPr>
@@ -1238,7 +1410,7 @@
           </a:prstGeom>
         </p:spPr>
         <p:txBody>
-          <a:bodyPr anchorCtr="0" anchor="t" bIns="91425" lIns="91425" rIns="91425" tIns="91425">
+          <a:bodyPr lIns="91425" tIns="91425" rIns="91425" bIns="91425" anchor="t" anchorCtr="0">
             <a:noAutofit/>
           </a:bodyPr>
           <a:lstStyle/>
@@ -1249,9 +1421,6 @@
               </a:spcBef>
               <a:buNone/>
             </a:pPr>
-            <a:r>
-              <a:t/>
-            </a:r>
             <a:endParaRPr/>
           </a:p>
         </p:txBody>
@@ -1265,11 +1434,11 @@
 </file>
 
 <file path=ppt/notesSlides/notesSlide9.xml><?xml version="1.0" encoding="utf-8"?>
-<p:notes xmlns:a="http://schemas.openxmlformats.org/drawingml/2006/main" xmlns:r="http://schemas.openxmlformats.org/officeDocument/2006/relationships" xmlns:mc="http://schemas.openxmlformats.org/markup-compatibility/2006" xmlns:mv="urn:schemas-microsoft-com:mac:vml" xmlns:p="http://schemas.openxmlformats.org/presentationml/2006/main" xmlns:c="http://schemas.openxmlformats.org/drawingml/2006/chart" xmlns:dgm="http://schemas.openxmlformats.org/drawingml/2006/diagram" xmlns:o="urn:schemas-microsoft-com:office:office" xmlns:v="urn:schemas-microsoft-com:vml" xmlns:pvml="urn:schemas-microsoft-com:office:powerpoint" xmlns:com="http://schemas.openxmlformats.org/drawingml/2006/compatibility" xmlns:p14="http://schemas.microsoft.com/office/powerpoint/2010/main" xmlns:p15="http://schemas.microsoft.com/office/powerpoint/2012/main" showMasterPhAnim="0" showMasterSp="0">
+<p:notes xmlns:a="http://schemas.openxmlformats.org/drawingml/2006/main" xmlns:r="http://schemas.openxmlformats.org/officeDocument/2006/relationships" xmlns:p="http://schemas.openxmlformats.org/presentationml/2006/main" showMasterSp="0" showMasterPhAnim="0">
   <p:cSld>
     <p:spTree>
       <p:nvGrpSpPr>
-        <p:cNvPr id="113" name="Shape 113"/>
+        <p:cNvPr id="1" name="Shape 113"/>
         <p:cNvGrpSpPr/>
         <p:nvPr/>
       </p:nvGrpSpPr>
@@ -1284,9 +1453,11 @@
       <p:sp>
         <p:nvSpPr>
           <p:cNvPr id="114" name="Shape 114"/>
-          <p:cNvSpPr/>
+          <p:cNvSpPr>
+            <a:spLocks noGrp="1" noRot="1" noChangeAspect="1"/>
+          </p:cNvSpPr>
           <p:nvPr>
-            <p:ph idx="2" type="sldImg"/>
+            <p:ph type="sldImg" idx="2"/>
           </p:nvPr>
         </p:nvSpPr>
         <p:spPr>
@@ -1295,8 +1466,13 @@
             <a:ext cx="6096000" cy="3429000"/>
           </a:xfrm>
           <a:custGeom>
+            <a:avLst/>
+            <a:gdLst/>
+            <a:ahLst/>
+            <a:cxnLst/>
+            <a:rect l="0" t="0" r="0" b="0"/>
             <a:pathLst>
-              <a:path extrusionOk="0" h="120000" w="120000">
+              <a:path w="120000" h="120000" extrusionOk="0">
                 <a:moveTo>
                   <a:pt x="0" y="0"/>
                 </a:moveTo>
@@ -1318,9 +1494,11 @@
       <p:sp>
         <p:nvSpPr>
           <p:cNvPr id="115" name="Shape 115"/>
-          <p:cNvSpPr txBox="1"/>
+          <p:cNvSpPr txBox="1">
+            <a:spLocks noGrp="1"/>
+          </p:cNvSpPr>
           <p:nvPr>
-            <p:ph idx="1" type="body"/>
+            <p:ph type="body" idx="1"/>
           </p:nvPr>
         </p:nvSpPr>
         <p:spPr>
@@ -1333,7 +1511,7 @@
           </a:prstGeom>
         </p:spPr>
         <p:txBody>
-          <a:bodyPr anchorCtr="0" anchor="t" bIns="91425" lIns="91425" rIns="91425" tIns="91425">
+          <a:bodyPr lIns="91425" tIns="91425" rIns="91425" bIns="91425" anchor="t" anchorCtr="0">
             <a:noAutofit/>
           </a:bodyPr>
           <a:lstStyle/>
@@ -1344,9 +1522,6 @@
               </a:spcBef>
               <a:buNone/>
             </a:pPr>
-            <a:r>
-              <a:t/>
-            </a:r>
             <a:endParaRPr/>
           </a:p>
         </p:txBody>
@@ -1360,11 +1535,11 @@
 </file>
 
 <file path=ppt/slideLayouts/slideLayout1.xml><?xml version="1.0" encoding="utf-8"?>
-<p:sldLayout xmlns:a="http://schemas.openxmlformats.org/drawingml/2006/main" xmlns:r="http://schemas.openxmlformats.org/officeDocument/2006/relationships" xmlns:mc="http://schemas.openxmlformats.org/markup-compatibility/2006" xmlns:mv="urn:schemas-microsoft-com:mac:vml" xmlns:p="http://schemas.openxmlformats.org/presentationml/2006/main" xmlns:c="http://schemas.openxmlformats.org/drawingml/2006/chart" xmlns:dgm="http://schemas.openxmlformats.org/drawingml/2006/diagram" xmlns:o="urn:schemas-microsoft-com:office:office" xmlns:v="urn:schemas-microsoft-com:vml" xmlns:pvml="urn:schemas-microsoft-com:office:powerpoint" xmlns:com="http://schemas.openxmlformats.org/drawingml/2006/compatibility" xmlns:p14="http://schemas.microsoft.com/office/powerpoint/2010/main" xmlns:p15="http://schemas.microsoft.com/office/powerpoint/2012/main" type="title">
+<p:sldLayout xmlns:a="http://schemas.openxmlformats.org/drawingml/2006/main" xmlns:r="http://schemas.openxmlformats.org/officeDocument/2006/relationships" xmlns:p="http://schemas.openxmlformats.org/presentationml/2006/main" type="title">
   <p:cSld name="Title slide">
     <p:spTree>
       <p:nvGrpSpPr>
-        <p:cNvPr id="9" name="Shape 9"/>
+        <p:cNvPr id="1" name="Shape 9"/>
         <p:cNvGrpSpPr/>
         <p:nvPr/>
       </p:nvGrpSpPr>
@@ -1388,8 +1563,13 @@
             <a:ext cx="1081625" cy="1124950"/>
           </a:xfrm>
           <a:custGeom>
+            <a:avLst/>
+            <a:gdLst/>
+            <a:ahLst/>
+            <a:cxnLst/>
+            <a:rect l="0" t="0" r="0" b="0"/>
             <a:pathLst>
-              <a:path extrusionOk="0" h="44998" w="43265">
+              <a:path w="43265" h="44998" extrusionOk="0">
                 <a:moveTo>
                   <a:pt x="0" y="44998"/>
                 </a:moveTo>
@@ -1403,14 +1583,14 @@
             </a:pathLst>
           </a:custGeom>
           <a:noFill/>
-          <a:ln cap="flat" cmpd="sng" w="28575">
+          <a:ln w="28575" cap="flat" cmpd="sng">
             <a:solidFill>
               <a:schemeClr val="lt2"/>
             </a:solidFill>
             <a:prstDash val="solid"/>
             <a:miter lim="8000"/>
-            <a:headEnd len="med" w="med" type="none"/>
-            <a:tailEnd len="med" w="med" type="none"/>
+            <a:headEnd type="none" w="med" len="med"/>
+            <a:tailEnd type="none" w="med" len="med"/>
           </a:ln>
         </p:spPr>
       </p:sp>
@@ -1426,8 +1606,13 @@
             <a:ext cx="1081625" cy="1124950"/>
           </a:xfrm>
           <a:custGeom>
+            <a:avLst/>
+            <a:gdLst/>
+            <a:ahLst/>
+            <a:cxnLst/>
+            <a:rect l="0" t="0" r="0" b="0"/>
             <a:pathLst>
-              <a:path extrusionOk="0" h="44998" w="43265">
+              <a:path w="43265" h="44998" extrusionOk="0">
                 <a:moveTo>
                   <a:pt x="0" y="44998"/>
                 </a:moveTo>
@@ -1441,21 +1626,23 @@
             </a:pathLst>
           </a:custGeom>
           <a:noFill/>
-          <a:ln cap="flat" cmpd="sng" w="28575">
+          <a:ln w="28575" cap="flat" cmpd="sng">
             <a:solidFill>
               <a:schemeClr val="lt2"/>
             </a:solidFill>
             <a:prstDash val="solid"/>
             <a:miter lim="8000"/>
-            <a:headEnd len="med" w="med" type="none"/>
-            <a:tailEnd len="med" w="med" type="none"/>
+            <a:headEnd type="none" w="med" len="med"/>
+            <a:tailEnd type="none" w="med" len="med"/>
           </a:ln>
         </p:spPr>
       </p:sp>
       <p:sp>
         <p:nvSpPr>
           <p:cNvPr id="12" name="Shape 12"/>
-          <p:cNvSpPr txBox="1"/>
+          <p:cNvSpPr txBox="1">
+            <a:spLocks noGrp="1"/>
+          </p:cNvSpPr>
           <p:nvPr>
             <p:ph type="ctrTitle"/>
           </p:nvPr>
@@ -1470,7 +1657,7 @@
           </a:prstGeom>
         </p:spPr>
         <p:txBody>
-          <a:bodyPr anchorCtr="0" anchor="b" bIns="91425" lIns="91425" rIns="91425" tIns="91425"/>
+          <a:bodyPr lIns="91425" tIns="91425" rIns="91425" bIns="91425" anchor="b" anchorCtr="0"/>
           <a:lstStyle>
             <a:lvl1pPr lvl="0" algn="ctr">
               <a:spcBef>
@@ -1527,15 +1714,19 @@
               <a:defRPr/>
             </a:lvl9pPr>
           </a:lstStyle>
-          <a:p/>
+          <a:p>
+            <a:endParaRPr/>
+          </a:p>
         </p:txBody>
       </p:sp>
       <p:sp>
         <p:nvSpPr>
           <p:cNvPr id="13" name="Shape 13"/>
-          <p:cNvSpPr txBox="1"/>
+          <p:cNvSpPr txBox="1">
+            <a:spLocks noGrp="1"/>
+          </p:cNvSpPr>
           <p:nvPr>
-            <p:ph idx="1" type="subTitle"/>
+            <p:ph type="subTitle" idx="1"/>
           </p:nvPr>
         </p:nvSpPr>
         <p:spPr>
@@ -1548,7 +1739,7 @@
           </a:prstGeom>
         </p:spPr>
         <p:txBody>
-          <a:bodyPr anchorCtr="0" anchor="t" bIns="91425" lIns="91425" rIns="91425" tIns="91425"/>
+          <a:bodyPr lIns="91425" tIns="91425" rIns="91425" bIns="91425" anchor="t" anchorCtr="0"/>
           <a:lstStyle>
             <a:lvl1pPr lvl="0" algn="ctr">
               <a:lnSpc>
@@ -1731,15 +1922,19 @@
               </a:defRPr>
             </a:lvl9pPr>
           </a:lstStyle>
-          <a:p/>
+          <a:p>
+            <a:endParaRPr/>
+          </a:p>
         </p:txBody>
       </p:sp>
       <p:sp>
         <p:nvSpPr>
           <p:cNvPr id="14" name="Shape 14"/>
-          <p:cNvSpPr txBox="1"/>
+          <p:cNvSpPr txBox="1">
+            <a:spLocks noGrp="1"/>
+          </p:cNvSpPr>
           <p:nvPr>
-            <p:ph idx="12" type="sldNum"/>
+            <p:ph type="sldNum" idx="12"/>
           </p:nvPr>
         </p:nvSpPr>
         <p:spPr>
@@ -1752,7 +1947,7 @@
           </a:prstGeom>
         </p:spPr>
         <p:txBody>
-          <a:bodyPr anchorCtr="0" anchor="ctr" bIns="91425" lIns="91425" rIns="91425" tIns="91425">
+          <a:bodyPr lIns="91425" tIns="91425" rIns="91425" bIns="91425" anchor="ctr" anchorCtr="0">
             <a:noAutofit/>
           </a:bodyPr>
           <a:lstStyle/>
@@ -1767,6 +1962,7 @@
               <a:rPr lang="en"/>
               <a:t>‹#›</a:t>
             </a:fld>
+            <a:endParaRPr lang="en"/>
           </a:p>
         </p:txBody>
       </p:sp>
@@ -1779,11 +1975,11 @@
 </file>
 
 <file path=ppt/slideLayouts/slideLayout10.xml><?xml version="1.0" encoding="utf-8"?>
-<p:sldLayout xmlns:a="http://schemas.openxmlformats.org/drawingml/2006/main" xmlns:r="http://schemas.openxmlformats.org/officeDocument/2006/relationships" xmlns:mc="http://schemas.openxmlformats.org/markup-compatibility/2006" xmlns:mv="urn:schemas-microsoft-com:mac:vml" xmlns:p="http://schemas.openxmlformats.org/presentationml/2006/main" xmlns:c="http://schemas.openxmlformats.org/drawingml/2006/chart" xmlns:dgm="http://schemas.openxmlformats.org/drawingml/2006/diagram" xmlns:o="urn:schemas-microsoft-com:office:office" xmlns:v="urn:schemas-microsoft-com:vml" xmlns:pvml="urn:schemas-microsoft-com:office:powerpoint" xmlns:com="http://schemas.openxmlformats.org/drawingml/2006/compatibility" xmlns:p14="http://schemas.microsoft.com/office/powerpoint/2010/main" xmlns:p15="http://schemas.microsoft.com/office/powerpoint/2012/main">
+<p:sldLayout xmlns:a="http://schemas.openxmlformats.org/drawingml/2006/main" xmlns:r="http://schemas.openxmlformats.org/officeDocument/2006/relationships" xmlns:p="http://schemas.openxmlformats.org/presentationml/2006/main">
   <p:cSld name="Big number">
     <p:spTree>
       <p:nvGrpSpPr>
-        <p:cNvPr id="51" name="Shape 51"/>
+        <p:cNvPr id="1" name="Shape 51"/>
         <p:cNvGrpSpPr/>
         <p:nvPr/>
       </p:nvGrpSpPr>
@@ -1817,7 +2013,7 @@
           </a:ln>
         </p:spPr>
         <p:txBody>
-          <a:bodyPr anchorCtr="0" anchor="ctr" bIns="91425" lIns="91425" rIns="91425" tIns="91425">
+          <a:bodyPr lIns="91425" tIns="91425" rIns="91425" bIns="91425" anchor="ctr" anchorCtr="0">
             <a:noAutofit/>
           </a:bodyPr>
           <a:lstStyle/>
@@ -1828,9 +2024,6 @@
               </a:spcBef>
               <a:buNone/>
             </a:pPr>
-            <a:r>
-              <a:t/>
-            </a:r>
             <a:endParaRPr/>
           </a:p>
         </p:txBody>
@@ -1838,7 +2031,9 @@
       <p:sp>
         <p:nvSpPr>
           <p:cNvPr id="53" name="Shape 53"/>
-          <p:cNvSpPr txBox="1"/>
+          <p:cNvSpPr txBox="1">
+            <a:spLocks noGrp="1"/>
+          </p:cNvSpPr>
           <p:nvPr>
             <p:ph type="title"/>
           </p:nvPr>
@@ -1853,7 +2048,7 @@
           </a:prstGeom>
         </p:spPr>
         <p:txBody>
-          <a:bodyPr anchorCtr="0" anchor="ctr" bIns="91425" lIns="91425" rIns="91425" tIns="91425"/>
+          <a:bodyPr lIns="91425" tIns="91425" rIns="91425" bIns="91425" anchor="ctr" anchorCtr="0"/>
           <a:lstStyle>
             <a:lvl1pPr lvl="0" algn="ctr">
               <a:spcBef>
@@ -1982,15 +2177,19 @@
               </a:defRPr>
             </a:lvl9pPr>
           </a:lstStyle>
-          <a:p/>
+          <a:p>
+            <a:endParaRPr/>
+          </a:p>
         </p:txBody>
       </p:sp>
       <p:sp>
         <p:nvSpPr>
           <p:cNvPr id="54" name="Shape 54"/>
-          <p:cNvSpPr txBox="1"/>
+          <p:cNvSpPr txBox="1">
+            <a:spLocks noGrp="1"/>
+          </p:cNvSpPr>
           <p:nvPr>
-            <p:ph idx="1" type="body"/>
+            <p:ph type="body" idx="1"/>
           </p:nvPr>
         </p:nvSpPr>
         <p:spPr>
@@ -2003,7 +2202,7 @@
           </a:prstGeom>
         </p:spPr>
         <p:txBody>
-          <a:bodyPr anchorCtr="0" anchor="t" bIns="91425" lIns="91425" rIns="91425" tIns="91425"/>
+          <a:bodyPr lIns="91425" tIns="91425" rIns="91425" bIns="91425" anchor="t" anchorCtr="0"/>
           <a:lstStyle>
             <a:lvl1pPr lvl="0" algn="ctr">
               <a:spcBef>
@@ -2060,15 +2259,19 @@
               <a:defRPr/>
             </a:lvl9pPr>
           </a:lstStyle>
-          <a:p/>
+          <a:p>
+            <a:endParaRPr/>
+          </a:p>
         </p:txBody>
       </p:sp>
       <p:sp>
         <p:nvSpPr>
           <p:cNvPr id="55" name="Shape 55"/>
-          <p:cNvSpPr txBox="1"/>
+          <p:cNvSpPr txBox="1">
+            <a:spLocks noGrp="1"/>
+          </p:cNvSpPr>
           <p:nvPr>
-            <p:ph idx="12" type="sldNum"/>
+            <p:ph type="sldNum" idx="12"/>
           </p:nvPr>
         </p:nvSpPr>
         <p:spPr>
@@ -2081,7 +2284,7 @@
           </a:prstGeom>
         </p:spPr>
         <p:txBody>
-          <a:bodyPr anchorCtr="0" anchor="ctr" bIns="91425" lIns="91425" rIns="91425" tIns="91425">
+          <a:bodyPr lIns="91425" tIns="91425" rIns="91425" bIns="91425" anchor="ctr" anchorCtr="0">
             <a:noAutofit/>
           </a:bodyPr>
           <a:lstStyle/>
@@ -2096,6 +2299,7 @@
               <a:rPr lang="en"/>
               <a:t>‹#›</a:t>
             </a:fld>
+            <a:endParaRPr lang="en"/>
           </a:p>
         </p:txBody>
       </p:sp>
@@ -2108,11 +2312,11 @@
 </file>
 
 <file path=ppt/slideLayouts/slideLayout11.xml><?xml version="1.0" encoding="utf-8"?>
-<p:sldLayout xmlns:a="http://schemas.openxmlformats.org/drawingml/2006/main" xmlns:r="http://schemas.openxmlformats.org/officeDocument/2006/relationships" xmlns:mc="http://schemas.openxmlformats.org/markup-compatibility/2006" xmlns:mv="urn:schemas-microsoft-com:mac:vml" xmlns:p="http://schemas.openxmlformats.org/presentationml/2006/main" xmlns:c="http://schemas.openxmlformats.org/drawingml/2006/chart" xmlns:dgm="http://schemas.openxmlformats.org/drawingml/2006/diagram" xmlns:o="urn:schemas-microsoft-com:office:office" xmlns:v="urn:schemas-microsoft-com:vml" xmlns:pvml="urn:schemas-microsoft-com:office:powerpoint" xmlns:com="http://schemas.openxmlformats.org/drawingml/2006/compatibility" xmlns:p14="http://schemas.microsoft.com/office/powerpoint/2010/main" xmlns:p15="http://schemas.microsoft.com/office/powerpoint/2012/main" type="blank">
+<p:sldLayout xmlns:a="http://schemas.openxmlformats.org/drawingml/2006/main" xmlns:r="http://schemas.openxmlformats.org/officeDocument/2006/relationships" xmlns:p="http://schemas.openxmlformats.org/presentationml/2006/main" type="blank">
   <p:cSld name="Blank">
     <p:spTree>
       <p:nvGrpSpPr>
-        <p:cNvPr id="56" name="Shape 56"/>
+        <p:cNvPr id="1" name="Shape 56"/>
         <p:cNvGrpSpPr/>
         <p:nvPr/>
       </p:nvGrpSpPr>
@@ -2127,9 +2331,11 @@
       <p:sp>
         <p:nvSpPr>
           <p:cNvPr id="57" name="Shape 57"/>
-          <p:cNvSpPr txBox="1"/>
+          <p:cNvSpPr txBox="1">
+            <a:spLocks noGrp="1"/>
+          </p:cNvSpPr>
           <p:nvPr>
-            <p:ph idx="12" type="sldNum"/>
+            <p:ph type="sldNum" idx="12"/>
           </p:nvPr>
         </p:nvSpPr>
         <p:spPr>
@@ -2142,7 +2348,7 @@
           </a:prstGeom>
         </p:spPr>
         <p:txBody>
-          <a:bodyPr anchorCtr="0" anchor="ctr" bIns="91425" lIns="91425" rIns="91425" tIns="91425">
+          <a:bodyPr lIns="91425" tIns="91425" rIns="91425" bIns="91425" anchor="ctr" anchorCtr="0">
             <a:noAutofit/>
           </a:bodyPr>
           <a:lstStyle/>
@@ -2157,6 +2363,7 @@
               <a:rPr lang="en"/>
               <a:t>‹#›</a:t>
             </a:fld>
+            <a:endParaRPr lang="en"/>
           </a:p>
         </p:txBody>
       </p:sp>
@@ -2169,11 +2376,11 @@
 </file>
 
 <file path=ppt/slideLayouts/slideLayout2.xml><?xml version="1.0" encoding="utf-8"?>
-<p:sldLayout xmlns:a="http://schemas.openxmlformats.org/drawingml/2006/main" xmlns:r="http://schemas.openxmlformats.org/officeDocument/2006/relationships" xmlns:mc="http://schemas.openxmlformats.org/markup-compatibility/2006" xmlns:mv="urn:schemas-microsoft-com:mac:vml" xmlns:p="http://schemas.openxmlformats.org/presentationml/2006/main" xmlns:c="http://schemas.openxmlformats.org/drawingml/2006/chart" xmlns:dgm="http://schemas.openxmlformats.org/drawingml/2006/diagram" xmlns:o="urn:schemas-microsoft-com:office:office" xmlns:v="urn:schemas-microsoft-com:vml" xmlns:pvml="urn:schemas-microsoft-com:office:powerpoint" xmlns:com="http://schemas.openxmlformats.org/drawingml/2006/compatibility" xmlns:p14="http://schemas.microsoft.com/office/powerpoint/2010/main" xmlns:p15="http://schemas.microsoft.com/office/powerpoint/2012/main" type="secHead">
+<p:sldLayout xmlns:a="http://schemas.openxmlformats.org/drawingml/2006/main" xmlns:r="http://schemas.openxmlformats.org/officeDocument/2006/relationships" xmlns:p="http://schemas.openxmlformats.org/presentationml/2006/main" type="secHead">
   <p:cSld name="Section header">
     <p:spTree>
       <p:nvGrpSpPr>
-        <p:cNvPr id="15" name="Shape 15"/>
+        <p:cNvPr id="1" name="Shape 15"/>
         <p:cNvGrpSpPr/>
         <p:nvPr/>
       </p:nvGrpSpPr>
@@ -2197,8 +2404,13 @@
             <a:ext cx="1081625" cy="1124950"/>
           </a:xfrm>
           <a:custGeom>
+            <a:avLst/>
+            <a:gdLst/>
+            <a:ahLst/>
+            <a:cxnLst/>
+            <a:rect l="0" t="0" r="0" b="0"/>
             <a:pathLst>
-              <a:path extrusionOk="0" h="44998" w="43265">
+              <a:path w="43265" h="44998" extrusionOk="0">
                 <a:moveTo>
                   <a:pt x="0" y="44998"/>
                 </a:moveTo>
@@ -2212,14 +2424,14 @@
             </a:pathLst>
           </a:custGeom>
           <a:noFill/>
-          <a:ln cap="flat" cmpd="sng" w="28575">
+          <a:ln w="28575" cap="flat" cmpd="sng">
             <a:solidFill>
               <a:schemeClr val="lt2"/>
             </a:solidFill>
             <a:prstDash val="solid"/>
             <a:miter lim="8000"/>
-            <a:headEnd len="med" w="med" type="none"/>
-            <a:tailEnd len="med" w="med" type="none"/>
+            <a:headEnd type="none" w="med" len="med"/>
+            <a:tailEnd type="none" w="med" len="med"/>
           </a:ln>
         </p:spPr>
       </p:sp>
@@ -2230,13 +2442,18 @@
           <p:nvPr/>
         </p:nvSpPr>
         <p:spPr>
-          <a:xfrm flipH="1" rot="10800000">
+          <a:xfrm rot="10800000" flipH="1">
             <a:off x="466425" y="3558325"/>
             <a:ext cx="1081625" cy="1124950"/>
           </a:xfrm>
           <a:custGeom>
+            <a:avLst/>
+            <a:gdLst/>
+            <a:ahLst/>
+            <a:cxnLst/>
+            <a:rect l="0" t="0" r="0" b="0"/>
             <a:pathLst>
-              <a:path extrusionOk="0" h="44998" w="43265">
+              <a:path w="43265" h="44998" extrusionOk="0">
                 <a:moveTo>
                   <a:pt x="0" y="44998"/>
                 </a:moveTo>
@@ -2250,21 +2467,23 @@
             </a:pathLst>
           </a:custGeom>
           <a:noFill/>
-          <a:ln cap="flat" cmpd="sng" w="28575">
+          <a:ln w="28575" cap="flat" cmpd="sng">
             <a:solidFill>
               <a:schemeClr val="lt2"/>
             </a:solidFill>
             <a:prstDash val="solid"/>
             <a:miter lim="8000"/>
-            <a:headEnd len="med" w="med" type="none"/>
-            <a:tailEnd len="med" w="med" type="none"/>
+            <a:headEnd type="none" w="med" len="med"/>
+            <a:tailEnd type="none" w="med" len="med"/>
           </a:ln>
         </p:spPr>
       </p:sp>
       <p:sp>
         <p:nvSpPr>
           <p:cNvPr id="18" name="Shape 18"/>
-          <p:cNvSpPr txBox="1"/>
+          <p:cNvSpPr txBox="1">
+            <a:spLocks noGrp="1"/>
+          </p:cNvSpPr>
           <p:nvPr>
             <p:ph type="title"/>
           </p:nvPr>
@@ -2279,7 +2498,7 @@
           </a:prstGeom>
         </p:spPr>
         <p:txBody>
-          <a:bodyPr anchorCtr="0" anchor="ctr" bIns="91425" lIns="91425" rIns="91425" tIns="91425"/>
+          <a:bodyPr lIns="91425" tIns="91425" rIns="91425" bIns="91425" anchor="ctr" anchorCtr="0"/>
           <a:lstStyle>
             <a:lvl1pPr lvl="0" algn="ctr">
               <a:spcBef>
@@ -2336,15 +2555,19 @@
               <a:defRPr/>
             </a:lvl9pPr>
           </a:lstStyle>
-          <a:p/>
+          <a:p>
+            <a:endParaRPr/>
+          </a:p>
         </p:txBody>
       </p:sp>
       <p:sp>
         <p:nvSpPr>
           <p:cNvPr id="19" name="Shape 19"/>
-          <p:cNvSpPr txBox="1"/>
+          <p:cNvSpPr txBox="1">
+            <a:spLocks noGrp="1"/>
+          </p:cNvSpPr>
           <p:nvPr>
-            <p:ph idx="12" type="sldNum"/>
+            <p:ph type="sldNum" idx="12"/>
           </p:nvPr>
         </p:nvSpPr>
         <p:spPr>
@@ -2357,7 +2580,7 @@
           </a:prstGeom>
         </p:spPr>
         <p:txBody>
-          <a:bodyPr anchorCtr="0" anchor="ctr" bIns="91425" lIns="91425" rIns="91425" tIns="91425">
+          <a:bodyPr lIns="91425" tIns="91425" rIns="91425" bIns="91425" anchor="ctr" anchorCtr="0">
             <a:noAutofit/>
           </a:bodyPr>
           <a:lstStyle/>
@@ -2372,6 +2595,7 @@
               <a:rPr lang="en"/>
               <a:t>‹#›</a:t>
             </a:fld>
+            <a:endParaRPr lang="en"/>
           </a:p>
         </p:txBody>
       </p:sp>
@@ -2384,11 +2608,11 @@
 </file>
 
 <file path=ppt/slideLayouts/slideLayout3.xml><?xml version="1.0" encoding="utf-8"?>
-<p:sldLayout xmlns:a="http://schemas.openxmlformats.org/drawingml/2006/main" xmlns:r="http://schemas.openxmlformats.org/officeDocument/2006/relationships" xmlns:mc="http://schemas.openxmlformats.org/markup-compatibility/2006" xmlns:mv="urn:schemas-microsoft-com:mac:vml" xmlns:p="http://schemas.openxmlformats.org/presentationml/2006/main" xmlns:c="http://schemas.openxmlformats.org/drawingml/2006/chart" xmlns:dgm="http://schemas.openxmlformats.org/drawingml/2006/diagram" xmlns:o="urn:schemas-microsoft-com:office:office" xmlns:v="urn:schemas-microsoft-com:vml" xmlns:pvml="urn:schemas-microsoft-com:office:powerpoint" xmlns:com="http://schemas.openxmlformats.org/drawingml/2006/compatibility" xmlns:p14="http://schemas.microsoft.com/office/powerpoint/2010/main" xmlns:p15="http://schemas.microsoft.com/office/powerpoint/2012/main" type="tx">
+<p:sldLayout xmlns:a="http://schemas.openxmlformats.org/drawingml/2006/main" xmlns:r="http://schemas.openxmlformats.org/officeDocument/2006/relationships" xmlns:p="http://schemas.openxmlformats.org/presentationml/2006/main" type="tx">
   <p:cSld name="Title and body">
     <p:spTree>
       <p:nvGrpSpPr>
-        <p:cNvPr id="20" name="Shape 20"/>
+        <p:cNvPr id="1" name="Shape 20"/>
         <p:cNvGrpSpPr/>
         <p:nvPr/>
       </p:nvGrpSpPr>
@@ -2422,7 +2646,7 @@
           </a:ln>
         </p:spPr>
         <p:txBody>
-          <a:bodyPr anchorCtr="0" anchor="ctr" bIns="91425" lIns="91425" rIns="91425" tIns="91425">
+          <a:bodyPr lIns="91425" tIns="91425" rIns="91425" bIns="91425" anchor="ctr" anchorCtr="0">
             <a:noAutofit/>
           </a:bodyPr>
           <a:lstStyle/>
@@ -2433,9 +2657,6 @@
               </a:spcBef>
               <a:buNone/>
             </a:pPr>
-            <a:r>
-              <a:t/>
-            </a:r>
             <a:endParaRPr/>
           </a:p>
         </p:txBody>
@@ -2443,7 +2664,9 @@
       <p:sp>
         <p:nvSpPr>
           <p:cNvPr id="22" name="Shape 22"/>
-          <p:cNvSpPr txBox="1"/>
+          <p:cNvSpPr txBox="1">
+            <a:spLocks noGrp="1"/>
+          </p:cNvSpPr>
           <p:nvPr>
             <p:ph type="title"/>
           </p:nvPr>
@@ -2458,7 +2681,7 @@
           </a:prstGeom>
         </p:spPr>
         <p:txBody>
-          <a:bodyPr anchorCtr="0" anchor="b" bIns="91425" lIns="91425" rIns="91425" tIns="91425"/>
+          <a:bodyPr lIns="91425" tIns="91425" rIns="91425" bIns="91425" anchor="b" anchorCtr="0"/>
           <a:lstStyle>
             <a:lvl1pPr lvl="0">
               <a:spcBef>
@@ -2515,15 +2738,19 @@
               <a:defRPr/>
             </a:lvl9pPr>
           </a:lstStyle>
-          <a:p/>
+          <a:p>
+            <a:endParaRPr/>
+          </a:p>
         </p:txBody>
       </p:sp>
       <p:sp>
         <p:nvSpPr>
           <p:cNvPr id="23" name="Shape 23"/>
-          <p:cNvSpPr txBox="1"/>
+          <p:cNvSpPr txBox="1">
+            <a:spLocks noGrp="1"/>
+          </p:cNvSpPr>
           <p:nvPr>
-            <p:ph idx="1" type="body"/>
+            <p:ph type="body" idx="1"/>
           </p:nvPr>
         </p:nvSpPr>
         <p:spPr>
@@ -2536,7 +2763,7 @@
           </a:prstGeom>
         </p:spPr>
         <p:txBody>
-          <a:bodyPr anchorCtr="0" anchor="t" bIns="91425" lIns="91425" rIns="91425" tIns="91425"/>
+          <a:bodyPr lIns="91425" tIns="91425" rIns="91425" bIns="91425" anchor="t" anchorCtr="0"/>
           <a:lstStyle>
             <a:lvl1pPr lvl="0">
               <a:spcBef>
@@ -2593,15 +2820,19 @@
               <a:defRPr/>
             </a:lvl9pPr>
           </a:lstStyle>
-          <a:p/>
+          <a:p>
+            <a:endParaRPr/>
+          </a:p>
         </p:txBody>
       </p:sp>
       <p:sp>
         <p:nvSpPr>
           <p:cNvPr id="24" name="Shape 24"/>
-          <p:cNvSpPr txBox="1"/>
+          <p:cNvSpPr txBox="1">
+            <a:spLocks noGrp="1"/>
+          </p:cNvSpPr>
           <p:nvPr>
-            <p:ph idx="12" type="sldNum"/>
+            <p:ph type="sldNum" idx="12"/>
           </p:nvPr>
         </p:nvSpPr>
         <p:spPr>
@@ -2614,7 +2845,7 @@
           </a:prstGeom>
         </p:spPr>
         <p:txBody>
-          <a:bodyPr anchorCtr="0" anchor="ctr" bIns="91425" lIns="91425" rIns="91425" tIns="91425">
+          <a:bodyPr lIns="91425" tIns="91425" rIns="91425" bIns="91425" anchor="ctr" anchorCtr="0">
             <a:noAutofit/>
           </a:bodyPr>
           <a:lstStyle/>
@@ -2629,6 +2860,7 @@
               <a:rPr lang="en"/>
               <a:t>‹#›</a:t>
             </a:fld>
+            <a:endParaRPr lang="en"/>
           </a:p>
         </p:txBody>
       </p:sp>
@@ -2641,11 +2873,11 @@
 </file>
 
 <file path=ppt/slideLayouts/slideLayout4.xml><?xml version="1.0" encoding="utf-8"?>
-<p:sldLayout xmlns:a="http://schemas.openxmlformats.org/drawingml/2006/main" xmlns:r="http://schemas.openxmlformats.org/officeDocument/2006/relationships" xmlns:mc="http://schemas.openxmlformats.org/markup-compatibility/2006" xmlns:mv="urn:schemas-microsoft-com:mac:vml" xmlns:p="http://schemas.openxmlformats.org/presentationml/2006/main" xmlns:c="http://schemas.openxmlformats.org/drawingml/2006/chart" xmlns:dgm="http://schemas.openxmlformats.org/drawingml/2006/diagram" xmlns:o="urn:schemas-microsoft-com:office:office" xmlns:v="urn:schemas-microsoft-com:vml" xmlns:pvml="urn:schemas-microsoft-com:office:powerpoint" xmlns:com="http://schemas.openxmlformats.org/drawingml/2006/compatibility" xmlns:p14="http://schemas.microsoft.com/office/powerpoint/2010/main" xmlns:p15="http://schemas.microsoft.com/office/powerpoint/2012/main" type="twoColTx">
+<p:sldLayout xmlns:a="http://schemas.openxmlformats.org/drawingml/2006/main" xmlns:r="http://schemas.openxmlformats.org/officeDocument/2006/relationships" xmlns:p="http://schemas.openxmlformats.org/presentationml/2006/main" type="twoColTx">
   <p:cSld name="Title and two columns">
     <p:spTree>
       <p:nvGrpSpPr>
-        <p:cNvPr id="25" name="Shape 25"/>
+        <p:cNvPr id="1" name="Shape 25"/>
         <p:cNvGrpSpPr/>
         <p:nvPr/>
       </p:nvGrpSpPr>
@@ -2660,7 +2892,9 @@
       <p:sp>
         <p:nvSpPr>
           <p:cNvPr id="26" name="Shape 26"/>
-          <p:cNvSpPr txBox="1"/>
+          <p:cNvSpPr txBox="1">
+            <a:spLocks noGrp="1"/>
+          </p:cNvSpPr>
           <p:nvPr>
             <p:ph type="title"/>
           </p:nvPr>
@@ -2675,7 +2909,7 @@
           </a:prstGeom>
         </p:spPr>
         <p:txBody>
-          <a:bodyPr anchorCtr="0" anchor="b" bIns="91425" lIns="91425" rIns="91425" tIns="91425"/>
+          <a:bodyPr lIns="91425" tIns="91425" rIns="91425" bIns="91425" anchor="b" anchorCtr="0"/>
           <a:lstStyle>
             <a:lvl1pPr lvl="0">
               <a:spcBef>
@@ -2732,15 +2966,19 @@
               <a:defRPr/>
             </a:lvl9pPr>
           </a:lstStyle>
-          <a:p/>
+          <a:p>
+            <a:endParaRPr/>
+          </a:p>
         </p:txBody>
       </p:sp>
       <p:sp>
         <p:nvSpPr>
           <p:cNvPr id="27" name="Shape 27"/>
-          <p:cNvSpPr txBox="1"/>
+          <p:cNvSpPr txBox="1">
+            <a:spLocks noGrp="1"/>
+          </p:cNvSpPr>
           <p:nvPr>
-            <p:ph idx="1" type="body"/>
+            <p:ph type="body" idx="1"/>
           </p:nvPr>
         </p:nvSpPr>
         <p:spPr>
@@ -2753,7 +2991,7 @@
           </a:prstGeom>
         </p:spPr>
         <p:txBody>
-          <a:bodyPr anchorCtr="0" anchor="t" bIns="91425" lIns="91425" rIns="91425" tIns="91425"/>
+          <a:bodyPr lIns="91425" tIns="91425" rIns="91425" bIns="91425" anchor="t" anchorCtr="0"/>
           <a:lstStyle>
             <a:lvl1pPr lvl="0">
               <a:spcBef>
@@ -2819,15 +3057,19 @@
               <a:defRPr sz="1200"/>
             </a:lvl9pPr>
           </a:lstStyle>
-          <a:p/>
+          <a:p>
+            <a:endParaRPr/>
+          </a:p>
         </p:txBody>
       </p:sp>
       <p:sp>
         <p:nvSpPr>
           <p:cNvPr id="28" name="Shape 28"/>
-          <p:cNvSpPr txBox="1"/>
+          <p:cNvSpPr txBox="1">
+            <a:spLocks noGrp="1"/>
+          </p:cNvSpPr>
           <p:nvPr>
-            <p:ph idx="2" type="body"/>
+            <p:ph type="body" idx="2"/>
           </p:nvPr>
         </p:nvSpPr>
         <p:spPr>
@@ -2840,7 +3082,7 @@
           </a:prstGeom>
         </p:spPr>
         <p:txBody>
-          <a:bodyPr anchorCtr="0" anchor="t" bIns="91425" lIns="91425" rIns="91425" tIns="91425"/>
+          <a:bodyPr lIns="91425" tIns="91425" rIns="91425" bIns="91425" anchor="t" anchorCtr="0"/>
           <a:lstStyle>
             <a:lvl1pPr lvl="0">
               <a:spcBef>
@@ -2906,15 +3148,19 @@
               <a:defRPr sz="1200"/>
             </a:lvl9pPr>
           </a:lstStyle>
-          <a:p/>
+          <a:p>
+            <a:endParaRPr/>
+          </a:p>
         </p:txBody>
       </p:sp>
       <p:sp>
         <p:nvSpPr>
           <p:cNvPr id="29" name="Shape 29"/>
-          <p:cNvSpPr txBox="1"/>
+          <p:cNvSpPr txBox="1">
+            <a:spLocks noGrp="1"/>
+          </p:cNvSpPr>
           <p:nvPr>
-            <p:ph idx="12" type="sldNum"/>
+            <p:ph type="sldNum" idx="12"/>
           </p:nvPr>
         </p:nvSpPr>
         <p:spPr>
@@ -2927,7 +3173,7 @@
           </a:prstGeom>
         </p:spPr>
         <p:txBody>
-          <a:bodyPr anchorCtr="0" anchor="ctr" bIns="91425" lIns="91425" rIns="91425" tIns="91425">
+          <a:bodyPr lIns="91425" tIns="91425" rIns="91425" bIns="91425" anchor="ctr" anchorCtr="0">
             <a:noAutofit/>
           </a:bodyPr>
           <a:lstStyle/>
@@ -2942,6 +3188,7 @@
               <a:rPr lang="en"/>
               <a:t>‹#›</a:t>
             </a:fld>
+            <a:endParaRPr lang="en"/>
           </a:p>
         </p:txBody>
       </p:sp>
@@ -2954,11 +3201,11 @@
 </file>
 
 <file path=ppt/slideLayouts/slideLayout5.xml><?xml version="1.0" encoding="utf-8"?>
-<p:sldLayout xmlns:a="http://schemas.openxmlformats.org/drawingml/2006/main" xmlns:r="http://schemas.openxmlformats.org/officeDocument/2006/relationships" xmlns:mc="http://schemas.openxmlformats.org/markup-compatibility/2006" xmlns:mv="urn:schemas-microsoft-com:mac:vml" xmlns:p="http://schemas.openxmlformats.org/presentationml/2006/main" xmlns:c="http://schemas.openxmlformats.org/drawingml/2006/chart" xmlns:dgm="http://schemas.openxmlformats.org/drawingml/2006/diagram" xmlns:o="urn:schemas-microsoft-com:office:office" xmlns:v="urn:schemas-microsoft-com:vml" xmlns:pvml="urn:schemas-microsoft-com:office:powerpoint" xmlns:com="http://schemas.openxmlformats.org/drawingml/2006/compatibility" xmlns:p14="http://schemas.microsoft.com/office/powerpoint/2010/main" xmlns:p15="http://schemas.microsoft.com/office/powerpoint/2012/main" type="titleOnly">
+<p:sldLayout xmlns:a="http://schemas.openxmlformats.org/drawingml/2006/main" xmlns:r="http://schemas.openxmlformats.org/officeDocument/2006/relationships" xmlns:p="http://schemas.openxmlformats.org/presentationml/2006/main" type="titleOnly">
   <p:cSld name="Title only">
     <p:spTree>
       <p:nvGrpSpPr>
-        <p:cNvPr id="30" name="Shape 30"/>
+        <p:cNvPr id="1" name="Shape 30"/>
         <p:cNvGrpSpPr/>
         <p:nvPr/>
       </p:nvGrpSpPr>
@@ -2973,7 +3220,9 @@
       <p:sp>
         <p:nvSpPr>
           <p:cNvPr id="31" name="Shape 31"/>
-          <p:cNvSpPr txBox="1"/>
+          <p:cNvSpPr txBox="1">
+            <a:spLocks noGrp="1"/>
+          </p:cNvSpPr>
           <p:nvPr>
             <p:ph type="title"/>
           </p:nvPr>
@@ -2988,7 +3237,7 @@
           </a:prstGeom>
         </p:spPr>
         <p:txBody>
-          <a:bodyPr anchorCtr="0" anchor="b" bIns="91425" lIns="91425" rIns="91425" tIns="91425"/>
+          <a:bodyPr lIns="91425" tIns="91425" rIns="91425" bIns="91425" anchor="b" anchorCtr="0"/>
           <a:lstStyle>
             <a:lvl1pPr lvl="0">
               <a:spcBef>
@@ -3045,15 +3294,19 @@
               <a:defRPr/>
             </a:lvl9pPr>
           </a:lstStyle>
-          <a:p/>
+          <a:p>
+            <a:endParaRPr/>
+          </a:p>
         </p:txBody>
       </p:sp>
       <p:sp>
         <p:nvSpPr>
           <p:cNvPr id="32" name="Shape 32"/>
-          <p:cNvSpPr txBox="1"/>
+          <p:cNvSpPr txBox="1">
+            <a:spLocks noGrp="1"/>
+          </p:cNvSpPr>
           <p:nvPr>
-            <p:ph idx="12" type="sldNum"/>
+            <p:ph type="sldNum" idx="12"/>
           </p:nvPr>
         </p:nvSpPr>
         <p:spPr>
@@ -3066,7 +3319,7 @@
           </a:prstGeom>
         </p:spPr>
         <p:txBody>
-          <a:bodyPr anchorCtr="0" anchor="ctr" bIns="91425" lIns="91425" rIns="91425" tIns="91425">
+          <a:bodyPr lIns="91425" tIns="91425" rIns="91425" bIns="91425" anchor="ctr" anchorCtr="0">
             <a:noAutofit/>
           </a:bodyPr>
           <a:lstStyle/>
@@ -3081,6 +3334,7 @@
               <a:rPr lang="en"/>
               <a:t>‹#›</a:t>
             </a:fld>
+            <a:endParaRPr lang="en"/>
           </a:p>
         </p:txBody>
       </p:sp>
@@ -3093,11 +3347,11 @@
 </file>
 
 <file path=ppt/slideLayouts/slideLayout6.xml><?xml version="1.0" encoding="utf-8"?>
-<p:sldLayout xmlns:a="http://schemas.openxmlformats.org/drawingml/2006/main" xmlns:r="http://schemas.openxmlformats.org/officeDocument/2006/relationships" xmlns:mc="http://schemas.openxmlformats.org/markup-compatibility/2006" xmlns:mv="urn:schemas-microsoft-com:mac:vml" xmlns:p="http://schemas.openxmlformats.org/presentationml/2006/main" xmlns:c="http://schemas.openxmlformats.org/drawingml/2006/chart" xmlns:dgm="http://schemas.openxmlformats.org/drawingml/2006/diagram" xmlns:o="urn:schemas-microsoft-com:office:office" xmlns:v="urn:schemas-microsoft-com:vml" xmlns:pvml="urn:schemas-microsoft-com:office:powerpoint" xmlns:com="http://schemas.openxmlformats.org/drawingml/2006/compatibility" xmlns:p14="http://schemas.microsoft.com/office/powerpoint/2010/main" xmlns:p15="http://schemas.microsoft.com/office/powerpoint/2012/main">
+<p:sldLayout xmlns:a="http://schemas.openxmlformats.org/drawingml/2006/main" xmlns:r="http://schemas.openxmlformats.org/officeDocument/2006/relationships" xmlns:p="http://schemas.openxmlformats.org/presentationml/2006/main">
   <p:cSld name="One column text">
     <p:spTree>
       <p:nvGrpSpPr>
-        <p:cNvPr id="33" name="Shape 33"/>
+        <p:cNvPr id="1" name="Shape 33"/>
         <p:cNvGrpSpPr/>
         <p:nvPr/>
       </p:nvGrpSpPr>
@@ -3112,7 +3366,9 @@
       <p:sp>
         <p:nvSpPr>
           <p:cNvPr id="34" name="Shape 34"/>
-          <p:cNvSpPr txBox="1"/>
+          <p:cNvSpPr txBox="1">
+            <a:spLocks noGrp="1"/>
+          </p:cNvSpPr>
           <p:nvPr>
             <p:ph type="title"/>
           </p:nvPr>
@@ -3127,7 +3383,7 @@
           </a:prstGeom>
         </p:spPr>
         <p:txBody>
-          <a:bodyPr anchorCtr="0" anchor="b" bIns="91425" lIns="91425" rIns="91425" tIns="91425"/>
+          <a:bodyPr lIns="91425" tIns="91425" rIns="91425" bIns="91425" anchor="b" anchorCtr="0"/>
           <a:lstStyle>
             <a:lvl1pPr lvl="0">
               <a:spcBef>
@@ -3193,15 +3449,19 @@
               <a:defRPr sz="3000"/>
             </a:lvl9pPr>
           </a:lstStyle>
-          <a:p/>
+          <a:p>
+            <a:endParaRPr/>
+          </a:p>
         </p:txBody>
       </p:sp>
       <p:sp>
         <p:nvSpPr>
           <p:cNvPr id="35" name="Shape 35"/>
-          <p:cNvSpPr txBox="1"/>
+          <p:cNvSpPr txBox="1">
+            <a:spLocks noGrp="1"/>
+          </p:cNvSpPr>
           <p:nvPr>
-            <p:ph idx="1" type="body"/>
+            <p:ph type="body" idx="1"/>
           </p:nvPr>
         </p:nvSpPr>
         <p:spPr>
@@ -3214,7 +3474,7 @@
           </a:prstGeom>
         </p:spPr>
         <p:txBody>
-          <a:bodyPr anchorCtr="0" anchor="t" bIns="91425" lIns="91425" rIns="91425" tIns="91425"/>
+          <a:bodyPr lIns="91425" tIns="91425" rIns="91425" bIns="91425" anchor="t" anchorCtr="0"/>
           <a:lstStyle>
             <a:lvl1pPr lvl="0">
               <a:spcBef>
@@ -3280,15 +3540,19 @@
               <a:defRPr sz="1200"/>
             </a:lvl9pPr>
           </a:lstStyle>
-          <a:p/>
+          <a:p>
+            <a:endParaRPr/>
+          </a:p>
         </p:txBody>
       </p:sp>
       <p:sp>
         <p:nvSpPr>
           <p:cNvPr id="36" name="Shape 36"/>
-          <p:cNvSpPr txBox="1"/>
+          <p:cNvSpPr txBox="1">
+            <a:spLocks noGrp="1"/>
+          </p:cNvSpPr>
           <p:nvPr>
-            <p:ph idx="12" type="sldNum"/>
+            <p:ph type="sldNum" idx="12"/>
           </p:nvPr>
         </p:nvSpPr>
         <p:spPr>
@@ -3301,7 +3565,7 @@
           </a:prstGeom>
         </p:spPr>
         <p:txBody>
-          <a:bodyPr anchorCtr="0" anchor="ctr" bIns="91425" lIns="91425" rIns="91425" tIns="91425">
+          <a:bodyPr lIns="91425" tIns="91425" rIns="91425" bIns="91425" anchor="ctr" anchorCtr="0">
             <a:noAutofit/>
           </a:bodyPr>
           <a:lstStyle/>
@@ -3316,6 +3580,7 @@
               <a:rPr lang="en"/>
               <a:t>‹#›</a:t>
             </a:fld>
+            <a:endParaRPr lang="en"/>
           </a:p>
         </p:txBody>
       </p:sp>
@@ -3328,11 +3593,11 @@
 </file>
 
 <file path=ppt/slideLayouts/slideLayout7.xml><?xml version="1.0" encoding="utf-8"?>
-<p:sldLayout xmlns:a="http://schemas.openxmlformats.org/drawingml/2006/main" xmlns:r="http://schemas.openxmlformats.org/officeDocument/2006/relationships" xmlns:mc="http://schemas.openxmlformats.org/markup-compatibility/2006" xmlns:mv="urn:schemas-microsoft-com:mac:vml" xmlns:p="http://schemas.openxmlformats.org/presentationml/2006/main" xmlns:c="http://schemas.openxmlformats.org/drawingml/2006/chart" xmlns:dgm="http://schemas.openxmlformats.org/drawingml/2006/diagram" xmlns:o="urn:schemas-microsoft-com:office:office" xmlns:v="urn:schemas-microsoft-com:vml" xmlns:pvml="urn:schemas-microsoft-com:office:powerpoint" xmlns:com="http://schemas.openxmlformats.org/drawingml/2006/compatibility" xmlns:p14="http://schemas.microsoft.com/office/powerpoint/2010/main" xmlns:p15="http://schemas.microsoft.com/office/powerpoint/2012/main">
+<p:sldLayout xmlns:a="http://schemas.openxmlformats.org/drawingml/2006/main" xmlns:r="http://schemas.openxmlformats.org/officeDocument/2006/relationships" xmlns:p="http://schemas.openxmlformats.org/presentationml/2006/main">
   <p:cSld name="Main point">
     <p:spTree>
       <p:nvGrpSpPr>
-        <p:cNvPr id="37" name="Shape 37"/>
+        <p:cNvPr id="1" name="Shape 37"/>
         <p:cNvGrpSpPr/>
         <p:nvPr/>
       </p:nvGrpSpPr>
@@ -3366,7 +3631,7 @@
           </a:ln>
         </p:spPr>
         <p:txBody>
-          <a:bodyPr anchorCtr="0" anchor="ctr" bIns="91425" lIns="91425" rIns="91425" tIns="91425">
+          <a:bodyPr lIns="91425" tIns="91425" rIns="91425" bIns="91425" anchor="ctr" anchorCtr="0">
             <a:noAutofit/>
           </a:bodyPr>
           <a:lstStyle/>
@@ -3377,9 +3642,6 @@
               </a:spcBef>
               <a:buNone/>
             </a:pPr>
-            <a:r>
-              <a:t/>
-            </a:r>
             <a:endParaRPr/>
           </a:p>
         </p:txBody>
@@ -3387,7 +3649,9 @@
       <p:sp>
         <p:nvSpPr>
           <p:cNvPr id="39" name="Shape 39"/>
-          <p:cNvSpPr txBox="1"/>
+          <p:cNvSpPr txBox="1">
+            <a:spLocks noGrp="1"/>
+          </p:cNvSpPr>
           <p:nvPr>
             <p:ph type="title"/>
           </p:nvPr>
@@ -3402,7 +3666,7 @@
           </a:prstGeom>
         </p:spPr>
         <p:txBody>
-          <a:bodyPr anchorCtr="0" anchor="ctr" bIns="91425" lIns="91425" rIns="91425" tIns="91425"/>
+          <a:bodyPr lIns="91425" tIns="91425" rIns="91425" bIns="91425" anchor="ctr" anchorCtr="0"/>
           <a:lstStyle>
             <a:lvl1pPr lvl="0">
               <a:spcBef>
@@ -3468,15 +3732,19 @@
               <a:defRPr sz="4800"/>
             </a:lvl9pPr>
           </a:lstStyle>
-          <a:p/>
+          <a:p>
+            <a:endParaRPr/>
+          </a:p>
         </p:txBody>
       </p:sp>
       <p:sp>
         <p:nvSpPr>
           <p:cNvPr id="40" name="Shape 40"/>
-          <p:cNvSpPr txBox="1"/>
+          <p:cNvSpPr txBox="1">
+            <a:spLocks noGrp="1"/>
+          </p:cNvSpPr>
           <p:nvPr>
-            <p:ph idx="12" type="sldNum"/>
+            <p:ph type="sldNum" idx="12"/>
           </p:nvPr>
         </p:nvSpPr>
         <p:spPr>
@@ -3489,7 +3757,7 @@
           </a:prstGeom>
         </p:spPr>
         <p:txBody>
-          <a:bodyPr anchorCtr="0" anchor="ctr" bIns="91425" lIns="91425" rIns="91425" tIns="91425">
+          <a:bodyPr lIns="91425" tIns="91425" rIns="91425" bIns="91425" anchor="ctr" anchorCtr="0">
             <a:noAutofit/>
           </a:bodyPr>
           <a:lstStyle/>
@@ -3504,6 +3772,7 @@
               <a:rPr lang="en"/>
               <a:t>‹#›</a:t>
             </a:fld>
+            <a:endParaRPr lang="en"/>
           </a:p>
         </p:txBody>
       </p:sp>
@@ -3516,11 +3785,11 @@
 </file>
 
 <file path=ppt/slideLayouts/slideLayout8.xml><?xml version="1.0" encoding="utf-8"?>
-<p:sldLayout xmlns:a="http://schemas.openxmlformats.org/drawingml/2006/main" xmlns:r="http://schemas.openxmlformats.org/officeDocument/2006/relationships" xmlns:mc="http://schemas.openxmlformats.org/markup-compatibility/2006" xmlns:mv="urn:schemas-microsoft-com:mac:vml" xmlns:p="http://schemas.openxmlformats.org/presentationml/2006/main" xmlns:c="http://schemas.openxmlformats.org/drawingml/2006/chart" xmlns:dgm="http://schemas.openxmlformats.org/drawingml/2006/diagram" xmlns:o="urn:schemas-microsoft-com:office:office" xmlns:v="urn:schemas-microsoft-com:vml" xmlns:pvml="urn:schemas-microsoft-com:office:powerpoint" xmlns:com="http://schemas.openxmlformats.org/drawingml/2006/compatibility" xmlns:p14="http://schemas.microsoft.com/office/powerpoint/2010/main" xmlns:p15="http://schemas.microsoft.com/office/powerpoint/2012/main">
+<p:sldLayout xmlns:a="http://schemas.openxmlformats.org/drawingml/2006/main" xmlns:r="http://schemas.openxmlformats.org/officeDocument/2006/relationships" xmlns:p="http://schemas.openxmlformats.org/presentationml/2006/main">
   <p:cSld name="Section title and description">
     <p:spTree>
       <p:nvGrpSpPr>
-        <p:cNvPr id="41" name="Shape 41"/>
+        <p:cNvPr id="1" name="Shape 41"/>
         <p:cNvGrpSpPr/>
         <p:nvPr/>
       </p:nvGrpSpPr>
@@ -3554,7 +3823,7 @@
           </a:ln>
         </p:spPr>
         <p:txBody>
-          <a:bodyPr anchorCtr="0" anchor="ctr" bIns="91425" lIns="91425" rIns="91425" tIns="91425">
+          <a:bodyPr lIns="91425" tIns="91425" rIns="91425" bIns="91425" anchor="ctr" anchorCtr="0">
             <a:noAutofit/>
           </a:bodyPr>
           <a:lstStyle/>
@@ -3565,9 +3834,6 @@
               </a:spcBef>
               <a:buNone/>
             </a:pPr>
-            <a:r>
-              <a:t/>
-            </a:r>
             <a:endParaRPr/>
           </a:p>
         </p:txBody>
@@ -3587,21 +3853,23 @@
             <a:avLst/>
           </a:prstGeom>
           <a:noFill/>
-          <a:ln cap="flat" cmpd="sng" w="19050">
+          <a:ln w="19050" cap="flat" cmpd="sng">
             <a:solidFill>
               <a:schemeClr val="lt1"/>
             </a:solidFill>
             <a:prstDash val="solid"/>
             <a:round/>
-            <a:headEnd len="med" w="med" type="none"/>
-            <a:tailEnd len="med" w="med" type="none"/>
+            <a:headEnd type="none" w="med" len="med"/>
+            <a:tailEnd type="none" w="med" len="med"/>
           </a:ln>
         </p:spPr>
       </p:cxnSp>
       <p:sp>
         <p:nvSpPr>
           <p:cNvPr id="44" name="Shape 44"/>
-          <p:cNvSpPr txBox="1"/>
+          <p:cNvSpPr txBox="1">
+            <a:spLocks noGrp="1"/>
+          </p:cNvSpPr>
           <p:nvPr>
             <p:ph type="title"/>
           </p:nvPr>
@@ -3616,7 +3884,7 @@
           </a:prstGeom>
         </p:spPr>
         <p:txBody>
-          <a:bodyPr anchorCtr="0" anchor="b" bIns="91425" lIns="91425" rIns="91425" tIns="91425"/>
+          <a:bodyPr lIns="91425" tIns="91425" rIns="91425" bIns="91425" anchor="b" anchorCtr="0"/>
           <a:lstStyle>
             <a:lvl1pPr lvl="0" algn="ctr">
               <a:spcBef>
@@ -3736,15 +4004,19 @@
               </a:defRPr>
             </a:lvl9pPr>
           </a:lstStyle>
-          <a:p/>
+          <a:p>
+            <a:endParaRPr/>
+          </a:p>
         </p:txBody>
       </p:sp>
       <p:sp>
         <p:nvSpPr>
           <p:cNvPr id="45" name="Shape 45"/>
-          <p:cNvSpPr txBox="1"/>
+          <p:cNvSpPr txBox="1">
+            <a:spLocks noGrp="1"/>
+          </p:cNvSpPr>
           <p:nvPr>
-            <p:ph idx="1" type="subTitle"/>
+            <p:ph type="subTitle" idx="1"/>
           </p:nvPr>
         </p:nvSpPr>
         <p:spPr>
@@ -3757,7 +4029,7 @@
           </a:prstGeom>
         </p:spPr>
         <p:txBody>
-          <a:bodyPr anchorCtr="0" anchor="t" bIns="91425" lIns="91425" rIns="91425" tIns="91425"/>
+          <a:bodyPr lIns="91425" tIns="91425" rIns="91425" bIns="91425" anchor="t" anchorCtr="0"/>
           <a:lstStyle>
             <a:lvl1pPr lvl="0" algn="ctr">
               <a:lnSpc>
@@ -3940,15 +4212,19 @@
               </a:defRPr>
             </a:lvl9pPr>
           </a:lstStyle>
-          <a:p/>
+          <a:p>
+            <a:endParaRPr/>
+          </a:p>
         </p:txBody>
       </p:sp>
       <p:sp>
         <p:nvSpPr>
           <p:cNvPr id="46" name="Shape 46"/>
-          <p:cNvSpPr txBox="1"/>
+          <p:cNvSpPr txBox="1">
+            <a:spLocks noGrp="1"/>
+          </p:cNvSpPr>
           <p:nvPr>
-            <p:ph idx="2" type="body"/>
+            <p:ph type="body" idx="2"/>
           </p:nvPr>
         </p:nvSpPr>
         <p:spPr>
@@ -3961,7 +4237,7 @@
           </a:prstGeom>
         </p:spPr>
         <p:txBody>
-          <a:bodyPr anchorCtr="0" anchor="ctr" bIns="91425" lIns="91425" rIns="91425" tIns="91425"/>
+          <a:bodyPr lIns="91425" tIns="91425" rIns="91425" bIns="91425" anchor="ctr" anchorCtr="0"/>
           <a:lstStyle>
             <a:lvl1pPr lvl="0">
               <a:spcBef>
@@ -4081,15 +4357,19 @@
               </a:defRPr>
             </a:lvl9pPr>
           </a:lstStyle>
-          <a:p/>
+          <a:p>
+            <a:endParaRPr/>
+          </a:p>
         </p:txBody>
       </p:sp>
       <p:sp>
         <p:nvSpPr>
           <p:cNvPr id="47" name="Shape 47"/>
-          <p:cNvSpPr txBox="1"/>
+          <p:cNvSpPr txBox="1">
+            <a:spLocks noGrp="1"/>
+          </p:cNvSpPr>
           <p:nvPr>
-            <p:ph idx="12" type="sldNum"/>
+            <p:ph type="sldNum" idx="12"/>
           </p:nvPr>
         </p:nvSpPr>
         <p:spPr>
@@ -4102,7 +4382,7 @@
           </a:prstGeom>
         </p:spPr>
         <p:txBody>
-          <a:bodyPr anchorCtr="0" anchor="ctr" bIns="91425" lIns="91425" rIns="91425" tIns="91425">
+          <a:bodyPr lIns="91425" tIns="91425" rIns="91425" bIns="91425" anchor="ctr" anchorCtr="0">
             <a:noAutofit/>
           </a:bodyPr>
           <a:lstStyle/>
@@ -4121,6 +4401,11 @@
               </a:rPr>
               <a:t>‹#›</a:t>
             </a:fld>
+            <a:endParaRPr lang="en">
+              <a:solidFill>
+                <a:schemeClr val="lt1"/>
+              </a:solidFill>
+            </a:endParaRPr>
           </a:p>
         </p:txBody>
       </p:sp>
@@ -4133,11 +4418,11 @@
 </file>
 
 <file path=ppt/slideLayouts/slideLayout9.xml><?xml version="1.0" encoding="utf-8"?>
-<p:sldLayout xmlns:a="http://schemas.openxmlformats.org/drawingml/2006/main" xmlns:r="http://schemas.openxmlformats.org/officeDocument/2006/relationships" xmlns:mc="http://schemas.openxmlformats.org/markup-compatibility/2006" xmlns:mv="urn:schemas-microsoft-com:mac:vml" xmlns:p="http://schemas.openxmlformats.org/presentationml/2006/main" xmlns:c="http://schemas.openxmlformats.org/drawingml/2006/chart" xmlns:dgm="http://schemas.openxmlformats.org/drawingml/2006/diagram" xmlns:o="urn:schemas-microsoft-com:office:office" xmlns:v="urn:schemas-microsoft-com:vml" xmlns:pvml="urn:schemas-microsoft-com:office:powerpoint" xmlns:com="http://schemas.openxmlformats.org/drawingml/2006/compatibility" xmlns:p14="http://schemas.microsoft.com/office/powerpoint/2010/main" xmlns:p15="http://schemas.microsoft.com/office/powerpoint/2012/main">
+<p:sldLayout xmlns:a="http://schemas.openxmlformats.org/drawingml/2006/main" xmlns:r="http://schemas.openxmlformats.org/officeDocument/2006/relationships" xmlns:p="http://schemas.openxmlformats.org/presentationml/2006/main">
   <p:cSld name="Caption">
     <p:spTree>
       <p:nvGrpSpPr>
-        <p:cNvPr id="48" name="Shape 48"/>
+        <p:cNvPr id="1" name="Shape 48"/>
         <p:cNvGrpSpPr/>
         <p:nvPr/>
       </p:nvGrpSpPr>
@@ -4152,9 +4437,11 @@
       <p:sp>
         <p:nvSpPr>
           <p:cNvPr id="49" name="Shape 49"/>
-          <p:cNvSpPr txBox="1"/>
+          <p:cNvSpPr txBox="1">
+            <a:spLocks noGrp="1"/>
+          </p:cNvSpPr>
           <p:nvPr>
-            <p:ph idx="1" type="body"/>
+            <p:ph type="body" idx="1"/>
           </p:nvPr>
         </p:nvSpPr>
         <p:spPr>
@@ -4167,7 +4454,7 @@
           </a:prstGeom>
         </p:spPr>
         <p:txBody>
-          <a:bodyPr anchorCtr="0" anchor="ctr" bIns="91425" lIns="91425" rIns="91425" tIns="91425"/>
+          <a:bodyPr lIns="91425" tIns="91425" rIns="91425" bIns="91425" anchor="ctr" anchorCtr="0"/>
           <a:lstStyle>
             <a:lvl1pPr lvl="0">
               <a:lnSpc>
@@ -4190,15 +4477,19 @@
               </a:defRPr>
             </a:lvl1pPr>
           </a:lstStyle>
-          <a:p/>
+          <a:p>
+            <a:endParaRPr/>
+          </a:p>
         </p:txBody>
       </p:sp>
       <p:sp>
         <p:nvSpPr>
           <p:cNvPr id="50" name="Shape 50"/>
-          <p:cNvSpPr txBox="1"/>
+          <p:cNvSpPr txBox="1">
+            <a:spLocks noGrp="1"/>
+          </p:cNvSpPr>
           <p:nvPr>
-            <p:ph idx="12" type="sldNum"/>
+            <p:ph type="sldNum" idx="12"/>
           </p:nvPr>
         </p:nvSpPr>
         <p:spPr>
@@ -4211,7 +4502,7 @@
           </a:prstGeom>
         </p:spPr>
         <p:txBody>
-          <a:bodyPr anchorCtr="0" anchor="ctr" bIns="91425" lIns="91425" rIns="91425" tIns="91425">
+          <a:bodyPr lIns="91425" tIns="91425" rIns="91425" bIns="91425" anchor="ctr" anchorCtr="0">
             <a:noAutofit/>
           </a:bodyPr>
           <a:lstStyle/>
@@ -4226,6 +4517,7 @@
               <a:rPr lang="en"/>
               <a:t>‹#›</a:t>
             </a:fld>
+            <a:endParaRPr lang="en"/>
           </a:p>
         </p:txBody>
       </p:sp>
@@ -4238,18 +4530,19 @@
 </file>
 
 <file path=ppt/slideMasters/slideMaster1.xml><?xml version="1.0" encoding="utf-8"?>
-<p:sldMaster xmlns:a="http://schemas.openxmlformats.org/drawingml/2006/main" xmlns:r="http://schemas.openxmlformats.org/officeDocument/2006/relationships" xmlns:mc="http://schemas.openxmlformats.org/markup-compatibility/2006" xmlns:mv="urn:schemas-microsoft-com:mac:vml" xmlns:p="http://schemas.openxmlformats.org/presentationml/2006/main" xmlns:c="http://schemas.openxmlformats.org/drawingml/2006/chart" xmlns:dgm="http://schemas.openxmlformats.org/drawingml/2006/diagram" xmlns:o="urn:schemas-microsoft-com:office:office" xmlns:v="urn:schemas-microsoft-com:vml" xmlns:pvml="urn:schemas-microsoft-com:office:powerpoint" xmlns:com="http://schemas.openxmlformats.org/drawingml/2006/compatibility" xmlns:p14="http://schemas.microsoft.com/office/powerpoint/2010/main" xmlns:p15="http://schemas.microsoft.com/office/powerpoint/2012/main">
+<p:sldMaster xmlns:a="http://schemas.openxmlformats.org/drawingml/2006/main" xmlns:r="http://schemas.openxmlformats.org/officeDocument/2006/relationships" xmlns:p="http://schemas.openxmlformats.org/presentationml/2006/main">
   <p:cSld name="luxe">
     <p:bg>
       <p:bgPr>
         <a:solidFill>
           <a:schemeClr val="lt1"/>
         </a:solidFill>
+        <a:effectLst/>
       </p:bgPr>
     </p:bg>
     <p:spTree>
       <p:nvGrpSpPr>
-        <p:cNvPr id="5" name="Shape 5"/>
+        <p:cNvPr id="1" name="Shape 5"/>
         <p:cNvGrpSpPr/>
         <p:nvPr/>
       </p:nvGrpSpPr>
@@ -4264,7 +4557,9 @@
       <p:sp>
         <p:nvSpPr>
           <p:cNvPr id="6" name="Shape 6"/>
-          <p:cNvSpPr txBox="1"/>
+          <p:cNvSpPr txBox="1">
+            <a:spLocks noGrp="1"/>
+          </p:cNvSpPr>
           <p:nvPr>
             <p:ph type="title"/>
           </p:nvPr>
@@ -4283,7 +4578,7 @@
           </a:ln>
         </p:spPr>
         <p:txBody>
-          <a:bodyPr anchorCtr="0" anchor="b" bIns="91425" lIns="91425" rIns="91425" tIns="91425"/>
+          <a:bodyPr lIns="91425" tIns="91425" rIns="91425" bIns="91425" anchor="b" anchorCtr="0"/>
           <a:lstStyle>
             <a:lvl1pPr lvl="0">
               <a:spcBef>
@@ -4466,15 +4761,19 @@
               </a:defRPr>
             </a:lvl9pPr>
           </a:lstStyle>
-          <a:p/>
+          <a:p>
+            <a:endParaRPr/>
+          </a:p>
         </p:txBody>
       </p:sp>
       <p:sp>
         <p:nvSpPr>
           <p:cNvPr id="7" name="Shape 7"/>
-          <p:cNvSpPr txBox="1"/>
+          <p:cNvSpPr txBox="1">
+            <a:spLocks noGrp="1"/>
+          </p:cNvSpPr>
           <p:nvPr>
-            <p:ph idx="1" type="body"/>
+            <p:ph type="body" idx="1"/>
           </p:nvPr>
         </p:nvSpPr>
         <p:spPr>
@@ -4491,7 +4790,7 @@
           </a:ln>
         </p:spPr>
         <p:txBody>
-          <a:bodyPr anchorCtr="0" anchor="t" bIns="91425" lIns="91425" rIns="91425" tIns="91425"/>
+          <a:bodyPr lIns="91425" tIns="91425" rIns="91425" bIns="91425" anchor="t" anchorCtr="0"/>
           <a:lstStyle>
             <a:lvl1pPr lvl="0">
               <a:lnSpc>
@@ -4720,15 +5019,19 @@
               </a:defRPr>
             </a:lvl9pPr>
           </a:lstStyle>
-          <a:p/>
+          <a:p>
+            <a:endParaRPr/>
+          </a:p>
         </p:txBody>
       </p:sp>
       <p:sp>
         <p:nvSpPr>
           <p:cNvPr id="8" name="Shape 8"/>
-          <p:cNvSpPr txBox="1"/>
+          <p:cNvSpPr txBox="1">
+            <a:spLocks noGrp="1"/>
+          </p:cNvSpPr>
           <p:nvPr>
-            <p:ph idx="12" type="sldNum"/>
+            <p:ph type="sldNum" idx="12"/>
           </p:nvPr>
         </p:nvSpPr>
         <p:spPr>
@@ -4745,7 +5048,7 @@
           </a:ln>
         </p:spPr>
         <p:txBody>
-          <a:bodyPr anchorCtr="0" anchor="ctr" bIns="91425" lIns="91425" rIns="91425" tIns="91425">
+          <a:bodyPr lIns="91425" tIns="91425" rIns="91425" bIns="91425" anchor="ctr" anchorCtr="0">
             <a:noAutofit/>
           </a:bodyPr>
           <a:lstStyle/>
@@ -4768,12 +5071,21 @@
               </a:rPr>
               <a:t>‹#›</a:t>
             </a:fld>
+            <a:endParaRPr lang="en" sz="1000">
+              <a:solidFill>
+                <a:schemeClr val="dk1"/>
+              </a:solidFill>
+              <a:latin typeface="Economica"/>
+              <a:ea typeface="Economica"/>
+              <a:cs typeface="Economica"/>
+              <a:sym typeface="Economica"/>
+            </a:endParaRPr>
           </a:p>
         </p:txBody>
       </p:sp>
     </p:spTree>
   </p:cSld>
-  <p:clrMap accent1="accent1" accent2="accent2" accent3="accent3" accent4="accent4" accent5="accent5" accent6="accent6" bg1="lt1" bg2="dk2" tx1="dk1" tx2="lt2" folHlink="folHlink" hlink="hlink"/>
+  <p:clrMap bg1="lt1" tx1="dk1" bg2="dk2" tx2="lt2" accent1="accent1" accent2="accent2" accent3="accent3" accent4="accent4" accent5="accent5" accent6="accent6" hlink="hlink" folHlink="folHlink"/>
   <p:sldLayoutIdLst>
     <p:sldLayoutId id="2147483648" r:id="rId1"/>
     <p:sldLayoutId id="2147483649" r:id="rId2"/>
@@ -4787,10 +5099,10 @@
     <p:sldLayoutId id="2147483657" r:id="rId10"/>
     <p:sldLayoutId id="2147483658" r:id="rId11"/>
   </p:sldLayoutIdLst>
-  <p:hf dt="0" ftr="0" hdr="0" sldNum="0"/>
+  <p:hf sldNum="0" hdr="0" ftr="0" dt="0"/>
   <p:txStyles>
     <p:titleStyle>
-      <a:defPPr lvl="0" marR="0" rtl="0" algn="l">
+      <a:defPPr marR="0" lvl="0" algn="l" rtl="0">
         <a:lnSpc>
           <a:spcPct val="100000"/>
         </a:lnSpc>
@@ -4801,7 +5113,7 @@
           <a:spcPts val="0"/>
         </a:spcAft>
       </a:defPPr>
-      <a:lvl1pPr lvl="0" marR="0" rtl="0" algn="l">
+      <a:lvl1pPr marR="0" lvl="0" algn="l" rtl="0">
         <a:lnSpc>
           <a:spcPct val="100000"/>
         </a:lnSpc>
@@ -4812,7 +5124,7 @@
           <a:spcPts val="0"/>
         </a:spcAft>
         <a:buNone/>
-        <a:defRPr b="0" i="0" sz="1400" u="none" cap="none" strike="noStrike">
+        <a:defRPr sz="1400" b="0" i="0" u="none" strike="noStrike" cap="none">
           <a:solidFill>
             <a:srgbClr val="000000"/>
           </a:solidFill>
@@ -4824,7 +5136,7 @@
       </a:lvl1pPr>
     </p:titleStyle>
     <p:bodyStyle>
-      <a:defPPr lvl="0" marR="0" rtl="0" algn="l">
+      <a:defPPr marR="0" lvl="0" algn="l" rtl="0">
         <a:lnSpc>
           <a:spcPct val="100000"/>
         </a:lnSpc>
@@ -4835,7 +5147,7 @@
           <a:spcPts val="0"/>
         </a:spcAft>
       </a:defPPr>
-      <a:lvl1pPr lvl="0" marR="0" rtl="0" algn="l">
+      <a:lvl1pPr marR="0" lvl="0" algn="l" rtl="0">
         <a:lnSpc>
           <a:spcPct val="100000"/>
         </a:lnSpc>
@@ -4846,7 +5158,7 @@
           <a:spcPts val="0"/>
         </a:spcAft>
         <a:buNone/>
-        <a:defRPr b="0" i="0" sz="1400" u="none" cap="none" strike="noStrike">
+        <a:defRPr sz="1400" b="0" i="0" u="none" strike="noStrike" cap="none">
           <a:solidFill>
             <a:srgbClr val="000000"/>
           </a:solidFill>
@@ -4856,7 +5168,7 @@
           <a:sym typeface="Arial"/>
         </a:defRPr>
       </a:lvl1pPr>
-      <a:lvl2pPr lvl="1" marR="0" rtl="0" algn="l">
+      <a:lvl2pPr marR="0" lvl="1" algn="l" rtl="0">
         <a:lnSpc>
           <a:spcPct val="100000"/>
         </a:lnSpc>
@@ -4867,7 +5179,7 @@
           <a:spcPts val="0"/>
         </a:spcAft>
         <a:buNone/>
-        <a:defRPr b="0" i="0" sz="1400" u="none" cap="none" strike="noStrike">
+        <a:defRPr sz="1400" b="0" i="0" u="none" strike="noStrike" cap="none">
           <a:solidFill>
             <a:srgbClr val="000000"/>
           </a:solidFill>
@@ -4877,7 +5189,7 @@
           <a:sym typeface="Arial"/>
         </a:defRPr>
       </a:lvl2pPr>
-      <a:lvl3pPr lvl="2" marR="0" rtl="0" algn="l">
+      <a:lvl3pPr marR="0" lvl="2" algn="l" rtl="0">
         <a:lnSpc>
           <a:spcPct val="100000"/>
         </a:lnSpc>
@@ -4888,7 +5200,7 @@
           <a:spcPts val="0"/>
         </a:spcAft>
         <a:buNone/>
-        <a:defRPr b="0" i="0" sz="1400" u="none" cap="none" strike="noStrike">
+        <a:defRPr sz="1400" b="0" i="0" u="none" strike="noStrike" cap="none">
           <a:solidFill>
             <a:srgbClr val="000000"/>
           </a:solidFill>
@@ -4898,7 +5210,7 @@
           <a:sym typeface="Arial"/>
         </a:defRPr>
       </a:lvl3pPr>
-      <a:lvl4pPr lvl="3" marR="0" rtl="0" algn="l">
+      <a:lvl4pPr marR="0" lvl="3" algn="l" rtl="0">
         <a:lnSpc>
           <a:spcPct val="100000"/>
         </a:lnSpc>
@@ -4909,7 +5221,7 @@
           <a:spcPts val="0"/>
         </a:spcAft>
         <a:buNone/>
-        <a:defRPr b="0" i="0" sz="1400" u="none" cap="none" strike="noStrike">
+        <a:defRPr sz="1400" b="0" i="0" u="none" strike="noStrike" cap="none">
           <a:solidFill>
             <a:srgbClr val="000000"/>
           </a:solidFill>
@@ -4919,7 +5231,7 @@
           <a:sym typeface="Arial"/>
         </a:defRPr>
       </a:lvl4pPr>
-      <a:lvl5pPr lvl="4" marR="0" rtl="0" algn="l">
+      <a:lvl5pPr marR="0" lvl="4" algn="l" rtl="0">
         <a:lnSpc>
           <a:spcPct val="100000"/>
         </a:lnSpc>
@@ -4930,7 +5242,7 @@
           <a:spcPts val="0"/>
         </a:spcAft>
         <a:buNone/>
-        <a:defRPr b="0" i="0" sz="1400" u="none" cap="none" strike="noStrike">
+        <a:defRPr sz="1400" b="0" i="0" u="none" strike="noStrike" cap="none">
           <a:solidFill>
             <a:srgbClr val="000000"/>
           </a:solidFill>
@@ -4940,7 +5252,7 @@
           <a:sym typeface="Arial"/>
         </a:defRPr>
       </a:lvl5pPr>
-      <a:lvl6pPr lvl="5" marR="0" rtl="0" algn="l">
+      <a:lvl6pPr marR="0" lvl="5" algn="l" rtl="0">
         <a:lnSpc>
           <a:spcPct val="100000"/>
         </a:lnSpc>
@@ -4951,7 +5263,7 @@
           <a:spcPts val="0"/>
         </a:spcAft>
         <a:buNone/>
-        <a:defRPr b="0" i="0" sz="1400" u="none" cap="none" strike="noStrike">
+        <a:defRPr sz="1400" b="0" i="0" u="none" strike="noStrike" cap="none">
           <a:solidFill>
             <a:srgbClr val="000000"/>
           </a:solidFill>
@@ -4961,7 +5273,7 @@
           <a:sym typeface="Arial"/>
         </a:defRPr>
       </a:lvl6pPr>
-      <a:lvl7pPr lvl="6" marR="0" rtl="0" algn="l">
+      <a:lvl7pPr marR="0" lvl="6" algn="l" rtl="0">
         <a:lnSpc>
           <a:spcPct val="100000"/>
         </a:lnSpc>
@@ -4972,7 +5284,7 @@
           <a:spcPts val="0"/>
         </a:spcAft>
         <a:buNone/>
-        <a:defRPr b="0" i="0" sz="1400" u="none" cap="none" strike="noStrike">
+        <a:defRPr sz="1400" b="0" i="0" u="none" strike="noStrike" cap="none">
           <a:solidFill>
             <a:srgbClr val="000000"/>
           </a:solidFill>
@@ -4982,7 +5294,7 @@
           <a:sym typeface="Arial"/>
         </a:defRPr>
       </a:lvl7pPr>
-      <a:lvl8pPr lvl="7" marR="0" rtl="0" algn="l">
+      <a:lvl8pPr marR="0" lvl="7" algn="l" rtl="0">
         <a:lnSpc>
           <a:spcPct val="100000"/>
         </a:lnSpc>
@@ -4993,7 +5305,7 @@
           <a:spcPts val="0"/>
         </a:spcAft>
         <a:buNone/>
-        <a:defRPr b="0" i="0" sz="1400" u="none" cap="none" strike="noStrike">
+        <a:defRPr sz="1400" b="0" i="0" u="none" strike="noStrike" cap="none">
           <a:solidFill>
             <a:srgbClr val="000000"/>
           </a:solidFill>
@@ -5003,7 +5315,7 @@
           <a:sym typeface="Arial"/>
         </a:defRPr>
       </a:lvl8pPr>
-      <a:lvl9pPr lvl="8" marR="0" rtl="0" algn="l">
+      <a:lvl9pPr marR="0" lvl="8" algn="l" rtl="0">
         <a:lnSpc>
           <a:spcPct val="100000"/>
         </a:lnSpc>
@@ -5014,7 +5326,7 @@
           <a:spcPts val="0"/>
         </a:spcAft>
         <a:buNone/>
-        <a:defRPr b="0" i="0" sz="1400" u="none" cap="none" strike="noStrike">
+        <a:defRPr sz="1400" b="0" i="0" u="none" strike="noStrike" cap="none">
           <a:solidFill>
             <a:srgbClr val="000000"/>
           </a:solidFill>
@@ -5026,7 +5338,7 @@
       </a:lvl9pPr>
     </p:bodyStyle>
     <p:otherStyle>
-      <a:defPPr lvl="0" marR="0" rtl="0" algn="l">
+      <a:defPPr marR="0" lvl="0" algn="l" rtl="0">
         <a:lnSpc>
           <a:spcPct val="100000"/>
         </a:lnSpc>
@@ -5037,7 +5349,7 @@
           <a:spcPts val="0"/>
         </a:spcAft>
       </a:defPPr>
-      <a:lvl1pPr lvl="0" marR="0" rtl="0" algn="l">
+      <a:lvl1pPr marR="0" lvl="0" algn="l" rtl="0">
         <a:lnSpc>
           <a:spcPct val="100000"/>
         </a:lnSpc>
@@ -5048,7 +5360,7 @@
           <a:spcPts val="0"/>
         </a:spcAft>
         <a:buNone/>
-        <a:defRPr b="0" i="0" sz="1400" u="none" cap="none" strike="noStrike">
+        <a:defRPr sz="1400" b="0" i="0" u="none" strike="noStrike" cap="none">
           <a:solidFill>
             <a:srgbClr val="000000"/>
           </a:solidFill>
@@ -5058,7 +5370,7 @@
           <a:sym typeface="Arial"/>
         </a:defRPr>
       </a:lvl1pPr>
-      <a:lvl2pPr lvl="1" marR="0" rtl="0" algn="l">
+      <a:lvl2pPr marR="0" lvl="1" algn="l" rtl="0">
         <a:lnSpc>
           <a:spcPct val="100000"/>
         </a:lnSpc>
@@ -5069,7 +5381,7 @@
           <a:spcPts val="0"/>
         </a:spcAft>
         <a:buNone/>
-        <a:defRPr b="0" i="0" sz="1400" u="none" cap="none" strike="noStrike">
+        <a:defRPr sz="1400" b="0" i="0" u="none" strike="noStrike" cap="none">
           <a:solidFill>
             <a:srgbClr val="000000"/>
           </a:solidFill>
@@ -5079,7 +5391,7 @@
           <a:sym typeface="Arial"/>
         </a:defRPr>
       </a:lvl2pPr>
-      <a:lvl3pPr lvl="2" marR="0" rtl="0" algn="l">
+      <a:lvl3pPr marR="0" lvl="2" algn="l" rtl="0">
         <a:lnSpc>
           <a:spcPct val="100000"/>
         </a:lnSpc>
@@ -5090,7 +5402,7 @@
           <a:spcPts val="0"/>
         </a:spcAft>
         <a:buNone/>
-        <a:defRPr b="0" i="0" sz="1400" u="none" cap="none" strike="noStrike">
+        <a:defRPr sz="1400" b="0" i="0" u="none" strike="noStrike" cap="none">
           <a:solidFill>
             <a:srgbClr val="000000"/>
           </a:solidFill>
@@ -5100,7 +5412,7 @@
           <a:sym typeface="Arial"/>
         </a:defRPr>
       </a:lvl3pPr>
-      <a:lvl4pPr lvl="3" marR="0" rtl="0" algn="l">
+      <a:lvl4pPr marR="0" lvl="3" algn="l" rtl="0">
         <a:lnSpc>
           <a:spcPct val="100000"/>
         </a:lnSpc>
@@ -5111,7 +5423,7 @@
           <a:spcPts val="0"/>
         </a:spcAft>
         <a:buNone/>
-        <a:defRPr b="0" i="0" sz="1400" u="none" cap="none" strike="noStrike">
+        <a:defRPr sz="1400" b="0" i="0" u="none" strike="noStrike" cap="none">
           <a:solidFill>
             <a:srgbClr val="000000"/>
           </a:solidFill>
@@ -5121,7 +5433,7 @@
           <a:sym typeface="Arial"/>
         </a:defRPr>
       </a:lvl4pPr>
-      <a:lvl5pPr lvl="4" marR="0" rtl="0" algn="l">
+      <a:lvl5pPr marR="0" lvl="4" algn="l" rtl="0">
         <a:lnSpc>
           <a:spcPct val="100000"/>
         </a:lnSpc>
@@ -5132,7 +5444,7 @@
           <a:spcPts val="0"/>
         </a:spcAft>
         <a:buNone/>
-        <a:defRPr b="0" i="0" sz="1400" u="none" cap="none" strike="noStrike">
+        <a:defRPr sz="1400" b="0" i="0" u="none" strike="noStrike" cap="none">
           <a:solidFill>
             <a:srgbClr val="000000"/>
           </a:solidFill>
@@ -5142,7 +5454,7 @@
           <a:sym typeface="Arial"/>
         </a:defRPr>
       </a:lvl5pPr>
-      <a:lvl6pPr lvl="5" marR="0" rtl="0" algn="l">
+      <a:lvl6pPr marR="0" lvl="5" algn="l" rtl="0">
         <a:lnSpc>
           <a:spcPct val="100000"/>
         </a:lnSpc>
@@ -5153,7 +5465,7 @@
           <a:spcPts val="0"/>
         </a:spcAft>
         <a:buNone/>
-        <a:defRPr b="0" i="0" sz="1400" u="none" cap="none" strike="noStrike">
+        <a:defRPr sz="1400" b="0" i="0" u="none" strike="noStrike" cap="none">
           <a:solidFill>
             <a:srgbClr val="000000"/>
           </a:solidFill>
@@ -5163,7 +5475,7 @@
           <a:sym typeface="Arial"/>
         </a:defRPr>
       </a:lvl6pPr>
-      <a:lvl7pPr lvl="6" marR="0" rtl="0" algn="l">
+      <a:lvl7pPr marR="0" lvl="6" algn="l" rtl="0">
         <a:lnSpc>
           <a:spcPct val="100000"/>
         </a:lnSpc>
@@ -5174,7 +5486,7 @@
           <a:spcPts val="0"/>
         </a:spcAft>
         <a:buNone/>
-        <a:defRPr b="0" i="0" sz="1400" u="none" cap="none" strike="noStrike">
+        <a:defRPr sz="1400" b="0" i="0" u="none" strike="noStrike" cap="none">
           <a:solidFill>
             <a:srgbClr val="000000"/>
           </a:solidFill>
@@ -5184,7 +5496,7 @@
           <a:sym typeface="Arial"/>
         </a:defRPr>
       </a:lvl7pPr>
-      <a:lvl8pPr lvl="7" marR="0" rtl="0" algn="l">
+      <a:lvl8pPr marR="0" lvl="7" algn="l" rtl="0">
         <a:lnSpc>
           <a:spcPct val="100000"/>
         </a:lnSpc>
@@ -5195,7 +5507,7 @@
           <a:spcPts val="0"/>
         </a:spcAft>
         <a:buNone/>
-        <a:defRPr b="0" i="0" sz="1400" u="none" cap="none" strike="noStrike">
+        <a:defRPr sz="1400" b="0" i="0" u="none" strike="noStrike" cap="none">
           <a:solidFill>
             <a:srgbClr val="000000"/>
           </a:solidFill>
@@ -5205,7 +5517,7 @@
           <a:sym typeface="Arial"/>
         </a:defRPr>
       </a:lvl8pPr>
-      <a:lvl9pPr lvl="8" marR="0" rtl="0" algn="l">
+      <a:lvl9pPr marR="0" lvl="8" algn="l" rtl="0">
         <a:lnSpc>
           <a:spcPct val="100000"/>
         </a:lnSpc>
@@ -5216,7 +5528,7 @@
           <a:spcPts val="0"/>
         </a:spcAft>
         <a:buNone/>
-        <a:defRPr b="0" i="0" sz="1400" u="none" cap="none" strike="noStrike">
+        <a:defRPr sz="1400" b="0" i="0" u="none" strike="noStrike" cap="none">
           <a:solidFill>
             <a:srgbClr val="000000"/>
           </a:solidFill>
@@ -5232,11 +5544,11 @@
 </file>
 
 <file path=ppt/slides/slide1.xml><?xml version="1.0" encoding="utf-8"?>
-<p:sld xmlns:a="http://schemas.openxmlformats.org/drawingml/2006/main" xmlns:r="http://schemas.openxmlformats.org/officeDocument/2006/relationships" xmlns:mc="http://schemas.openxmlformats.org/markup-compatibility/2006" xmlns:mv="urn:schemas-microsoft-com:mac:vml" xmlns:p="http://schemas.openxmlformats.org/presentationml/2006/main" xmlns:c="http://schemas.openxmlformats.org/drawingml/2006/chart" xmlns:dgm="http://schemas.openxmlformats.org/drawingml/2006/diagram" xmlns:o="urn:schemas-microsoft-com:office:office" xmlns:v="urn:schemas-microsoft-com:vml" xmlns:pvml="urn:schemas-microsoft-com:office:powerpoint" xmlns:com="http://schemas.openxmlformats.org/drawingml/2006/compatibility" xmlns:p14="http://schemas.microsoft.com/office/powerpoint/2010/main" xmlns:p15="http://schemas.microsoft.com/office/powerpoint/2012/main">
+<p:sld xmlns:a="http://schemas.openxmlformats.org/drawingml/2006/main" xmlns:r="http://schemas.openxmlformats.org/officeDocument/2006/relationships" xmlns:p="http://schemas.openxmlformats.org/presentationml/2006/main">
   <p:cSld>
     <p:spTree>
       <p:nvGrpSpPr>
-        <p:cNvPr id="61" name="Shape 61"/>
+        <p:cNvPr id="1" name="Shape 61"/>
         <p:cNvGrpSpPr/>
         <p:nvPr/>
       </p:nvGrpSpPr>
@@ -5251,7 +5563,9 @@
       <p:sp>
         <p:nvSpPr>
           <p:cNvPr id="62" name="Shape 62"/>
-          <p:cNvSpPr txBox="1"/>
+          <p:cNvSpPr txBox="1">
+            <a:spLocks noGrp="1"/>
+          </p:cNvSpPr>
           <p:nvPr>
             <p:ph type="ctrTitle"/>
           </p:nvPr>
@@ -5266,7 +5580,7 @@
           </a:prstGeom>
         </p:spPr>
         <p:txBody>
-          <a:bodyPr anchorCtr="0" anchor="b" bIns="91425" lIns="91425" rIns="91425" tIns="91425">
+          <a:bodyPr lIns="91425" tIns="91425" rIns="91425" bIns="91425" anchor="b" anchorCtr="0">
             <a:noAutofit/>
           </a:bodyPr>
           <a:lstStyle/>
@@ -5287,9 +5601,11 @@
       <p:sp>
         <p:nvSpPr>
           <p:cNvPr id="63" name="Shape 63"/>
-          <p:cNvSpPr txBox="1"/>
+          <p:cNvSpPr txBox="1">
+            <a:spLocks noGrp="1"/>
+          </p:cNvSpPr>
           <p:nvPr>
-            <p:ph idx="1" type="subTitle"/>
+            <p:ph type="subTitle" idx="1"/>
           </p:nvPr>
         </p:nvSpPr>
         <p:spPr>
@@ -5302,7 +5618,7 @@
           </a:prstGeom>
         </p:spPr>
         <p:txBody>
-          <a:bodyPr anchorCtr="0" anchor="t" bIns="91425" lIns="91425" rIns="91425" tIns="91425">
+          <a:bodyPr lIns="91425" tIns="91425" rIns="91425" bIns="91425" anchor="t" anchorCtr="0">
             <a:noAutofit/>
           </a:bodyPr>
           <a:lstStyle/>
@@ -5329,11 +5645,11 @@
 </file>
 
 <file path=ppt/slides/slide10.xml><?xml version="1.0" encoding="utf-8"?>
-<p:sld xmlns:a="http://schemas.openxmlformats.org/drawingml/2006/main" xmlns:r="http://schemas.openxmlformats.org/officeDocument/2006/relationships" xmlns:mc="http://schemas.openxmlformats.org/markup-compatibility/2006" xmlns:mv="urn:schemas-microsoft-com:mac:vml" xmlns:p="http://schemas.openxmlformats.org/presentationml/2006/main" xmlns:c="http://schemas.openxmlformats.org/drawingml/2006/chart" xmlns:dgm="http://schemas.openxmlformats.org/drawingml/2006/diagram" xmlns:o="urn:schemas-microsoft-com:office:office" xmlns:v="urn:schemas-microsoft-com:vml" xmlns:pvml="urn:schemas-microsoft-com:office:powerpoint" xmlns:com="http://schemas.openxmlformats.org/drawingml/2006/compatibility" xmlns:p14="http://schemas.microsoft.com/office/powerpoint/2010/main" xmlns:p15="http://schemas.microsoft.com/office/powerpoint/2012/main">
+<p:sld xmlns:a="http://schemas.openxmlformats.org/drawingml/2006/main" xmlns:r="http://schemas.openxmlformats.org/officeDocument/2006/relationships" xmlns:p="http://schemas.openxmlformats.org/presentationml/2006/main">
   <p:cSld>
     <p:spTree>
       <p:nvGrpSpPr>
-        <p:cNvPr id="121" name="Shape 121"/>
+        <p:cNvPr id="1" name="Shape 121"/>
         <p:cNvGrpSpPr/>
         <p:nvPr/>
       </p:nvGrpSpPr>
@@ -5348,7 +5664,9 @@
       <p:sp>
         <p:nvSpPr>
           <p:cNvPr id="122" name="Shape 122"/>
-          <p:cNvSpPr txBox="1"/>
+          <p:cNvSpPr txBox="1">
+            <a:spLocks noGrp="1"/>
+          </p:cNvSpPr>
           <p:nvPr>
             <p:ph type="title"/>
           </p:nvPr>
@@ -5363,7 +5681,7 @@
           </a:prstGeom>
         </p:spPr>
         <p:txBody>
-          <a:bodyPr anchorCtr="0" anchor="b" bIns="91425" lIns="91425" rIns="91425" tIns="91425">
+          <a:bodyPr lIns="91425" tIns="91425" rIns="91425" bIns="91425" anchor="b" anchorCtr="0">
             <a:noAutofit/>
           </a:bodyPr>
           <a:lstStyle/>
@@ -5384,9 +5702,11 @@
       <p:sp>
         <p:nvSpPr>
           <p:cNvPr id="123" name="Shape 123"/>
-          <p:cNvSpPr txBox="1"/>
+          <p:cNvSpPr txBox="1">
+            <a:spLocks noGrp="1"/>
+          </p:cNvSpPr>
           <p:nvPr>
-            <p:ph idx="1" type="body"/>
+            <p:ph type="body" idx="1"/>
           </p:nvPr>
         </p:nvSpPr>
         <p:spPr>
@@ -5399,7 +5719,7 @@
           </a:prstGeom>
         </p:spPr>
         <p:txBody>
-          <a:bodyPr anchorCtr="0" anchor="t" bIns="91425" lIns="91425" rIns="91425" tIns="91425">
+          <a:bodyPr lIns="91425" tIns="91425" rIns="91425" bIns="91425" anchor="t" anchorCtr="0">
             <a:noAutofit/>
           </a:bodyPr>
           <a:lstStyle/>
@@ -5444,9 +5764,6 @@
               </a:spcBef>
               <a:buNone/>
             </a:pPr>
-            <a:r>
-              <a:t/>
-            </a:r>
             <a:endParaRPr/>
           </a:p>
         </p:txBody>
@@ -5460,11 +5777,11 @@
 </file>
 
 <file path=ppt/slides/slide2.xml><?xml version="1.0" encoding="utf-8"?>
-<p:sld xmlns:a="http://schemas.openxmlformats.org/drawingml/2006/main" xmlns:r="http://schemas.openxmlformats.org/officeDocument/2006/relationships" xmlns:mc="http://schemas.openxmlformats.org/markup-compatibility/2006" xmlns:mv="urn:schemas-microsoft-com:mac:vml" xmlns:p="http://schemas.openxmlformats.org/presentationml/2006/main" xmlns:c="http://schemas.openxmlformats.org/drawingml/2006/chart" xmlns:dgm="http://schemas.openxmlformats.org/drawingml/2006/diagram" xmlns:o="urn:schemas-microsoft-com:office:office" xmlns:v="urn:schemas-microsoft-com:vml" xmlns:pvml="urn:schemas-microsoft-com:office:powerpoint" xmlns:com="http://schemas.openxmlformats.org/drawingml/2006/compatibility" xmlns:p14="http://schemas.microsoft.com/office/powerpoint/2010/main" xmlns:p15="http://schemas.microsoft.com/office/powerpoint/2012/main">
+<p:sld xmlns:a="http://schemas.openxmlformats.org/drawingml/2006/main" xmlns:r="http://schemas.openxmlformats.org/officeDocument/2006/relationships" xmlns:p="http://schemas.openxmlformats.org/presentationml/2006/main">
   <p:cSld>
     <p:spTree>
       <p:nvGrpSpPr>
-        <p:cNvPr id="67" name="Shape 67"/>
+        <p:cNvPr id="1" name="Shape 67"/>
         <p:cNvGrpSpPr/>
         <p:nvPr/>
       </p:nvGrpSpPr>
@@ -5479,7 +5796,9 @@
       <p:sp>
         <p:nvSpPr>
           <p:cNvPr id="68" name="Shape 68"/>
-          <p:cNvSpPr txBox="1"/>
+          <p:cNvSpPr txBox="1">
+            <a:spLocks noGrp="1"/>
+          </p:cNvSpPr>
           <p:nvPr>
             <p:ph type="title"/>
           </p:nvPr>
@@ -5494,7 +5813,7 @@
           </a:prstGeom>
         </p:spPr>
         <p:txBody>
-          <a:bodyPr anchorCtr="0" anchor="b" bIns="91425" lIns="91425" rIns="91425" tIns="91425">
+          <a:bodyPr lIns="91425" tIns="91425" rIns="91425" bIns="91425" anchor="b" anchorCtr="0">
             <a:noAutofit/>
           </a:bodyPr>
           <a:lstStyle/>
@@ -5515,9 +5834,11 @@
       <p:sp>
         <p:nvSpPr>
           <p:cNvPr id="69" name="Shape 69"/>
-          <p:cNvSpPr txBox="1"/>
+          <p:cNvSpPr txBox="1">
+            <a:spLocks noGrp="1"/>
+          </p:cNvSpPr>
           <p:nvPr>
-            <p:ph idx="1" type="body"/>
+            <p:ph type="body" idx="1"/>
           </p:nvPr>
         </p:nvSpPr>
         <p:spPr>
@@ -5530,7 +5851,7 @@
           </a:prstGeom>
         </p:spPr>
         <p:txBody>
-          <a:bodyPr anchorCtr="0" anchor="t" bIns="91425" lIns="91425" rIns="91425" tIns="91425">
+          <a:bodyPr lIns="91425" tIns="91425" rIns="91425" bIns="91425" anchor="t" anchorCtr="0">
             <a:noAutofit/>
           </a:bodyPr>
           <a:lstStyle/>
@@ -5608,7 +5929,7 @@
               <a:buNone/>
             </a:pPr>
             <a:r>
-              <a:rPr i="1" lang="en" sz="1100">
+              <a:rPr lang="en" sz="1100" i="1">
                 <a:solidFill>
                   <a:srgbClr val="222222"/>
                 </a:solidFill>
@@ -5632,7 +5953,7 @@
               <a:buNone/>
             </a:pPr>
             <a:r>
-              <a:rPr i="1" lang="en" sz="1100">
+              <a:rPr lang="en" sz="1100" i="1">
                 <a:solidFill>
                   <a:srgbClr val="222222"/>
                 </a:solidFill>
@@ -5644,7 +5965,7 @@
             </a:r>
           </a:p>
           <a:p>
-            <a:pPr indent="-298450" lvl="0" marL="457200" rtl="0">
+            <a:pPr marL="457200" lvl="0" indent="-298450" rtl="0">
               <a:spcBef>
                 <a:spcPts val="0"/>
               </a:spcBef>
@@ -5670,7 +5991,7 @@
             </a:r>
           </a:p>
           <a:p>
-            <a:pPr indent="-298450" lvl="1" marL="1041400" rtl="0">
+            <a:pPr marL="1041400" lvl="1" indent="-298450" rtl="0">
               <a:spcBef>
                 <a:spcPts val="0"/>
               </a:spcBef>
@@ -5701,9 +6022,6 @@
               </a:spcBef>
               <a:buNone/>
             </a:pPr>
-            <a:r>
-              <a:t/>
-            </a:r>
             <a:endParaRPr/>
           </a:p>
         </p:txBody>
@@ -5711,9 +6029,11 @@
       <p:sp>
         <p:nvSpPr>
           <p:cNvPr id="70" name="Shape 70"/>
-          <p:cNvSpPr txBox="1"/>
+          <p:cNvSpPr txBox="1">
+            <a:spLocks noGrp="1"/>
+          </p:cNvSpPr>
           <p:nvPr>
-            <p:ph idx="2" type="body"/>
+            <p:ph type="body" idx="2"/>
           </p:nvPr>
         </p:nvSpPr>
         <p:spPr>
@@ -5726,7 +6046,7 @@
           </a:prstGeom>
         </p:spPr>
         <p:txBody>
-          <a:bodyPr anchorCtr="0" anchor="t" bIns="91425" lIns="91425" rIns="91425" tIns="91425">
+          <a:bodyPr lIns="91425" tIns="91425" rIns="91425" bIns="91425" anchor="t" anchorCtr="0">
             <a:noAutofit/>
           </a:bodyPr>
           <a:lstStyle/>
@@ -5755,7 +6075,7 @@
             </a:r>
           </a:p>
           <a:p>
-            <a:pPr indent="-228600" lvl="0" marL="457200" rtl="0">
+            <a:pPr marL="457200" lvl="0" indent="-228600" rtl="0">
               <a:spcBef>
                 <a:spcPts val="0"/>
               </a:spcBef>
@@ -5767,7 +6087,7 @@
             </a:r>
           </a:p>
           <a:p>
-            <a:pPr indent="-228600" lvl="0" marL="457200" rtl="0">
+            <a:pPr marL="457200" lvl="0" indent="-228600" rtl="0">
               <a:spcBef>
                 <a:spcPts val="0"/>
               </a:spcBef>
@@ -5779,7 +6099,7 @@
             </a:r>
           </a:p>
           <a:p>
-            <a:pPr indent="-228600" lvl="0" marL="457200" rtl="0">
+            <a:pPr marL="457200" lvl="0" indent="-228600" rtl="0">
               <a:spcBef>
                 <a:spcPts val="0"/>
               </a:spcBef>
@@ -5791,7 +6111,7 @@
             </a:r>
           </a:p>
           <a:p>
-            <a:pPr indent="-228600" lvl="0" marL="457200" rtl="0">
+            <a:pPr marL="457200" lvl="0" indent="-228600" rtl="0">
               <a:spcBef>
                 <a:spcPts val="0"/>
               </a:spcBef>
@@ -5809,9 +6129,6 @@
               </a:spcBef>
               <a:buNone/>
             </a:pPr>
-            <a:r>
-              <a:t/>
-            </a:r>
             <a:endParaRPr/>
           </a:p>
           <a:p>
@@ -5821,9 +6138,6 @@
               </a:spcBef>
               <a:buNone/>
             </a:pPr>
-            <a:r>
-              <a:t/>
-            </a:r>
             <a:endParaRPr/>
           </a:p>
           <a:p>
@@ -5833,9 +6147,6 @@
               </a:spcBef>
               <a:buNone/>
             </a:pPr>
-            <a:r>
-              <a:t/>
-            </a:r>
             <a:endParaRPr/>
           </a:p>
         </p:txBody>
@@ -5877,11 +6188,11 @@
 </file>
 
 <file path=ppt/slides/slide3.xml><?xml version="1.0" encoding="utf-8"?>
-<p:sld xmlns:a="http://schemas.openxmlformats.org/drawingml/2006/main" xmlns:r="http://schemas.openxmlformats.org/officeDocument/2006/relationships" xmlns:mc="http://schemas.openxmlformats.org/markup-compatibility/2006" xmlns:mv="urn:schemas-microsoft-com:mac:vml" xmlns:p="http://schemas.openxmlformats.org/presentationml/2006/main" xmlns:c="http://schemas.openxmlformats.org/drawingml/2006/chart" xmlns:dgm="http://schemas.openxmlformats.org/drawingml/2006/diagram" xmlns:o="urn:schemas-microsoft-com:office:office" xmlns:v="urn:schemas-microsoft-com:vml" xmlns:pvml="urn:schemas-microsoft-com:office:powerpoint" xmlns:com="http://schemas.openxmlformats.org/drawingml/2006/compatibility" xmlns:p14="http://schemas.microsoft.com/office/powerpoint/2010/main" xmlns:p15="http://schemas.microsoft.com/office/powerpoint/2012/main">
+<p:sld xmlns:a="http://schemas.openxmlformats.org/drawingml/2006/main" xmlns:r="http://schemas.openxmlformats.org/officeDocument/2006/relationships" xmlns:p="http://schemas.openxmlformats.org/presentationml/2006/main">
   <p:cSld>
     <p:spTree>
       <p:nvGrpSpPr>
-        <p:cNvPr id="75" name="Shape 75"/>
+        <p:cNvPr id="1" name="Shape 81"/>
         <p:cNvGrpSpPr/>
         <p:nvPr/>
       </p:nvGrpSpPr>
@@ -5895,8 +6206,10 @@
       </p:grpSpPr>
       <p:sp>
         <p:nvSpPr>
-          <p:cNvPr id="76" name="Shape 76"/>
-          <p:cNvSpPr txBox="1"/>
+          <p:cNvPr id="82" name="Shape 82"/>
+          <p:cNvSpPr txBox="1">
+            <a:spLocks noGrp="1"/>
+          </p:cNvSpPr>
           <p:nvPr>
             <p:ph type="title"/>
           </p:nvPr>
@@ -5911,7 +6224,159 @@
           </a:prstGeom>
         </p:spPr>
         <p:txBody>
-          <a:bodyPr anchorCtr="0" anchor="b" bIns="91425" lIns="91425" rIns="91425" tIns="91425">
+          <a:bodyPr lIns="91425" tIns="91425" rIns="91425" bIns="91425" anchor="b" anchorCtr="0">
+            <a:noAutofit/>
+          </a:bodyPr>
+          <a:lstStyle/>
+          <a:p>
+            <a:pPr lvl="0">
+              <a:spcBef>
+                <a:spcPts val="0"/>
+              </a:spcBef>
+              <a:buNone/>
+            </a:pPr>
+            <a:r>
+              <a:rPr lang="en"/>
+              <a:t>Take the Test!</a:t>
+            </a:r>
+          </a:p>
+        </p:txBody>
+      </p:sp>
+      <p:sp>
+        <p:nvSpPr>
+          <p:cNvPr id="83" name="Shape 83"/>
+          <p:cNvSpPr txBox="1">
+            <a:spLocks noGrp="1"/>
+          </p:cNvSpPr>
+          <p:nvPr>
+            <p:ph type="body" idx="1"/>
+          </p:nvPr>
+        </p:nvSpPr>
+        <p:spPr>
+          <a:xfrm>
+            <a:off x="311700" y="1225225"/>
+            <a:ext cx="8520600" cy="3354000"/>
+          </a:xfrm>
+          <a:prstGeom prst="rect">
+            <a:avLst/>
+          </a:prstGeom>
+        </p:spPr>
+        <p:txBody>
+          <a:bodyPr lIns="91425" tIns="91425" rIns="91425" bIns="91425" anchor="t" anchorCtr="0">
+            <a:noAutofit/>
+          </a:bodyPr>
+          <a:lstStyle/>
+          <a:p>
+            <a:pPr lvl="0">
+              <a:spcBef>
+                <a:spcPts val="0"/>
+              </a:spcBef>
+              <a:buNone/>
+            </a:pPr>
+            <a:r>
+              <a:rPr lang="en" u="sng">
+                <a:solidFill>
+                  <a:schemeClr val="hlink"/>
+                </a:solidFill>
+                <a:hlinkClick r:id="rId3"/>
+              </a:rPr>
+              <a:t>https://www.16personalities.com/free-personality-test</a:t>
+            </a:r>
+          </a:p>
+          <a:p>
+            <a:pPr lvl="0">
+              <a:spcBef>
+                <a:spcPts val="0"/>
+              </a:spcBef>
+              <a:buNone/>
+            </a:pPr>
+            <a:endParaRPr/>
+          </a:p>
+          <a:p>
+            <a:pPr lvl="0">
+              <a:spcBef>
+                <a:spcPts val="0"/>
+              </a:spcBef>
+              <a:buNone/>
+            </a:pPr>
+            <a:endParaRPr/>
+          </a:p>
+        </p:txBody>
+      </p:sp>
+      <p:pic>
+        <p:nvPicPr>
+          <p:cNvPr id="84" name="Shape 84" descr="16personalitiesfrontpage.PNG"/>
+          <p:cNvPicPr preferRelativeResize="0"/>
+          <p:nvPr/>
+        </p:nvPicPr>
+        <p:blipFill>
+          <a:blip r:embed="rId4">
+            <a:alphaModFix/>
+          </a:blip>
+          <a:stretch>
+            <a:fillRect/>
+          </a:stretch>
+        </p:blipFill>
+        <p:spPr>
+          <a:xfrm>
+            <a:off x="1376600" y="1639774"/>
+            <a:ext cx="6390799" cy="3127049"/>
+          </a:xfrm>
+          <a:prstGeom prst="rect">
+            <a:avLst/>
+          </a:prstGeom>
+          <a:noFill/>
+          <a:ln>
+            <a:noFill/>
+          </a:ln>
+        </p:spPr>
+      </p:pic>
+    </p:spTree>
+  </p:cSld>
+  <p:clrMapOvr>
+    <a:masterClrMapping/>
+  </p:clrMapOvr>
+</p:sld>
+</file>
+
+<file path=ppt/slides/slide4.xml><?xml version="1.0" encoding="utf-8"?>
+<p:sld xmlns:a="http://schemas.openxmlformats.org/drawingml/2006/main" xmlns:r="http://schemas.openxmlformats.org/officeDocument/2006/relationships" xmlns:p="http://schemas.openxmlformats.org/presentationml/2006/main">
+  <p:cSld>
+    <p:spTree>
+      <p:nvGrpSpPr>
+        <p:cNvPr id="1" name="Shape 75"/>
+        <p:cNvGrpSpPr/>
+        <p:nvPr/>
+      </p:nvGrpSpPr>
+      <p:grpSpPr>
+        <a:xfrm>
+          <a:off x="0" y="0"/>
+          <a:ext cx="0" cy="0"/>
+          <a:chOff x="0" y="0"/>
+          <a:chExt cx="0" cy="0"/>
+        </a:xfrm>
+      </p:grpSpPr>
+      <p:sp>
+        <p:nvSpPr>
+          <p:cNvPr id="76" name="Shape 76"/>
+          <p:cNvSpPr txBox="1">
+            <a:spLocks noGrp="1"/>
+          </p:cNvSpPr>
+          <p:nvPr>
+            <p:ph type="title"/>
+          </p:nvPr>
+        </p:nvSpPr>
+        <p:spPr>
+          <a:xfrm>
+            <a:off x="311700" y="315925"/>
+            <a:ext cx="8520600" cy="831300"/>
+          </a:xfrm>
+          <a:prstGeom prst="rect">
+            <a:avLst/>
+          </a:prstGeom>
+        </p:spPr>
+        <p:txBody>
+          <a:bodyPr lIns="91425" tIns="91425" rIns="91425" bIns="91425" anchor="b" anchorCtr="0">
             <a:noAutofit/>
           </a:bodyPr>
           <a:lstStyle/>
@@ -5965,12 +6430,12 @@
 </p:sld>
 </file>
 
-<file path=ppt/slides/slide4.xml><?xml version="1.0" encoding="utf-8"?>
-<p:sld xmlns:a="http://schemas.openxmlformats.org/drawingml/2006/main" xmlns:r="http://schemas.openxmlformats.org/officeDocument/2006/relationships" xmlns:mc="http://schemas.openxmlformats.org/markup-compatibility/2006" xmlns:mv="urn:schemas-microsoft-com:mac:vml" xmlns:p="http://schemas.openxmlformats.org/presentationml/2006/main" xmlns:c="http://schemas.openxmlformats.org/drawingml/2006/chart" xmlns:dgm="http://schemas.openxmlformats.org/drawingml/2006/diagram" xmlns:o="urn:schemas-microsoft-com:office:office" xmlns:v="urn:schemas-microsoft-com:vml" xmlns:pvml="urn:schemas-microsoft-com:office:powerpoint" xmlns:com="http://schemas.openxmlformats.org/drawingml/2006/compatibility" xmlns:p14="http://schemas.microsoft.com/office/powerpoint/2010/main" xmlns:p15="http://schemas.microsoft.com/office/powerpoint/2012/main">
+<file path=ppt/slides/slide5.xml><?xml version="1.0" encoding="utf-8"?>
+<p:sld xmlns:a="http://schemas.openxmlformats.org/drawingml/2006/main" xmlns:r="http://schemas.openxmlformats.org/officeDocument/2006/relationships" xmlns:p="http://schemas.openxmlformats.org/presentationml/2006/main">
   <p:cSld>
     <p:spTree>
       <p:nvGrpSpPr>
-        <p:cNvPr id="81" name="Shape 81"/>
+        <p:cNvPr id="1" name="Shape 103"/>
         <p:cNvGrpSpPr/>
         <p:nvPr/>
       </p:nvGrpSpPr>
@@ -5984,8 +6449,10 @@
       </p:grpSpPr>
       <p:sp>
         <p:nvSpPr>
-          <p:cNvPr id="82" name="Shape 82"/>
-          <p:cNvSpPr txBox="1"/>
+          <p:cNvPr id="104" name="Shape 104"/>
+          <p:cNvSpPr txBox="1">
+            <a:spLocks noGrp="1"/>
+          </p:cNvSpPr>
           <p:nvPr>
             <p:ph type="title"/>
           </p:nvPr>
@@ -6000,7 +6467,7 @@
           </a:prstGeom>
         </p:spPr>
         <p:txBody>
-          <a:bodyPr anchorCtr="0" anchor="b" bIns="91425" lIns="91425" rIns="91425" tIns="91425">
+          <a:bodyPr lIns="91425" tIns="91425" rIns="91425" bIns="91425" anchor="b" anchorCtr="0">
             <a:noAutofit/>
           </a:bodyPr>
           <a:lstStyle/>
@@ -6013,30 +6480,32 @@
             </a:pPr>
             <a:r>
               <a:rPr lang="en"/>
-              <a:t>Take the Test!</a:t>
+              <a:t>Suggested Format</a:t>
             </a:r>
           </a:p>
         </p:txBody>
       </p:sp>
       <p:sp>
         <p:nvSpPr>
-          <p:cNvPr id="83" name="Shape 83"/>
-          <p:cNvSpPr txBox="1"/>
+          <p:cNvPr id="105" name="Shape 105"/>
+          <p:cNvSpPr txBox="1">
+            <a:spLocks noGrp="1"/>
+          </p:cNvSpPr>
           <p:nvPr>
-            <p:ph idx="1" type="body"/>
+            <p:ph type="body" idx="1"/>
           </p:nvPr>
         </p:nvSpPr>
         <p:spPr>
           <a:xfrm>
             <a:off x="311700" y="1225225"/>
-            <a:ext cx="8520600" cy="3354000"/>
+            <a:ext cx="3999900" cy="3354000"/>
           </a:xfrm>
           <a:prstGeom prst="rect">
             <a:avLst/>
           </a:prstGeom>
         </p:spPr>
         <p:txBody>
-          <a:bodyPr anchorCtr="0" anchor="t" bIns="91425" lIns="91425" rIns="91425" tIns="91425">
+          <a:bodyPr lIns="91425" tIns="91425" rIns="91425" bIns="91425" anchor="t" anchorCtr="0">
             <a:noAutofit/>
           </a:bodyPr>
           <a:lstStyle/>
@@ -6045,16 +6514,16 @@
               <a:spcBef>
                 <a:spcPts val="0"/>
               </a:spcBef>
+              <a:buClr>
+                <a:schemeClr val="dk1"/>
+              </a:buClr>
+              <a:buSzPct val="61111"/>
+              <a:buFont typeface="Arial"/>
               <a:buNone/>
             </a:pPr>
             <a:r>
-              <a:rPr lang="en" u="sng">
-                <a:solidFill>
-                  <a:schemeClr val="hlink"/>
-                </a:solidFill>
-                <a:hlinkClick r:id="rId3"/>
-              </a:rPr>
-              <a:t>https://www.16personalities.com/free-personality-test</a:t>
+              <a:rPr lang="en" sz="1800"/>
+              <a:t>Coverpage</a:t>
             </a:r>
           </a:p>
           <a:p>
@@ -6062,30 +6531,232 @@
               <a:spcBef>
                 <a:spcPts val="0"/>
               </a:spcBef>
+              <a:buClr>
+                <a:schemeClr val="dk1"/>
+              </a:buClr>
+              <a:buSzPct val="61111"/>
+              <a:buFont typeface="Arial"/>
               <a:buNone/>
             </a:pPr>
             <a:r>
-              <a:t/>
+              <a:rPr lang="en" sz="1800"/>
+              <a:t>Name</a:t>
             </a:r>
-            <a:endParaRPr/>
           </a:p>
           <a:p>
             <a:pPr lvl="0">
               <a:spcBef>
                 <a:spcPts val="0"/>
               </a:spcBef>
+              <a:buClr>
+                <a:schemeClr val="dk1"/>
+              </a:buClr>
+              <a:buSzPct val="61111"/>
+              <a:buFont typeface="Arial"/>
               <a:buNone/>
             </a:pPr>
             <a:r>
-              <a:t/>
+              <a:rPr lang="en" sz="1800"/>
+              <a:t>Personality Types</a:t>
             </a:r>
-            <a:endParaRPr/>
+          </a:p>
+          <a:p>
+            <a:pPr lvl="0">
+              <a:spcBef>
+                <a:spcPts val="0"/>
+              </a:spcBef>
+              <a:buClr>
+                <a:schemeClr val="dk1"/>
+              </a:buClr>
+              <a:buSzPct val="61111"/>
+              <a:buFont typeface="Arial"/>
+              <a:buNone/>
+            </a:pPr>
+            <a:r>
+              <a:rPr lang="en" sz="1800"/>
+              <a:t>Strengths (and Famous People)</a:t>
+            </a:r>
+          </a:p>
+          <a:p>
+            <a:pPr lvl="0">
+              <a:spcBef>
+                <a:spcPts val="0"/>
+              </a:spcBef>
+              <a:buClr>
+                <a:schemeClr val="dk1"/>
+              </a:buClr>
+              <a:buSzPct val="61111"/>
+              <a:buFont typeface="Arial"/>
+              <a:buNone/>
+            </a:pPr>
+            <a:r>
+              <a:rPr lang="en" sz="1800"/>
+              <a:t>Weaknesses</a:t>
+            </a:r>
+          </a:p>
+        </p:txBody>
+      </p:sp>
+      <p:sp>
+        <p:nvSpPr>
+          <p:cNvPr id="106" name="Shape 106"/>
+          <p:cNvSpPr txBox="1">
+            <a:spLocks noGrp="1"/>
+          </p:cNvSpPr>
+          <p:nvPr>
+            <p:ph type="body" idx="2"/>
+          </p:nvPr>
+        </p:nvSpPr>
+        <p:spPr>
+          <a:xfrm>
+            <a:off x="4832400" y="1225225"/>
+            <a:ext cx="3999900" cy="3354000"/>
+          </a:xfrm>
+          <a:prstGeom prst="rect">
+            <a:avLst/>
+          </a:prstGeom>
+        </p:spPr>
+        <p:txBody>
+          <a:bodyPr lIns="91425" tIns="91425" rIns="91425" bIns="91425" anchor="t" anchorCtr="0">
+            <a:noAutofit/>
+          </a:bodyPr>
+          <a:lstStyle/>
+          <a:p>
+            <a:pPr lvl="0">
+              <a:spcBef>
+                <a:spcPts val="0"/>
+              </a:spcBef>
+              <a:buNone/>
+            </a:pPr>
+            <a:r>
+              <a:rPr lang="en" sz="1800"/>
+              <a:t>Hobbies</a:t>
+            </a:r>
+          </a:p>
+          <a:p>
+            <a:pPr lvl="0">
+              <a:spcBef>
+                <a:spcPts val="0"/>
+              </a:spcBef>
+              <a:buNone/>
+            </a:pPr>
+            <a:r>
+              <a:rPr lang="en" sz="1800"/>
+              <a:t>Favorite Things</a:t>
+            </a:r>
+          </a:p>
+          <a:p>
+            <a:pPr lvl="0">
+              <a:spcBef>
+                <a:spcPts val="0"/>
+              </a:spcBef>
+              <a:buClr>
+                <a:schemeClr val="dk1"/>
+              </a:buClr>
+              <a:buSzPct val="61111"/>
+              <a:buFont typeface="Arial"/>
+              <a:buNone/>
+            </a:pPr>
+            <a:r>
+              <a:rPr lang="en" sz="1800"/>
+              <a:t>End Page</a:t>
+            </a:r>
+          </a:p>
+        </p:txBody>
+      </p:sp>
+    </p:spTree>
+  </p:cSld>
+  <p:clrMapOvr>
+    <a:masterClrMapping/>
+  </p:clrMapOvr>
+</p:sld>
+</file>
+
+<file path=ppt/slides/slide6.xml><?xml version="1.0" encoding="utf-8"?>
+<p:sld xmlns:a="http://schemas.openxmlformats.org/drawingml/2006/main" xmlns:r="http://schemas.openxmlformats.org/officeDocument/2006/relationships" xmlns:p="http://schemas.openxmlformats.org/presentationml/2006/main">
+  <p:cSld>
+    <p:spTree>
+      <p:nvGrpSpPr>
+        <p:cNvPr id="1" name="Shape 88"/>
+        <p:cNvGrpSpPr/>
+        <p:nvPr/>
+      </p:nvGrpSpPr>
+      <p:grpSpPr>
+        <a:xfrm>
+          <a:off x="0" y="0"/>
+          <a:ext cx="0" cy="0"/>
+          <a:chOff x="0" y="0"/>
+          <a:chExt cx="0" cy="0"/>
+        </a:xfrm>
+      </p:grpSpPr>
+      <p:sp>
+        <p:nvSpPr>
+          <p:cNvPr id="89" name="Shape 89"/>
+          <p:cNvSpPr txBox="1">
+            <a:spLocks noGrp="1"/>
+          </p:cNvSpPr>
+          <p:nvPr>
+            <p:ph type="title"/>
+          </p:nvPr>
+        </p:nvSpPr>
+        <p:spPr>
+          <a:xfrm>
+            <a:off x="311700" y="315925"/>
+            <a:ext cx="8520600" cy="831300"/>
+          </a:xfrm>
+          <a:prstGeom prst="rect">
+            <a:avLst/>
+          </a:prstGeom>
+        </p:spPr>
+        <p:txBody>
+          <a:bodyPr lIns="91425" tIns="91425" rIns="91425" bIns="91425" anchor="b" anchorCtr="0">
+            <a:noAutofit/>
+          </a:bodyPr>
+          <a:lstStyle/>
+          <a:p>
+            <a:pPr lvl="0">
+              <a:spcBef>
+                <a:spcPts val="0"/>
+              </a:spcBef>
+              <a:buNone/>
+            </a:pPr>
+            <a:r>
+              <a:rPr lang="en"/>
+              <a:t>Beginning and the End</a:t>
+            </a:r>
           </a:p>
         </p:txBody>
       </p:sp>
       <p:pic>
         <p:nvPicPr>
-          <p:cNvPr descr="16personalitiesfrontpage.PNG" id="84" name="Shape 84"/>
+          <p:cNvPr id="90" name="Shape 90" descr="20170825_130132.jpg"/>
+          <p:cNvPicPr preferRelativeResize="0"/>
+          <p:nvPr/>
+        </p:nvPicPr>
+        <p:blipFill>
+          <a:blip r:embed="rId3">
+            <a:alphaModFix/>
+          </a:blip>
+          <a:stretch>
+            <a:fillRect/>
+          </a:stretch>
+        </p:blipFill>
+        <p:spPr>
+          <a:xfrm>
+            <a:off x="1609925" y="1087800"/>
+            <a:ext cx="2149297" cy="3820974"/>
+          </a:xfrm>
+          <a:prstGeom prst="rect">
+            <a:avLst/>
+          </a:prstGeom>
+          <a:noFill/>
+          <a:ln>
+            <a:noFill/>
+          </a:ln>
+        </p:spPr>
+      </p:pic>
+      <p:pic>
+        <p:nvPicPr>
+          <p:cNvPr id="91" name="Shape 91" descr="20170825_130210.jpg"/>
           <p:cNvPicPr preferRelativeResize="0"/>
           <p:nvPr/>
         </p:nvPicPr>
@@ -6099,8 +6770,8 @@
         </p:blipFill>
         <p:spPr>
           <a:xfrm>
-            <a:off x="1376600" y="1639774"/>
-            <a:ext cx="6390799" cy="3127049"/>
+            <a:off x="5200997" y="1087800"/>
+            <a:ext cx="2245546" cy="3820976"/>
           </a:xfrm>
           <a:prstGeom prst="rect">
             <a:avLst/>
@@ -6119,12 +6790,12 @@
 </p:sld>
 </file>
 
-<file path=ppt/slides/slide5.xml><?xml version="1.0" encoding="utf-8"?>
-<p:sld xmlns:a="http://schemas.openxmlformats.org/drawingml/2006/main" xmlns:r="http://schemas.openxmlformats.org/officeDocument/2006/relationships" xmlns:mc="http://schemas.openxmlformats.org/markup-compatibility/2006" xmlns:mv="urn:schemas-microsoft-com:mac:vml" xmlns:p="http://schemas.openxmlformats.org/presentationml/2006/main" xmlns:c="http://schemas.openxmlformats.org/drawingml/2006/chart" xmlns:dgm="http://schemas.openxmlformats.org/drawingml/2006/diagram" xmlns:o="urn:schemas-microsoft-com:office:office" xmlns:v="urn:schemas-microsoft-com:vml" xmlns:pvml="urn:schemas-microsoft-com:office:powerpoint" xmlns:com="http://schemas.openxmlformats.org/drawingml/2006/compatibility" xmlns:p14="http://schemas.microsoft.com/office/powerpoint/2010/main" xmlns:p15="http://schemas.microsoft.com/office/powerpoint/2012/main">
+<file path=ppt/slides/slide7.xml><?xml version="1.0" encoding="utf-8"?>
+<p:sld xmlns:a="http://schemas.openxmlformats.org/drawingml/2006/main" xmlns:r="http://schemas.openxmlformats.org/officeDocument/2006/relationships" xmlns:p="http://schemas.openxmlformats.org/presentationml/2006/main">
   <p:cSld>
     <p:spTree>
       <p:nvGrpSpPr>
-        <p:cNvPr id="88" name="Shape 88"/>
+        <p:cNvPr id="1" name="Shape 95"/>
         <p:cNvGrpSpPr/>
         <p:nvPr/>
       </p:nvGrpSpPr>
@@ -6138,8 +6809,10 @@
       </p:grpSpPr>
       <p:sp>
         <p:nvSpPr>
-          <p:cNvPr id="89" name="Shape 89"/>
-          <p:cNvSpPr txBox="1"/>
+          <p:cNvPr id="96" name="Shape 96"/>
+          <p:cNvSpPr txBox="1">
+            <a:spLocks noGrp="1"/>
+          </p:cNvSpPr>
           <p:nvPr>
             <p:ph type="title"/>
           </p:nvPr>
@@ -6154,7 +6827,7 @@
           </a:prstGeom>
         </p:spPr>
         <p:txBody>
-          <a:bodyPr anchorCtr="0" anchor="b" bIns="91425" lIns="91425" rIns="91425" tIns="91425">
+          <a:bodyPr lIns="91425" tIns="91425" rIns="91425" bIns="91425" anchor="b" anchorCtr="0">
             <a:noAutofit/>
           </a:bodyPr>
           <a:lstStyle/>
@@ -6167,18 +6840,14 @@
             </a:pPr>
             <a:r>
               <a:rPr lang="en"/>
-              <a:t>Beginning</a:t>
-            </a:r>
-            <a:r>
-              <a:rPr lang="en"/>
-              <a:t> and the End</a:t>
+              <a:t>Fill it Out!</a:t>
             </a:r>
           </a:p>
         </p:txBody>
       </p:sp>
       <p:pic>
         <p:nvPicPr>
-          <p:cNvPr descr="20170825_130132.jpg" id="90" name="Shape 90"/>
+          <p:cNvPr id="97" name="Shape 97" descr="20170825_130140.jpg"/>
           <p:cNvPicPr preferRelativeResize="0"/>
           <p:nvPr/>
         </p:nvPicPr>
@@ -6192,8 +6861,8 @@
         </p:blipFill>
         <p:spPr>
           <a:xfrm>
-            <a:off x="1609925" y="1087800"/>
-            <a:ext cx="2149297" cy="3820974"/>
+            <a:off x="2110449" y="90975"/>
+            <a:ext cx="2950550" cy="2333626"/>
           </a:xfrm>
           <a:prstGeom prst="rect">
             <a:avLst/>
@@ -6206,7 +6875,7 @@
       </p:pic>
       <p:pic>
         <p:nvPicPr>
-          <p:cNvPr descr="20170825_130210.jpg" id="91" name="Shape 91"/>
+          <p:cNvPr id="98" name="Shape 98" descr="20170825_130146.jpg"/>
           <p:cNvPicPr preferRelativeResize="0"/>
           <p:nvPr/>
         </p:nvPicPr>
@@ -6220,8 +6889,36 @@
         </p:blipFill>
         <p:spPr>
           <a:xfrm>
-            <a:off x="5200997" y="1087800"/>
-            <a:ext cx="2245546" cy="3820976"/>
+            <a:off x="2110449" y="2529575"/>
+            <a:ext cx="2950548" cy="2329595"/>
+          </a:xfrm>
+          <a:prstGeom prst="rect">
+            <a:avLst/>
+          </a:prstGeom>
+          <a:noFill/>
+          <a:ln>
+            <a:noFill/>
+          </a:ln>
+        </p:spPr>
+      </p:pic>
+      <p:pic>
+        <p:nvPicPr>
+          <p:cNvPr id="99" name="Shape 99" descr="20170825_130152.jpg"/>
+          <p:cNvPicPr preferRelativeResize="0"/>
+          <p:nvPr/>
+        </p:nvPicPr>
+        <p:blipFill>
+          <a:blip r:embed="rId5">
+            <a:alphaModFix/>
+          </a:blip>
+          <a:stretch>
+            <a:fillRect/>
+          </a:stretch>
+        </p:blipFill>
+        <p:spPr>
+          <a:xfrm>
+            <a:off x="5227425" y="1366325"/>
+            <a:ext cx="3778201" cy="2545858"/>
           </a:xfrm>
           <a:prstGeom prst="rect">
             <a:avLst/>
@@ -6240,12 +6937,12 @@
 </p:sld>
 </file>
 
-<file path=ppt/slides/slide6.xml><?xml version="1.0" encoding="utf-8"?>
-<p:sld xmlns:a="http://schemas.openxmlformats.org/drawingml/2006/main" xmlns:r="http://schemas.openxmlformats.org/officeDocument/2006/relationships" xmlns:mc="http://schemas.openxmlformats.org/markup-compatibility/2006" xmlns:mv="urn:schemas-microsoft-com:mac:vml" xmlns:p="http://schemas.openxmlformats.org/presentationml/2006/main" xmlns:c="http://schemas.openxmlformats.org/drawingml/2006/chart" xmlns:dgm="http://schemas.openxmlformats.org/drawingml/2006/diagram" xmlns:o="urn:schemas-microsoft-com:office:office" xmlns:v="urn:schemas-microsoft-com:vml" xmlns:pvml="urn:schemas-microsoft-com:office:powerpoint" xmlns:com="http://schemas.openxmlformats.org/drawingml/2006/compatibility" xmlns:p14="http://schemas.microsoft.com/office/powerpoint/2010/main" xmlns:p15="http://schemas.microsoft.com/office/powerpoint/2012/main">
+<file path=ppt/slides/slide8.xml><?xml version="1.0" encoding="utf-8"?>
+<p:sld xmlns:a="http://schemas.openxmlformats.org/drawingml/2006/main" xmlns:r="http://schemas.openxmlformats.org/officeDocument/2006/relationships" xmlns:p="http://schemas.openxmlformats.org/presentationml/2006/main">
   <p:cSld>
     <p:spTree>
       <p:nvGrpSpPr>
-        <p:cNvPr id="95" name="Shape 95"/>
+        <p:cNvPr id="1" name="Shape 110"/>
         <p:cNvGrpSpPr/>
         <p:nvPr/>
       </p:nvGrpSpPr>
@@ -6259,8 +6956,10 @@
       </p:grpSpPr>
       <p:sp>
         <p:nvSpPr>
-          <p:cNvPr id="96" name="Shape 96"/>
-          <p:cNvSpPr txBox="1"/>
+          <p:cNvPr id="111" name="Shape 111"/>
+          <p:cNvSpPr txBox="1">
+            <a:spLocks noGrp="1"/>
+          </p:cNvSpPr>
           <p:nvPr>
             <p:ph type="title"/>
           </p:nvPr>
@@ -6275,7 +6974,7 @@
           </a:prstGeom>
         </p:spPr>
         <p:txBody>
-          <a:bodyPr anchorCtr="0" anchor="b" bIns="91425" lIns="91425" rIns="91425" tIns="91425">
+          <a:bodyPr lIns="91425" tIns="91425" rIns="91425" bIns="91425" anchor="b" anchorCtr="0">
             <a:noAutofit/>
           </a:bodyPr>
           <a:lstStyle/>
@@ -6288,95 +6987,99 @@
             </a:pPr>
             <a:r>
               <a:rPr lang="en"/>
-              <a:t>Fill it Out!</a:t>
+              <a:t>Discussion!</a:t>
             </a:r>
           </a:p>
         </p:txBody>
       </p:sp>
-      <p:pic>
-        <p:nvPicPr>
-          <p:cNvPr descr="20170825_130140.jpg" id="97" name="Shape 97"/>
-          <p:cNvPicPr preferRelativeResize="0"/>
-          <p:nvPr/>
-        </p:nvPicPr>
-        <p:blipFill>
-          <a:blip r:embed="rId3">
-            <a:alphaModFix/>
-          </a:blip>
-          <a:stretch>
-            <a:fillRect/>
-          </a:stretch>
-        </p:blipFill>
-        <p:spPr>
-          <a:xfrm>
-            <a:off x="2110449" y="90975"/>
-            <a:ext cx="2950550" cy="2333626"/>
+      <p:sp>
+        <p:nvSpPr>
+          <p:cNvPr id="112" name="Shape 112"/>
+          <p:cNvSpPr txBox="1">
+            <a:spLocks noGrp="1"/>
+          </p:cNvSpPr>
+          <p:nvPr>
+            <p:ph type="body" idx="1"/>
+          </p:nvPr>
+        </p:nvSpPr>
+        <p:spPr>
+          <a:xfrm>
+            <a:off x="311700" y="1225225"/>
+            <a:ext cx="8520600" cy="3354000"/>
           </a:xfrm>
           <a:prstGeom prst="rect">
             <a:avLst/>
           </a:prstGeom>
-          <a:noFill/>
-          <a:ln>
-            <a:noFill/>
-          </a:ln>
-        </p:spPr>
-      </p:pic>
-      <p:pic>
-        <p:nvPicPr>
-          <p:cNvPr descr="20170825_130146.jpg" id="98" name="Shape 98"/>
-          <p:cNvPicPr preferRelativeResize="0"/>
-          <p:nvPr/>
-        </p:nvPicPr>
-        <p:blipFill>
-          <a:blip r:embed="rId4">
-            <a:alphaModFix/>
-          </a:blip>
-          <a:stretch>
-            <a:fillRect/>
-          </a:stretch>
-        </p:blipFill>
-        <p:spPr>
-          <a:xfrm>
-            <a:off x="2110449" y="2529575"/>
-            <a:ext cx="2950548" cy="2329595"/>
-          </a:xfrm>
-          <a:prstGeom prst="rect">
-            <a:avLst/>
-          </a:prstGeom>
-          <a:noFill/>
-          <a:ln>
-            <a:noFill/>
-          </a:ln>
-        </p:spPr>
-      </p:pic>
-      <p:pic>
-        <p:nvPicPr>
-          <p:cNvPr descr="20170825_130152.jpg" id="99" name="Shape 99"/>
-          <p:cNvPicPr preferRelativeResize="0"/>
-          <p:nvPr/>
-        </p:nvPicPr>
-        <p:blipFill>
-          <a:blip r:embed="rId5">
-            <a:alphaModFix/>
-          </a:blip>
-          <a:stretch>
-            <a:fillRect/>
-          </a:stretch>
-        </p:blipFill>
-        <p:spPr>
-          <a:xfrm>
-            <a:off x="5227425" y="1366325"/>
-            <a:ext cx="3778201" cy="2545858"/>
-          </a:xfrm>
-          <a:prstGeom prst="rect">
-            <a:avLst/>
-          </a:prstGeom>
-          <a:noFill/>
-          <a:ln>
-            <a:noFill/>
-          </a:ln>
-        </p:spPr>
-      </p:pic>
+        </p:spPr>
+        <p:txBody>
+          <a:bodyPr lIns="91425" tIns="91425" rIns="91425" bIns="91425" anchor="t" anchorCtr="0">
+            <a:noAutofit/>
+          </a:bodyPr>
+          <a:lstStyle/>
+          <a:p>
+            <a:pPr lvl="0">
+              <a:spcBef>
+                <a:spcPts val="0"/>
+              </a:spcBef>
+              <a:buNone/>
+            </a:pPr>
+            <a:r>
+              <a:rPr lang="en"/>
+              <a:t>What did you like?</a:t>
+            </a:r>
+          </a:p>
+          <a:p>
+            <a:pPr lvl="0">
+              <a:spcBef>
+                <a:spcPts val="0"/>
+              </a:spcBef>
+              <a:buClr>
+                <a:schemeClr val="dk1"/>
+              </a:buClr>
+              <a:buSzPct val="61111"/>
+              <a:buFont typeface="Arial"/>
+              <a:buNone/>
+            </a:pPr>
+            <a:r>
+              <a:rPr lang="en"/>
+              <a:t>What did you learn?</a:t>
+            </a:r>
+          </a:p>
+          <a:p>
+            <a:pPr lvl="0">
+              <a:spcBef>
+                <a:spcPts val="0"/>
+              </a:spcBef>
+              <a:buNone/>
+            </a:pPr>
+            <a:r>
+              <a:rPr lang="en"/>
+              <a:t>What could be improved upon?</a:t>
+            </a:r>
+          </a:p>
+          <a:p>
+            <a:pPr lvl="0">
+              <a:spcBef>
+                <a:spcPts val="0"/>
+              </a:spcBef>
+              <a:buNone/>
+            </a:pPr>
+            <a:r>
+              <a:rPr lang="en"/>
+              <a:t>What can you do to be better to your coworkers?</a:t>
+            </a:r>
+          </a:p>
+          <a:p>
+            <a:pPr lvl="0">
+              <a:spcBef>
+                <a:spcPts val="0"/>
+              </a:spcBef>
+              <a:buNone/>
+            </a:pPr>
+            <a:endParaRPr/>
+          </a:p>
+        </p:txBody>
+      </p:sp>
     </p:spTree>
   </p:cSld>
   <p:clrMapOvr>
@@ -6385,12 +7088,12 @@
 </p:sld>
 </file>
 
-<file path=ppt/slides/slide7.xml><?xml version="1.0" encoding="utf-8"?>
-<p:sld xmlns:a="http://schemas.openxmlformats.org/drawingml/2006/main" xmlns:r="http://schemas.openxmlformats.org/officeDocument/2006/relationships" xmlns:mc="http://schemas.openxmlformats.org/markup-compatibility/2006" xmlns:mv="urn:schemas-microsoft-com:mac:vml" xmlns:p="http://schemas.openxmlformats.org/presentationml/2006/main" xmlns:c="http://schemas.openxmlformats.org/drawingml/2006/chart" xmlns:dgm="http://schemas.openxmlformats.org/drawingml/2006/diagram" xmlns:o="urn:schemas-microsoft-com:office:office" xmlns:v="urn:schemas-microsoft-com:vml" xmlns:pvml="urn:schemas-microsoft-com:office:powerpoint" xmlns:com="http://schemas.openxmlformats.org/drawingml/2006/compatibility" xmlns:p14="http://schemas.microsoft.com/office/powerpoint/2010/main" xmlns:p15="http://schemas.microsoft.com/office/powerpoint/2012/main">
+<file path=ppt/slides/slide9.xml><?xml version="1.0" encoding="utf-8"?>
+<p:sld xmlns:a="http://schemas.openxmlformats.org/drawingml/2006/main" xmlns:r="http://schemas.openxmlformats.org/officeDocument/2006/relationships" xmlns:p="http://schemas.openxmlformats.org/presentationml/2006/main">
   <p:cSld>
     <p:spTree>
       <p:nvGrpSpPr>
-        <p:cNvPr id="103" name="Shape 103"/>
+        <p:cNvPr id="1" name="Shape 116"/>
         <p:cNvGrpSpPr/>
         <p:nvPr/>
       </p:nvGrpSpPr>
@@ -6404,399 +7107,16 @@
       </p:grpSpPr>
       <p:sp>
         <p:nvSpPr>
-          <p:cNvPr id="104" name="Shape 104"/>
-          <p:cNvSpPr txBox="1"/>
+          <p:cNvPr id="117" name="Shape 117"/>
+          <p:cNvSpPr txBox="1">
+            <a:spLocks noGrp="1"/>
+          </p:cNvSpPr>
           <p:nvPr>
             <p:ph type="title"/>
           </p:nvPr>
         </p:nvSpPr>
         <p:spPr>
           <a:xfrm>
-            <a:off x="311700" y="315925"/>
-            <a:ext cx="8520600" cy="831300"/>
-          </a:xfrm>
-          <a:prstGeom prst="rect">
-            <a:avLst/>
-          </a:prstGeom>
-        </p:spPr>
-        <p:txBody>
-          <a:bodyPr anchorCtr="0" anchor="b" bIns="91425" lIns="91425" rIns="91425" tIns="91425">
-            <a:noAutofit/>
-          </a:bodyPr>
-          <a:lstStyle/>
-          <a:p>
-            <a:pPr lvl="0">
-              <a:spcBef>
-                <a:spcPts val="0"/>
-              </a:spcBef>
-              <a:buNone/>
-            </a:pPr>
-            <a:r>
-              <a:rPr lang="en"/>
-              <a:t>Suggested Format</a:t>
-            </a:r>
-          </a:p>
-        </p:txBody>
-      </p:sp>
-      <p:sp>
-        <p:nvSpPr>
-          <p:cNvPr id="105" name="Shape 105"/>
-          <p:cNvSpPr txBox="1"/>
-          <p:nvPr>
-            <p:ph idx="1" type="body"/>
-          </p:nvPr>
-        </p:nvSpPr>
-        <p:spPr>
-          <a:xfrm>
-            <a:off x="311700" y="1225225"/>
-            <a:ext cx="3999900" cy="3354000"/>
-          </a:xfrm>
-          <a:prstGeom prst="rect">
-            <a:avLst/>
-          </a:prstGeom>
-        </p:spPr>
-        <p:txBody>
-          <a:bodyPr anchorCtr="0" anchor="t" bIns="91425" lIns="91425" rIns="91425" tIns="91425">
-            <a:noAutofit/>
-          </a:bodyPr>
-          <a:lstStyle/>
-          <a:p>
-            <a:pPr lvl="0">
-              <a:spcBef>
-                <a:spcPts val="0"/>
-              </a:spcBef>
-              <a:buClr>
-                <a:schemeClr val="dk1"/>
-              </a:buClr>
-              <a:buSzPct val="61111"/>
-              <a:buFont typeface="Arial"/>
-              <a:buNone/>
-            </a:pPr>
-            <a:r>
-              <a:rPr lang="en" sz="1800"/>
-              <a:t>Coverpage</a:t>
-            </a:r>
-          </a:p>
-          <a:p>
-            <a:pPr lvl="0">
-              <a:spcBef>
-                <a:spcPts val="0"/>
-              </a:spcBef>
-              <a:buClr>
-                <a:schemeClr val="dk1"/>
-              </a:buClr>
-              <a:buSzPct val="61111"/>
-              <a:buFont typeface="Arial"/>
-              <a:buNone/>
-            </a:pPr>
-            <a:r>
-              <a:rPr lang="en" sz="1800"/>
-              <a:t>Name</a:t>
-            </a:r>
-          </a:p>
-          <a:p>
-            <a:pPr lvl="0">
-              <a:spcBef>
-                <a:spcPts val="0"/>
-              </a:spcBef>
-              <a:buClr>
-                <a:schemeClr val="dk1"/>
-              </a:buClr>
-              <a:buSzPct val="61111"/>
-              <a:buFont typeface="Arial"/>
-              <a:buNone/>
-            </a:pPr>
-            <a:r>
-              <a:rPr lang="en" sz="1800"/>
-              <a:t>Personality Types</a:t>
-            </a:r>
-          </a:p>
-          <a:p>
-            <a:pPr lvl="0">
-              <a:spcBef>
-                <a:spcPts val="0"/>
-              </a:spcBef>
-              <a:buClr>
-                <a:schemeClr val="dk1"/>
-              </a:buClr>
-              <a:buSzPct val="61111"/>
-              <a:buFont typeface="Arial"/>
-              <a:buNone/>
-            </a:pPr>
-            <a:r>
-              <a:rPr lang="en" sz="1800"/>
-              <a:t>Strengths (and Famous People)</a:t>
-            </a:r>
-          </a:p>
-          <a:p>
-            <a:pPr lvl="0">
-              <a:spcBef>
-                <a:spcPts val="0"/>
-              </a:spcBef>
-              <a:buClr>
-                <a:schemeClr val="dk1"/>
-              </a:buClr>
-              <a:buSzPct val="61111"/>
-              <a:buFont typeface="Arial"/>
-              <a:buNone/>
-            </a:pPr>
-            <a:r>
-              <a:rPr lang="en" sz="1800"/>
-              <a:t>Weaknesses</a:t>
-            </a:r>
-          </a:p>
-        </p:txBody>
-      </p:sp>
-      <p:sp>
-        <p:nvSpPr>
-          <p:cNvPr id="106" name="Shape 106"/>
-          <p:cNvSpPr txBox="1"/>
-          <p:nvPr>
-            <p:ph idx="2" type="body"/>
-          </p:nvPr>
-        </p:nvSpPr>
-        <p:spPr>
-          <a:xfrm>
-            <a:off x="4832400" y="1225225"/>
-            <a:ext cx="3999900" cy="3354000"/>
-          </a:xfrm>
-          <a:prstGeom prst="rect">
-            <a:avLst/>
-          </a:prstGeom>
-        </p:spPr>
-        <p:txBody>
-          <a:bodyPr anchorCtr="0" anchor="t" bIns="91425" lIns="91425" rIns="91425" tIns="91425">
-            <a:noAutofit/>
-          </a:bodyPr>
-          <a:lstStyle/>
-          <a:p>
-            <a:pPr lvl="0">
-              <a:spcBef>
-                <a:spcPts val="0"/>
-              </a:spcBef>
-              <a:buNone/>
-            </a:pPr>
-            <a:r>
-              <a:rPr lang="en" sz="1800"/>
-              <a:t>Hobbies</a:t>
-            </a:r>
-          </a:p>
-          <a:p>
-            <a:pPr lvl="0">
-              <a:spcBef>
-                <a:spcPts val="0"/>
-              </a:spcBef>
-              <a:buNone/>
-            </a:pPr>
-            <a:r>
-              <a:rPr lang="en" sz="1800"/>
-              <a:t>Favorite Things</a:t>
-            </a:r>
-          </a:p>
-          <a:p>
-            <a:pPr lvl="0">
-              <a:spcBef>
-                <a:spcPts val="0"/>
-              </a:spcBef>
-              <a:buClr>
-                <a:schemeClr val="dk1"/>
-              </a:buClr>
-              <a:buSzPct val="61111"/>
-              <a:buFont typeface="Arial"/>
-              <a:buNone/>
-            </a:pPr>
-            <a:r>
-              <a:rPr lang="en" sz="1800"/>
-              <a:t>End Page</a:t>
-            </a:r>
-          </a:p>
-        </p:txBody>
-      </p:sp>
-    </p:spTree>
-  </p:cSld>
-  <p:clrMapOvr>
-    <a:masterClrMapping/>
-  </p:clrMapOvr>
-</p:sld>
-</file>
-
-<file path=ppt/slides/slide8.xml><?xml version="1.0" encoding="utf-8"?>
-<p:sld xmlns:a="http://schemas.openxmlformats.org/drawingml/2006/main" xmlns:r="http://schemas.openxmlformats.org/officeDocument/2006/relationships" xmlns:mc="http://schemas.openxmlformats.org/markup-compatibility/2006" xmlns:mv="urn:schemas-microsoft-com:mac:vml" xmlns:p="http://schemas.openxmlformats.org/presentationml/2006/main" xmlns:c="http://schemas.openxmlformats.org/drawingml/2006/chart" xmlns:dgm="http://schemas.openxmlformats.org/drawingml/2006/diagram" xmlns:o="urn:schemas-microsoft-com:office:office" xmlns:v="urn:schemas-microsoft-com:vml" xmlns:pvml="urn:schemas-microsoft-com:office:powerpoint" xmlns:com="http://schemas.openxmlformats.org/drawingml/2006/compatibility" xmlns:p14="http://schemas.microsoft.com/office/powerpoint/2010/main" xmlns:p15="http://schemas.microsoft.com/office/powerpoint/2012/main">
-  <p:cSld>
-    <p:spTree>
-      <p:nvGrpSpPr>
-        <p:cNvPr id="110" name="Shape 110"/>
-        <p:cNvGrpSpPr/>
-        <p:nvPr/>
-      </p:nvGrpSpPr>
-      <p:grpSpPr>
-        <a:xfrm>
-          <a:off x="0" y="0"/>
-          <a:ext cx="0" cy="0"/>
-          <a:chOff x="0" y="0"/>
-          <a:chExt cx="0" cy="0"/>
-        </a:xfrm>
-      </p:grpSpPr>
-      <p:sp>
-        <p:nvSpPr>
-          <p:cNvPr id="111" name="Shape 111"/>
-          <p:cNvSpPr txBox="1"/>
-          <p:nvPr>
-            <p:ph type="title"/>
-          </p:nvPr>
-        </p:nvSpPr>
-        <p:spPr>
-          <a:xfrm>
-            <a:off x="311700" y="315925"/>
-            <a:ext cx="8520600" cy="831300"/>
-          </a:xfrm>
-          <a:prstGeom prst="rect">
-            <a:avLst/>
-          </a:prstGeom>
-        </p:spPr>
-        <p:txBody>
-          <a:bodyPr anchorCtr="0" anchor="b" bIns="91425" lIns="91425" rIns="91425" tIns="91425">
-            <a:noAutofit/>
-          </a:bodyPr>
-          <a:lstStyle/>
-          <a:p>
-            <a:pPr lvl="0">
-              <a:spcBef>
-                <a:spcPts val="0"/>
-              </a:spcBef>
-              <a:buNone/>
-            </a:pPr>
-            <a:r>
-              <a:rPr lang="en"/>
-              <a:t>Discussion!</a:t>
-            </a:r>
-          </a:p>
-        </p:txBody>
-      </p:sp>
-      <p:sp>
-        <p:nvSpPr>
-          <p:cNvPr id="112" name="Shape 112"/>
-          <p:cNvSpPr txBox="1"/>
-          <p:nvPr>
-            <p:ph idx="1" type="body"/>
-          </p:nvPr>
-        </p:nvSpPr>
-        <p:spPr>
-          <a:xfrm>
-            <a:off x="311700" y="1225225"/>
-            <a:ext cx="8520600" cy="3354000"/>
-          </a:xfrm>
-          <a:prstGeom prst="rect">
-            <a:avLst/>
-          </a:prstGeom>
-        </p:spPr>
-        <p:txBody>
-          <a:bodyPr anchorCtr="0" anchor="t" bIns="91425" lIns="91425" rIns="91425" tIns="91425">
-            <a:noAutofit/>
-          </a:bodyPr>
-          <a:lstStyle/>
-          <a:p>
-            <a:pPr lvl="0">
-              <a:spcBef>
-                <a:spcPts val="0"/>
-              </a:spcBef>
-              <a:buNone/>
-            </a:pPr>
-            <a:r>
-              <a:rPr lang="en"/>
-              <a:t>What did you like?</a:t>
-            </a:r>
-          </a:p>
-          <a:p>
-            <a:pPr lvl="0">
-              <a:spcBef>
-                <a:spcPts val="0"/>
-              </a:spcBef>
-              <a:buClr>
-                <a:schemeClr val="dk1"/>
-              </a:buClr>
-              <a:buSzPct val="61111"/>
-              <a:buFont typeface="Arial"/>
-              <a:buNone/>
-            </a:pPr>
-            <a:r>
-              <a:rPr lang="en"/>
-              <a:t>What did you learn?</a:t>
-            </a:r>
-          </a:p>
-          <a:p>
-            <a:pPr lvl="0">
-              <a:spcBef>
-                <a:spcPts val="0"/>
-              </a:spcBef>
-              <a:buNone/>
-            </a:pPr>
-            <a:r>
-              <a:rPr lang="en"/>
-              <a:t>What could be improved upon?</a:t>
-            </a:r>
-          </a:p>
-          <a:p>
-            <a:pPr lvl="0">
-              <a:spcBef>
-                <a:spcPts val="0"/>
-              </a:spcBef>
-              <a:buNone/>
-            </a:pPr>
-            <a:r>
-              <a:rPr lang="en"/>
-              <a:t>What can you do to be better to your coworkers?</a:t>
-            </a:r>
-          </a:p>
-          <a:p>
-            <a:pPr lvl="0">
-              <a:spcBef>
-                <a:spcPts val="0"/>
-              </a:spcBef>
-              <a:buNone/>
-            </a:pPr>
-            <a:r>
-              <a:t/>
-            </a:r>
-            <a:endParaRPr/>
-          </a:p>
-        </p:txBody>
-      </p:sp>
-    </p:spTree>
-  </p:cSld>
-  <p:clrMapOvr>
-    <a:masterClrMapping/>
-  </p:clrMapOvr>
-</p:sld>
-</file>
-
-<file path=ppt/slides/slide9.xml><?xml version="1.0" encoding="utf-8"?>
-<p:sld xmlns:a="http://schemas.openxmlformats.org/drawingml/2006/main" xmlns:r="http://schemas.openxmlformats.org/officeDocument/2006/relationships" xmlns:mc="http://schemas.openxmlformats.org/markup-compatibility/2006" xmlns:mv="urn:schemas-microsoft-com:mac:vml" xmlns:p="http://schemas.openxmlformats.org/presentationml/2006/main" xmlns:c="http://schemas.openxmlformats.org/drawingml/2006/chart" xmlns:dgm="http://schemas.openxmlformats.org/drawingml/2006/diagram" xmlns:o="urn:schemas-microsoft-com:office:office" xmlns:v="urn:schemas-microsoft-com:vml" xmlns:pvml="urn:schemas-microsoft-com:office:powerpoint" xmlns:com="http://schemas.openxmlformats.org/drawingml/2006/compatibility" xmlns:p14="http://schemas.microsoft.com/office/powerpoint/2010/main" xmlns:p15="http://schemas.microsoft.com/office/powerpoint/2012/main">
-  <p:cSld>
-    <p:spTree>
-      <p:nvGrpSpPr>
-        <p:cNvPr id="116" name="Shape 116"/>
-        <p:cNvGrpSpPr/>
-        <p:nvPr/>
-      </p:nvGrpSpPr>
-      <p:grpSpPr>
-        <a:xfrm>
-          <a:off x="0" y="0"/>
-          <a:ext cx="0" cy="0"/>
-          <a:chOff x="0" y="0"/>
-          <a:chExt cx="0" cy="0"/>
-        </a:xfrm>
-      </p:grpSpPr>
-      <p:sp>
-        <p:nvSpPr>
-          <p:cNvPr id="117" name="Shape 117"/>
-          <p:cNvSpPr txBox="1"/>
-          <p:nvPr>
-            <p:ph type="title"/>
-          </p:nvPr>
-        </p:nvSpPr>
-        <p:spPr>
-          <a:xfrm>
             <a:off x="773700" y="1806450"/>
             <a:ext cx="7596600" cy="1530600"/>
           </a:xfrm>
@@ -6805,7 +7125,7 @@
           </a:prstGeom>
         </p:spPr>
         <p:txBody>
-          <a:bodyPr anchorCtr="0" anchor="ctr" bIns="91425" lIns="91425" rIns="91425" tIns="91425">
+          <a:bodyPr lIns="91425" tIns="91425" rIns="91425" bIns="91425" anchor="ctr" anchorCtr="0">
             <a:noAutofit/>
           </a:bodyPr>
           <a:lstStyle/>
@@ -6832,7 +7152,7 @@
 </file>
 
 <file path=ppt/theme/theme1.xml><?xml version="1.0" encoding="utf-8"?>
-<a:theme xmlns:a="http://schemas.openxmlformats.org/drawingml/2006/main" xmlns:r="http://schemas.openxmlformats.org/officeDocument/2006/relationships" name="Luxe">
+<a:theme xmlns:a="http://schemas.openxmlformats.org/drawingml/2006/main" name="Luxe">
   <a:themeElements>
     <a:clrScheme name="Luxe">
       <a:dk1>
@@ -7107,11 +7427,13 @@
       </a:bgFillStyleLst>
     </a:fmtScheme>
   </a:themeElements>
+  <a:objectDefaults/>
+  <a:extraClrSchemeLst/>
 </a:theme>
 </file>
 
 <file path=ppt/theme/theme2.xml><?xml version="1.0" encoding="utf-8"?>
-<a:theme xmlns:a="http://schemas.openxmlformats.org/drawingml/2006/main" xmlns:r="http://schemas.openxmlformats.org/officeDocument/2006/relationships" name="Custom Theme">
+<a:theme xmlns:a="http://schemas.openxmlformats.org/drawingml/2006/main" name="Custom Theme">
   <a:themeElements>
     <a:clrScheme name="Default">
       <a:dk1>
@@ -7386,5 +7708,7 @@
       </a:bgFillStyleLst>
     </a:fmtScheme>
   </a:themeElements>
+  <a:objectDefaults/>
+  <a:extraClrSchemeLst/>
 </a:theme>
 </file>
</xml_diff>